<commit_message>
modified:   documentation/interface-designs/gui-concepts.pptx 	new file:   documentation/interface-designs/test-card-notes.txt
</commit_message>
<xml_diff>
--- a/documentation/interface-designs/gui-concepts.pptx
+++ b/documentation/interface-designs/gui-concepts.pptx
@@ -5,7 +5,7 @@
     <p:sldMasterId id="2147483648" r:id="rId1"/>
   </p:sldMasterIdLst>
   <p:notesMasterIdLst>
-    <p:notesMasterId r:id="rId8"/>
+    <p:notesMasterId r:id="rId10"/>
   </p:notesMasterIdLst>
   <p:sldIdLst>
     <p:sldId id="256" r:id="rId2"/>
@@ -14,6 +14,8 @@
     <p:sldId id="260" r:id="rId5"/>
     <p:sldId id="261" r:id="rId6"/>
     <p:sldId id="257" r:id="rId7"/>
+    <p:sldId id="262" r:id="rId8"/>
+    <p:sldId id="263" r:id="rId9"/>
   </p:sldIdLst>
   <p:sldSz cx="12192000" cy="6858000"/>
   <p:notesSz cx="6858000" cy="9144000"/>
@@ -112,13 +114,18 @@
       </a:defRPr>
     </a:lvl9pPr>
   </p:defaultTextStyle>
+  <p:extLst>
+    <p:ext uri="{EFAFB233-063F-42B5-8137-9DF3F51BA10A}">
+      <p15:sldGuideLst xmlns:p15="http://schemas.microsoft.com/office/powerpoint/2012/main"/>
+    </p:ext>
+  </p:extLst>
 </p:presentation>
 </file>
 
 <file path=ppt/revisionInfo.xml><?xml version="1.0" encoding="utf-8"?>
 <p1510:revInfo xmlns:a="http://schemas.openxmlformats.org/drawingml/2006/main" xmlns:r="http://schemas.openxmlformats.org/officeDocument/2006/relationships" xmlns:p1510="http://schemas.microsoft.com/office/powerpoint/2015/10/main">
   <p1510:revLst>
-    <p1510:client id="{2F841D68-50EA-48FE-B1C6-1A0B49E241EB}" v="55" dt="2024-05-27T11:06:06.108"/>
+    <p1510:client id="{2F841D68-50EA-48FE-B1C6-1A0B49E241EB}" v="71" dt="2024-05-27T14:23:23.008"/>
   </p1510:revLst>
 </p1510:revInfo>
 </file>
@@ -127,8 +134,8 @@
 <pc:chgInfo xmlns:a="http://schemas.openxmlformats.org/drawingml/2006/main" xmlns:r="http://schemas.openxmlformats.org/officeDocument/2006/relationships" xmlns:ac="http://schemas.microsoft.com/office/drawing/2013/main/command" xmlns:pc="http://schemas.microsoft.com/office/powerpoint/2013/main/command">
   <pc:docChgLst>
     <pc:chgData name="Richard Hunt" userId="a9b14997-caef-4159-8c34-0f67c79d0d7a" providerId="ADAL" clId="{2F841D68-50EA-48FE-B1C6-1A0B49E241EB}"/>
-    <pc:docChg chg="undo custSel addSld modSld sldOrd">
-      <pc:chgData name="Richard Hunt" userId="a9b14997-caef-4159-8c34-0f67c79d0d7a" providerId="ADAL" clId="{2F841D68-50EA-48FE-B1C6-1A0B49E241EB}" dt="2024-05-27T11:09:17.622" v="1440" actId="13822"/>
+    <pc:docChg chg="undo custSel addSld delSld modSld sldOrd">
+      <pc:chgData name="Richard Hunt" userId="a9b14997-caef-4159-8c34-0f67c79d0d7a" providerId="ADAL" clId="{2F841D68-50EA-48FE-B1C6-1A0B49E241EB}" dt="2024-05-27T14:23:26.022" v="1766" actId="1076"/>
       <pc:docMkLst>
         <pc:docMk/>
       </pc:docMkLst>
@@ -156,7 +163,7 @@
         </pc:spChg>
       </pc:sldChg>
       <pc:sldChg chg="addSp delSp modSp new mod ord modNotesTx">
-        <pc:chgData name="Richard Hunt" userId="a9b14997-caef-4159-8c34-0f67c79d0d7a" providerId="ADAL" clId="{2F841D68-50EA-48FE-B1C6-1A0B49E241EB}" dt="2024-05-27T11:09:17.622" v="1440" actId="13822"/>
+        <pc:chgData name="Richard Hunt" userId="a9b14997-caef-4159-8c34-0f67c79d0d7a" providerId="ADAL" clId="{2F841D68-50EA-48FE-B1C6-1A0B49E241EB}" dt="2024-05-27T14:04:12.346" v="1597" actId="20577"/>
         <pc:sldMkLst>
           <pc:docMk/>
           <pc:sldMk cId="878794900" sldId="257"/>
@@ -851,6 +858,371 @@
             <pc:docMk/>
             <pc:sldMk cId="1858058609" sldId="261"/>
             <ac:spMk id="7" creationId="{FB3B15E4-9EB5-864A-C72C-14CFB00EB19B}"/>
+          </ac:spMkLst>
+        </pc:spChg>
+      </pc:sldChg>
+      <pc:sldChg chg="new del">
+        <pc:chgData name="Richard Hunt" userId="a9b14997-caef-4159-8c34-0f67c79d0d7a" providerId="ADAL" clId="{2F841D68-50EA-48FE-B1C6-1A0B49E241EB}" dt="2024-05-27T13:56:39.516" v="1442" actId="47"/>
+        <pc:sldMkLst>
+          <pc:docMk/>
+          <pc:sldMk cId="1266840089" sldId="262"/>
+        </pc:sldMkLst>
+      </pc:sldChg>
+      <pc:sldChg chg="addSp delSp modSp add mod modNotesTx">
+        <pc:chgData name="Richard Hunt" userId="a9b14997-caef-4159-8c34-0f67c79d0d7a" providerId="ADAL" clId="{2F841D68-50EA-48FE-B1C6-1A0B49E241EB}" dt="2024-05-27T14:15:34.929" v="1687" actId="207"/>
+        <pc:sldMkLst>
+          <pc:docMk/>
+          <pc:sldMk cId="2972220020" sldId="262"/>
+        </pc:sldMkLst>
+        <pc:spChg chg="add mod">
+          <ac:chgData name="Richard Hunt" userId="a9b14997-caef-4159-8c34-0f67c79d0d7a" providerId="ADAL" clId="{2F841D68-50EA-48FE-B1C6-1A0B49E241EB}" dt="2024-05-27T14:15:34.929" v="1687" actId="207"/>
+          <ac:spMkLst>
+            <pc:docMk/>
+            <pc:sldMk cId="2972220020" sldId="262"/>
+            <ac:spMk id="2" creationId="{0F28A9F1-2AB7-8AB7-6D72-959C9A4726A8}"/>
+          </ac:spMkLst>
+        </pc:spChg>
+        <pc:spChg chg="add mod">
+          <ac:chgData name="Richard Hunt" userId="a9b14997-caef-4159-8c34-0f67c79d0d7a" providerId="ADAL" clId="{2F841D68-50EA-48FE-B1C6-1A0B49E241EB}" dt="2024-05-27T13:57:26.261" v="1457" actId="1076"/>
+          <ac:spMkLst>
+            <pc:docMk/>
+            <pc:sldMk cId="2972220020" sldId="262"/>
+            <ac:spMk id="3" creationId="{DA52FFA2-2583-9767-843E-FD79A1EED1E9}"/>
+          </ac:spMkLst>
+        </pc:spChg>
+        <pc:spChg chg="add mod">
+          <ac:chgData name="Richard Hunt" userId="a9b14997-caef-4159-8c34-0f67c79d0d7a" providerId="ADAL" clId="{2F841D68-50EA-48FE-B1C6-1A0B49E241EB}" dt="2024-05-27T14:15:34.929" v="1687" actId="207"/>
+          <ac:spMkLst>
+            <pc:docMk/>
+            <pc:sldMk cId="2972220020" sldId="262"/>
+            <ac:spMk id="6" creationId="{945E5452-F246-BECB-1FE0-45C99655FB75}"/>
+          </ac:spMkLst>
+        </pc:spChg>
+        <pc:spChg chg="add mod">
+          <ac:chgData name="Richard Hunt" userId="a9b14997-caef-4159-8c34-0f67c79d0d7a" providerId="ADAL" clId="{2F841D68-50EA-48FE-B1C6-1A0B49E241EB}" dt="2024-05-27T13:57:40.192" v="1467" actId="20577"/>
+          <ac:spMkLst>
+            <pc:docMk/>
+            <pc:sldMk cId="2972220020" sldId="262"/>
+            <ac:spMk id="7" creationId="{0445D9AF-BA7C-4B3D-A180-334807B5E036}"/>
+          </ac:spMkLst>
+        </pc:spChg>
+        <pc:spChg chg="add mod">
+          <ac:chgData name="Richard Hunt" userId="a9b14997-caef-4159-8c34-0f67c79d0d7a" providerId="ADAL" clId="{2F841D68-50EA-48FE-B1C6-1A0B49E241EB}" dt="2024-05-27T14:15:34.929" v="1687" actId="207"/>
+          <ac:spMkLst>
+            <pc:docMk/>
+            <pc:sldMk cId="2972220020" sldId="262"/>
+            <ac:spMk id="8" creationId="{A291E824-8F81-C1F2-79D6-7FA13A4B09F8}"/>
+          </ac:spMkLst>
+        </pc:spChg>
+        <pc:spChg chg="add mod">
+          <ac:chgData name="Richard Hunt" userId="a9b14997-caef-4159-8c34-0f67c79d0d7a" providerId="ADAL" clId="{2F841D68-50EA-48FE-B1C6-1A0B49E241EB}" dt="2024-05-27T13:57:42.906" v="1473" actId="20577"/>
+          <ac:spMkLst>
+            <pc:docMk/>
+            <pc:sldMk cId="2972220020" sldId="262"/>
+            <ac:spMk id="9" creationId="{9EA6504C-76E7-2F6D-91FA-556F5FD17453}"/>
+          </ac:spMkLst>
+        </pc:spChg>
+        <pc:spChg chg="del">
+          <ac:chgData name="Richard Hunt" userId="a9b14997-caef-4159-8c34-0f67c79d0d7a" providerId="ADAL" clId="{2F841D68-50EA-48FE-B1C6-1A0B49E241EB}" dt="2024-05-27T13:56:45.624" v="1444" actId="478"/>
+          <ac:spMkLst>
+            <pc:docMk/>
+            <pc:sldMk cId="2972220020" sldId="262"/>
+            <ac:spMk id="10" creationId="{3E7D7CC4-57CD-1540-BECC-984459222EE6}"/>
+          </ac:spMkLst>
+        </pc:spChg>
+        <pc:spChg chg="add mod">
+          <ac:chgData name="Richard Hunt" userId="a9b14997-caef-4159-8c34-0f67c79d0d7a" providerId="ADAL" clId="{2F841D68-50EA-48FE-B1C6-1A0B49E241EB}" dt="2024-05-27T14:15:34.929" v="1687" actId="207"/>
+          <ac:spMkLst>
+            <pc:docMk/>
+            <pc:sldMk cId="2972220020" sldId="262"/>
+            <ac:spMk id="11" creationId="{BB10843A-17B0-9576-99FA-2F48F0F793D6}"/>
+          </ac:spMkLst>
+        </pc:spChg>
+        <pc:spChg chg="add mod">
+          <ac:chgData name="Richard Hunt" userId="a9b14997-caef-4159-8c34-0f67c79d0d7a" providerId="ADAL" clId="{2F841D68-50EA-48FE-B1C6-1A0B49E241EB}" dt="2024-05-27T13:58:17.953" v="1484" actId="20577"/>
+          <ac:spMkLst>
+            <pc:docMk/>
+            <pc:sldMk cId="2972220020" sldId="262"/>
+            <ac:spMk id="12" creationId="{4D72EEE9-0A0E-64FC-4B14-667D8B1DACC6}"/>
+          </ac:spMkLst>
+        </pc:spChg>
+        <pc:spChg chg="add mod">
+          <ac:chgData name="Richard Hunt" userId="a9b14997-caef-4159-8c34-0f67c79d0d7a" providerId="ADAL" clId="{2F841D68-50EA-48FE-B1C6-1A0B49E241EB}" dt="2024-05-27T13:58:24.305" v="1486" actId="1076"/>
+          <ac:spMkLst>
+            <pc:docMk/>
+            <pc:sldMk cId="2972220020" sldId="262"/>
+            <ac:spMk id="13" creationId="{804E511A-BED5-F8DE-6348-ED0C7DBCF4CB}"/>
+          </ac:spMkLst>
+        </pc:spChg>
+        <pc:spChg chg="add mod">
+          <ac:chgData name="Richard Hunt" userId="a9b14997-caef-4159-8c34-0f67c79d0d7a" providerId="ADAL" clId="{2F841D68-50EA-48FE-B1C6-1A0B49E241EB}" dt="2024-05-27T13:58:27.872" v="1488" actId="1076"/>
+          <ac:spMkLst>
+            <pc:docMk/>
+            <pc:sldMk cId="2972220020" sldId="262"/>
+            <ac:spMk id="15" creationId="{2D3730A3-1052-6B17-5B0D-0C11D812B061}"/>
+          </ac:spMkLst>
+        </pc:spChg>
+        <pc:spChg chg="add mod">
+          <ac:chgData name="Richard Hunt" userId="a9b14997-caef-4159-8c34-0f67c79d0d7a" providerId="ADAL" clId="{2F841D68-50EA-48FE-B1C6-1A0B49E241EB}" dt="2024-05-27T13:58:31.687" v="1490" actId="1076"/>
+          <ac:spMkLst>
+            <pc:docMk/>
+            <pc:sldMk cId="2972220020" sldId="262"/>
+            <ac:spMk id="17" creationId="{C750E9C7-07A5-AB14-C0E0-8519C2E45E59}"/>
+          </ac:spMkLst>
+        </pc:spChg>
+        <pc:spChg chg="add mod">
+          <ac:chgData name="Richard Hunt" userId="a9b14997-caef-4159-8c34-0f67c79d0d7a" providerId="ADAL" clId="{2F841D68-50EA-48FE-B1C6-1A0B49E241EB}" dt="2024-05-27T13:58:45.450" v="1508" actId="20577"/>
+          <ac:spMkLst>
+            <pc:docMk/>
+            <pc:sldMk cId="2972220020" sldId="262"/>
+            <ac:spMk id="23" creationId="{A618DC03-F69F-A628-8DDB-0ACC1EABBC0F}"/>
+          </ac:spMkLst>
+        </pc:spChg>
+        <pc:spChg chg="del">
+          <ac:chgData name="Richard Hunt" userId="a9b14997-caef-4159-8c34-0f67c79d0d7a" providerId="ADAL" clId="{2F841D68-50EA-48FE-B1C6-1A0B49E241EB}" dt="2024-05-27T13:56:51.645" v="1445" actId="478"/>
+          <ac:spMkLst>
+            <pc:docMk/>
+            <pc:sldMk cId="2972220020" sldId="262"/>
+            <ac:spMk id="24" creationId="{730EA3DC-B876-BFB6-49D8-96D90349D318}"/>
+          </ac:spMkLst>
+        </pc:spChg>
+        <pc:spChg chg="del">
+          <ac:chgData name="Richard Hunt" userId="a9b14997-caef-4159-8c34-0f67c79d0d7a" providerId="ADAL" clId="{2F841D68-50EA-48FE-B1C6-1A0B49E241EB}" dt="2024-05-27T13:56:51.645" v="1445" actId="478"/>
+          <ac:spMkLst>
+            <pc:docMk/>
+            <pc:sldMk cId="2972220020" sldId="262"/>
+            <ac:spMk id="25" creationId="{42CC87BC-4EFC-8AA7-0ADA-73D8B0330E6B}"/>
+          </ac:spMkLst>
+        </pc:spChg>
+        <pc:spChg chg="del">
+          <ac:chgData name="Richard Hunt" userId="a9b14997-caef-4159-8c34-0f67c79d0d7a" providerId="ADAL" clId="{2F841D68-50EA-48FE-B1C6-1A0B49E241EB}" dt="2024-05-27T13:56:51.645" v="1445" actId="478"/>
+          <ac:spMkLst>
+            <pc:docMk/>
+            <pc:sldMk cId="2972220020" sldId="262"/>
+            <ac:spMk id="26" creationId="{516E0D0B-1B49-60B9-E9EC-F0AE13A1A4F3}"/>
+          </ac:spMkLst>
+        </pc:spChg>
+        <pc:spChg chg="del">
+          <ac:chgData name="Richard Hunt" userId="a9b14997-caef-4159-8c34-0f67c79d0d7a" providerId="ADAL" clId="{2F841D68-50EA-48FE-B1C6-1A0B49E241EB}" dt="2024-05-27T13:56:51.645" v="1445" actId="478"/>
+          <ac:spMkLst>
+            <pc:docMk/>
+            <pc:sldMk cId="2972220020" sldId="262"/>
+            <ac:spMk id="27" creationId="{DD1370DC-5E45-4B5B-2533-C434696B5166}"/>
+          </ac:spMkLst>
+        </pc:spChg>
+        <pc:spChg chg="del">
+          <ac:chgData name="Richard Hunt" userId="a9b14997-caef-4159-8c34-0f67c79d0d7a" providerId="ADAL" clId="{2F841D68-50EA-48FE-B1C6-1A0B49E241EB}" dt="2024-05-27T13:56:51.645" v="1445" actId="478"/>
+          <ac:spMkLst>
+            <pc:docMk/>
+            <pc:sldMk cId="2972220020" sldId="262"/>
+            <ac:spMk id="28" creationId="{BE679161-599A-DB8D-4C5B-D5C3431000A7}"/>
+          </ac:spMkLst>
+        </pc:spChg>
+        <pc:spChg chg="del">
+          <ac:chgData name="Richard Hunt" userId="a9b14997-caef-4159-8c34-0f67c79d0d7a" providerId="ADAL" clId="{2F841D68-50EA-48FE-B1C6-1A0B49E241EB}" dt="2024-05-27T13:56:51.645" v="1445" actId="478"/>
+          <ac:spMkLst>
+            <pc:docMk/>
+            <pc:sldMk cId="2972220020" sldId="262"/>
+            <ac:spMk id="29" creationId="{1FA3B074-3FB1-626B-BAEB-456095EE9A79}"/>
+          </ac:spMkLst>
+        </pc:spChg>
+        <pc:spChg chg="del">
+          <ac:chgData name="Richard Hunt" userId="a9b14997-caef-4159-8c34-0f67c79d0d7a" providerId="ADAL" clId="{2F841D68-50EA-48FE-B1C6-1A0B49E241EB}" dt="2024-05-27T13:56:51.645" v="1445" actId="478"/>
+          <ac:spMkLst>
+            <pc:docMk/>
+            <pc:sldMk cId="2972220020" sldId="262"/>
+            <ac:spMk id="30" creationId="{DA82300E-ED43-6791-FA43-99B6C7C9C230}"/>
+          </ac:spMkLst>
+        </pc:spChg>
+        <pc:spChg chg="del">
+          <ac:chgData name="Richard Hunt" userId="a9b14997-caef-4159-8c34-0f67c79d0d7a" providerId="ADAL" clId="{2F841D68-50EA-48FE-B1C6-1A0B49E241EB}" dt="2024-05-27T13:56:51.645" v="1445" actId="478"/>
+          <ac:spMkLst>
+            <pc:docMk/>
+            <pc:sldMk cId="2972220020" sldId="262"/>
+            <ac:spMk id="31" creationId="{C80249B7-C819-4D25-A406-6B45A86FBEE5}"/>
+          </ac:spMkLst>
+        </pc:spChg>
+        <pc:spChg chg="add mod">
+          <ac:chgData name="Richard Hunt" userId="a9b14997-caef-4159-8c34-0f67c79d0d7a" providerId="ADAL" clId="{2F841D68-50EA-48FE-B1C6-1A0B49E241EB}" dt="2024-05-27T13:58:50.863" v="1510" actId="1076"/>
+          <ac:spMkLst>
+            <pc:docMk/>
+            <pc:sldMk cId="2972220020" sldId="262"/>
+            <ac:spMk id="33" creationId="{604CDADF-7C64-15E4-9D01-3AE8907A530B}"/>
+          </ac:spMkLst>
+        </pc:spChg>
+        <pc:spChg chg="del">
+          <ac:chgData name="Richard Hunt" userId="a9b14997-caef-4159-8c34-0f67c79d0d7a" providerId="ADAL" clId="{2F841D68-50EA-48FE-B1C6-1A0B49E241EB}" dt="2024-05-27T13:56:51.645" v="1445" actId="478"/>
+          <ac:spMkLst>
+            <pc:docMk/>
+            <pc:sldMk cId="2972220020" sldId="262"/>
+            <ac:spMk id="35" creationId="{21A9D11E-154D-3DAD-77EE-D75AC25C80D1}"/>
+          </ac:spMkLst>
+        </pc:spChg>
+        <pc:spChg chg="del">
+          <ac:chgData name="Richard Hunt" userId="a9b14997-caef-4159-8c34-0f67c79d0d7a" providerId="ADAL" clId="{2F841D68-50EA-48FE-B1C6-1A0B49E241EB}" dt="2024-05-27T13:56:51.645" v="1445" actId="478"/>
+          <ac:spMkLst>
+            <pc:docMk/>
+            <pc:sldMk cId="2972220020" sldId="262"/>
+            <ac:spMk id="36" creationId="{6C7B793A-92F2-4CF9-A63B-7F70DB62B37E}"/>
+          </ac:spMkLst>
+        </pc:spChg>
+        <pc:spChg chg="del">
+          <ac:chgData name="Richard Hunt" userId="a9b14997-caef-4159-8c34-0f67c79d0d7a" providerId="ADAL" clId="{2F841D68-50EA-48FE-B1C6-1A0B49E241EB}" dt="2024-05-27T13:56:51.645" v="1445" actId="478"/>
+          <ac:spMkLst>
+            <pc:docMk/>
+            <pc:sldMk cId="2972220020" sldId="262"/>
+            <ac:spMk id="37" creationId="{D44D6563-457D-2337-4E9E-47EB6AE10F74}"/>
+          </ac:spMkLst>
+        </pc:spChg>
+        <pc:spChg chg="del">
+          <ac:chgData name="Richard Hunt" userId="a9b14997-caef-4159-8c34-0f67c79d0d7a" providerId="ADAL" clId="{2F841D68-50EA-48FE-B1C6-1A0B49E241EB}" dt="2024-05-27T13:56:51.645" v="1445" actId="478"/>
+          <ac:spMkLst>
+            <pc:docMk/>
+            <pc:sldMk cId="2972220020" sldId="262"/>
+            <ac:spMk id="38" creationId="{342E2A1E-C174-222B-B180-357469AC8252}"/>
+          </ac:spMkLst>
+        </pc:spChg>
+        <pc:spChg chg="del">
+          <ac:chgData name="Richard Hunt" userId="a9b14997-caef-4159-8c34-0f67c79d0d7a" providerId="ADAL" clId="{2F841D68-50EA-48FE-B1C6-1A0B49E241EB}" dt="2024-05-27T13:56:51.645" v="1445" actId="478"/>
+          <ac:spMkLst>
+            <pc:docMk/>
+            <pc:sldMk cId="2972220020" sldId="262"/>
+            <ac:spMk id="39" creationId="{38F93D5B-23D2-9D7A-4B83-F62D01799468}"/>
+          </ac:spMkLst>
+        </pc:spChg>
+        <pc:spChg chg="add mod">
+          <ac:chgData name="Richard Hunt" userId="a9b14997-caef-4159-8c34-0f67c79d0d7a" providerId="ADAL" clId="{2F841D68-50EA-48FE-B1C6-1A0B49E241EB}" dt="2024-05-27T13:58:56.926" v="1513" actId="1076"/>
+          <ac:spMkLst>
+            <pc:docMk/>
+            <pc:sldMk cId="2972220020" sldId="262"/>
+            <ac:spMk id="40" creationId="{C1D5A2AF-45DE-9202-9B23-3855128668DA}"/>
+          </ac:spMkLst>
+        </pc:spChg>
+        <pc:spChg chg="add mod">
+          <ac:chgData name="Richard Hunt" userId="a9b14997-caef-4159-8c34-0f67c79d0d7a" providerId="ADAL" clId="{2F841D68-50EA-48FE-B1C6-1A0B49E241EB}" dt="2024-05-27T13:59:03.640" v="1515" actId="1076"/>
+          <ac:spMkLst>
+            <pc:docMk/>
+            <pc:sldMk cId="2972220020" sldId="262"/>
+            <ac:spMk id="41" creationId="{AFECFE62-1184-BFE4-0648-7F78686566A0}"/>
+          </ac:spMkLst>
+        </pc:spChg>
+        <pc:spChg chg="del">
+          <ac:chgData name="Richard Hunt" userId="a9b14997-caef-4159-8c34-0f67c79d0d7a" providerId="ADAL" clId="{2F841D68-50EA-48FE-B1C6-1A0B49E241EB}" dt="2024-05-27T13:56:51.645" v="1445" actId="478"/>
+          <ac:spMkLst>
+            <pc:docMk/>
+            <pc:sldMk cId="2972220020" sldId="262"/>
+            <ac:spMk id="48" creationId="{F8C646E3-F4E7-C3D2-9DCC-DA17C29E86F1}"/>
+          </ac:spMkLst>
+        </pc:spChg>
+        <pc:spChg chg="del">
+          <ac:chgData name="Richard Hunt" userId="a9b14997-caef-4159-8c34-0f67c79d0d7a" providerId="ADAL" clId="{2F841D68-50EA-48FE-B1C6-1A0B49E241EB}" dt="2024-05-27T13:56:51.645" v="1445" actId="478"/>
+          <ac:spMkLst>
+            <pc:docMk/>
+            <pc:sldMk cId="2972220020" sldId="262"/>
+            <ac:spMk id="49" creationId="{3FF35C80-393D-3A4E-E12A-8BE421331108}"/>
+          </ac:spMkLst>
+        </pc:spChg>
+        <pc:spChg chg="del">
+          <ac:chgData name="Richard Hunt" userId="a9b14997-caef-4159-8c34-0f67c79d0d7a" providerId="ADAL" clId="{2F841D68-50EA-48FE-B1C6-1A0B49E241EB}" dt="2024-05-27T13:56:51.645" v="1445" actId="478"/>
+          <ac:spMkLst>
+            <pc:docMk/>
+            <pc:sldMk cId="2972220020" sldId="262"/>
+            <ac:spMk id="50" creationId="{C37D01CF-1FA2-ABC9-E01F-E45CEEAF70CD}"/>
+          </ac:spMkLst>
+        </pc:spChg>
+      </pc:sldChg>
+      <pc:sldChg chg="addSp delSp modSp new mod modNotesTx">
+        <pc:chgData name="Richard Hunt" userId="a9b14997-caef-4159-8c34-0f67c79d0d7a" providerId="ADAL" clId="{2F841D68-50EA-48FE-B1C6-1A0B49E241EB}" dt="2024-05-27T14:23:26.022" v="1766" actId="1076"/>
+        <pc:sldMkLst>
+          <pc:docMk/>
+          <pc:sldMk cId="426601687" sldId="263"/>
+        </pc:sldMkLst>
+        <pc:spChg chg="del">
+          <ac:chgData name="Richard Hunt" userId="a9b14997-caef-4159-8c34-0f67c79d0d7a" providerId="ADAL" clId="{2F841D68-50EA-48FE-B1C6-1A0B49E241EB}" dt="2024-05-27T14:22:06.711" v="1689" actId="478"/>
+          <ac:spMkLst>
+            <pc:docMk/>
+            <pc:sldMk cId="426601687" sldId="263"/>
+            <ac:spMk id="2" creationId="{805A9EDB-AEA3-92E0-091B-2FE3AFFA8333}"/>
+          </ac:spMkLst>
+        </pc:spChg>
+        <pc:spChg chg="del">
+          <ac:chgData name="Richard Hunt" userId="a9b14997-caef-4159-8c34-0f67c79d0d7a" providerId="ADAL" clId="{2F841D68-50EA-48FE-B1C6-1A0B49E241EB}" dt="2024-05-27T14:22:06.711" v="1689" actId="478"/>
+          <ac:spMkLst>
+            <pc:docMk/>
+            <pc:sldMk cId="426601687" sldId="263"/>
+            <ac:spMk id="3" creationId="{7E4FA476-62B7-9B3C-6867-8D955A6C6C40}"/>
+          </ac:spMkLst>
+        </pc:spChg>
+        <pc:spChg chg="add mod">
+          <ac:chgData name="Richard Hunt" userId="a9b14997-caef-4159-8c34-0f67c79d0d7a" providerId="ADAL" clId="{2F841D68-50EA-48FE-B1C6-1A0B49E241EB}" dt="2024-05-27T14:22:36.584" v="1741" actId="207"/>
+          <ac:spMkLst>
+            <pc:docMk/>
+            <pc:sldMk cId="426601687" sldId="263"/>
+            <ac:spMk id="4" creationId="{AE96A136-589B-FF96-8B0D-9907D65CB441}"/>
+          </ac:spMkLst>
+        </pc:spChg>
+        <pc:spChg chg="add del mod">
+          <ac:chgData name="Richard Hunt" userId="a9b14997-caef-4159-8c34-0f67c79d0d7a" providerId="ADAL" clId="{2F841D68-50EA-48FE-B1C6-1A0B49E241EB}" dt="2024-05-27T14:22:43.214" v="1745"/>
+          <ac:spMkLst>
+            <pc:docMk/>
+            <pc:sldMk cId="426601687" sldId="263"/>
+            <ac:spMk id="5" creationId="{DAC6C961-E417-31FB-0445-5257EE00C74C}"/>
+          </ac:spMkLst>
+        </pc:spChg>
+        <pc:spChg chg="add mod">
+          <ac:chgData name="Richard Hunt" userId="a9b14997-caef-4159-8c34-0f67c79d0d7a" providerId="ADAL" clId="{2F841D68-50EA-48FE-B1C6-1A0B49E241EB}" dt="2024-05-27T14:23:00.331" v="1747" actId="1076"/>
+          <ac:spMkLst>
+            <pc:docMk/>
+            <pc:sldMk cId="426601687" sldId="263"/>
+            <ac:spMk id="6" creationId="{24ACFB12-C587-3A6C-5882-8824A4E2749D}"/>
+          </ac:spMkLst>
+        </pc:spChg>
+        <pc:spChg chg="add mod">
+          <ac:chgData name="Richard Hunt" userId="a9b14997-caef-4159-8c34-0f67c79d0d7a" providerId="ADAL" clId="{2F841D68-50EA-48FE-B1C6-1A0B49E241EB}" dt="2024-05-27T14:23:00.331" v="1747" actId="1076"/>
+          <ac:spMkLst>
+            <pc:docMk/>
+            <pc:sldMk cId="426601687" sldId="263"/>
+            <ac:spMk id="7" creationId="{E75BA621-A12A-5968-987F-9E918DF31682}"/>
+          </ac:spMkLst>
+        </pc:spChg>
+        <pc:spChg chg="add mod">
+          <ac:chgData name="Richard Hunt" userId="a9b14997-caef-4159-8c34-0f67c79d0d7a" providerId="ADAL" clId="{2F841D68-50EA-48FE-B1C6-1A0B49E241EB}" dt="2024-05-27T14:23:00.331" v="1747" actId="1076"/>
+          <ac:spMkLst>
+            <pc:docMk/>
+            <pc:sldMk cId="426601687" sldId="263"/>
+            <ac:spMk id="8" creationId="{C5F6FD09-EF03-1705-F4D7-D78F33291351}"/>
+          </ac:spMkLst>
+        </pc:spChg>
+        <pc:spChg chg="add mod">
+          <ac:chgData name="Richard Hunt" userId="a9b14997-caef-4159-8c34-0f67c79d0d7a" providerId="ADAL" clId="{2F841D68-50EA-48FE-B1C6-1A0B49E241EB}" dt="2024-05-27T14:23:00.331" v="1747" actId="1076"/>
+          <ac:spMkLst>
+            <pc:docMk/>
+            <pc:sldMk cId="426601687" sldId="263"/>
+            <ac:spMk id="9" creationId="{BF7BB148-1C56-0125-A23D-D8EFF055E754}"/>
+          </ac:spMkLst>
+        </pc:spChg>
+        <pc:spChg chg="add mod">
+          <ac:chgData name="Richard Hunt" userId="a9b14997-caef-4159-8c34-0f67c79d0d7a" providerId="ADAL" clId="{2F841D68-50EA-48FE-B1C6-1A0B49E241EB}" dt="2024-05-27T14:23:00.331" v="1747" actId="1076"/>
+          <ac:spMkLst>
+            <pc:docMk/>
+            <pc:sldMk cId="426601687" sldId="263"/>
+            <ac:spMk id="10" creationId="{A476F39A-2334-5851-0730-215791FF4A27}"/>
+          </ac:spMkLst>
+        </pc:spChg>
+        <pc:spChg chg="add mod">
+          <ac:chgData name="Richard Hunt" userId="a9b14997-caef-4159-8c34-0f67c79d0d7a" providerId="ADAL" clId="{2F841D68-50EA-48FE-B1C6-1A0B49E241EB}" dt="2024-05-27T14:23:18.024" v="1764" actId="1076"/>
+          <ac:spMkLst>
+            <pc:docMk/>
+            <pc:sldMk cId="426601687" sldId="263"/>
+            <ac:spMk id="11" creationId="{4946C8AF-02D3-6C50-E216-ED3BDC263151}"/>
+          </ac:spMkLst>
+        </pc:spChg>
+        <pc:spChg chg="add mod">
+          <ac:chgData name="Richard Hunt" userId="a9b14997-caef-4159-8c34-0f67c79d0d7a" providerId="ADAL" clId="{2F841D68-50EA-48FE-B1C6-1A0B49E241EB}" dt="2024-05-27T14:23:26.022" v="1766" actId="1076"/>
+          <ac:spMkLst>
+            <pc:docMk/>
+            <pc:sldMk cId="426601687" sldId="263"/>
+            <ac:spMk id="12" creationId="{7C68ACF9-7447-93CB-B943-B78E91EC7E59}"/>
           </ac:spMkLst>
         </pc:spChg>
       </pc:sldChg>
@@ -1372,37 +1744,7 @@
           <a:p>
             <a:r>
               <a:rPr lang="en-GB" dirty="0"/>
-              <a:t>Balanced and simple wireframe.</a:t>
-            </a:r>
-          </a:p>
-          <a:p>
-            <a:r>
-              <a:rPr lang="en-GB" dirty="0"/>
-              <a:t>Main content in centre of page to focus the user.</a:t>
-            </a:r>
-          </a:p>
-          <a:p>
-            <a:r>
-              <a:rPr lang="en-GB" dirty="0"/>
-              <a:t>Logo top left.</a:t>
-            </a:r>
-          </a:p>
-          <a:p>
-            <a:r>
-              <a:rPr lang="en-GB" dirty="0"/>
-              <a:t>The Main Menu in the centre.</a:t>
-            </a:r>
-          </a:p>
-          <a:p>
-            <a:r>
-              <a:rPr lang="en-GB" dirty="0"/>
-              <a:t>Sub navigation within individual pages.</a:t>
-            </a:r>
-          </a:p>
-          <a:p>
-            <a:r>
-              <a:rPr lang="en-GB" dirty="0"/>
-              <a:t>Details section to display details for example, file explorer or instructions.</a:t>
+              <a:t>More traditional layout with test viewed in database format.</a:t>
             </a:r>
           </a:p>
         </p:txBody>
@@ -1434,6 +1776,186 @@
     <p:extLst>
       <p:ext uri="{BB962C8B-B14F-4D97-AF65-F5344CB8AC3E}">
         <p14:creationId xmlns:p14="http://schemas.microsoft.com/office/powerpoint/2010/main" val="918979533"/>
+      </p:ext>
+    </p:extLst>
+  </p:cSld>
+  <p:clrMapOvr>
+    <a:masterClrMapping/>
+  </p:clrMapOvr>
+</p:notes>
+</file>
+
+<file path=ppt/notesSlides/notesSlide3.xml><?xml version="1.0" encoding="utf-8"?>
+<p:notes xmlns:a="http://schemas.openxmlformats.org/drawingml/2006/main" xmlns:r="http://schemas.openxmlformats.org/officeDocument/2006/relationships" xmlns:p="http://schemas.openxmlformats.org/presentationml/2006/main">
+  <p:cSld>
+    <p:spTree>
+      <p:nvGrpSpPr>
+        <p:cNvPr id="1" name=""/>
+        <p:cNvGrpSpPr/>
+        <p:nvPr/>
+      </p:nvGrpSpPr>
+      <p:grpSpPr>
+        <a:xfrm>
+          <a:off x="0" y="0"/>
+          <a:ext cx="0" cy="0"/>
+          <a:chOff x="0" y="0"/>
+          <a:chExt cx="0" cy="0"/>
+        </a:xfrm>
+      </p:grpSpPr>
+      <p:sp>
+        <p:nvSpPr>
+          <p:cNvPr id="2" name="Slide Image Placeholder 1"/>
+          <p:cNvSpPr>
+            <a:spLocks noGrp="1" noRot="1" noChangeAspect="1"/>
+          </p:cNvSpPr>
+          <p:nvPr>
+            <p:ph type="sldImg"/>
+          </p:nvPr>
+        </p:nvSpPr>
+        <p:spPr/>
+      </p:sp>
+      <p:sp>
+        <p:nvSpPr>
+          <p:cNvPr id="3" name="Notes Placeholder 2"/>
+          <p:cNvSpPr>
+            <a:spLocks noGrp="1"/>
+          </p:cNvSpPr>
+          <p:nvPr>
+            <p:ph type="body" idx="1"/>
+          </p:nvPr>
+        </p:nvSpPr>
+        <p:spPr/>
+        <p:txBody>
+          <a:bodyPr/>
+          <a:lstStyle/>
+          <a:p>
+            <a:r>
+              <a:rPr lang="en-GB" dirty="0"/>
+              <a:t>Kanban style layout.</a:t>
+            </a:r>
+          </a:p>
+          <a:p>
+            <a:r>
+              <a:rPr lang="en-GB" dirty="0"/>
+              <a:t>Initially will not be customisable, but will expand later.</a:t>
+            </a:r>
+          </a:p>
+        </p:txBody>
+      </p:sp>
+      <p:sp>
+        <p:nvSpPr>
+          <p:cNvPr id="4" name="Slide Number Placeholder 3"/>
+          <p:cNvSpPr>
+            <a:spLocks noGrp="1"/>
+          </p:cNvSpPr>
+          <p:nvPr>
+            <p:ph type="sldNum" sz="quarter" idx="5"/>
+          </p:nvPr>
+        </p:nvSpPr>
+        <p:spPr/>
+        <p:txBody>
+          <a:bodyPr/>
+          <a:lstStyle/>
+          <a:p>
+            <a:fld id="{B242A1B3-6A01-4B36-BDA3-3E4B749809F9}" type="slidenum">
+              <a:rPr lang="en-GB" smtClean="0"/>
+              <a:t>7</a:t>
+            </a:fld>
+            <a:endParaRPr lang="en-GB"/>
+          </a:p>
+        </p:txBody>
+      </p:sp>
+    </p:spTree>
+    <p:extLst>
+      <p:ext uri="{BB962C8B-B14F-4D97-AF65-F5344CB8AC3E}">
+        <p14:creationId xmlns:p14="http://schemas.microsoft.com/office/powerpoint/2010/main" val="532760498"/>
+      </p:ext>
+    </p:extLst>
+  </p:cSld>
+  <p:clrMapOvr>
+    <a:masterClrMapping/>
+  </p:clrMapOvr>
+</p:notes>
+</file>
+
+<file path=ppt/notesSlides/notesSlide4.xml><?xml version="1.0" encoding="utf-8"?>
+<p:notes xmlns:a="http://schemas.openxmlformats.org/drawingml/2006/main" xmlns:r="http://schemas.openxmlformats.org/officeDocument/2006/relationships" xmlns:p="http://schemas.openxmlformats.org/presentationml/2006/main">
+  <p:cSld>
+    <p:spTree>
+      <p:nvGrpSpPr>
+        <p:cNvPr id="1" name=""/>
+        <p:cNvGrpSpPr/>
+        <p:nvPr/>
+      </p:nvGrpSpPr>
+      <p:grpSpPr>
+        <a:xfrm>
+          <a:off x="0" y="0"/>
+          <a:ext cx="0" cy="0"/>
+          <a:chOff x="0" y="0"/>
+          <a:chExt cx="0" cy="0"/>
+        </a:xfrm>
+      </p:grpSpPr>
+      <p:sp>
+        <p:nvSpPr>
+          <p:cNvPr id="2" name="Slide Image Placeholder 1"/>
+          <p:cNvSpPr>
+            <a:spLocks noGrp="1" noRot="1" noChangeAspect="1"/>
+          </p:cNvSpPr>
+          <p:nvPr>
+            <p:ph type="sldImg"/>
+          </p:nvPr>
+        </p:nvSpPr>
+        <p:spPr/>
+      </p:sp>
+      <p:sp>
+        <p:nvSpPr>
+          <p:cNvPr id="3" name="Notes Placeholder 2"/>
+          <p:cNvSpPr>
+            <a:spLocks noGrp="1"/>
+          </p:cNvSpPr>
+          <p:nvPr>
+            <p:ph type="body" idx="1"/>
+          </p:nvPr>
+        </p:nvSpPr>
+        <p:spPr/>
+        <p:txBody>
+          <a:bodyPr/>
+          <a:lstStyle/>
+          <a:p>
+            <a:r>
+              <a:rPr lang="en-GB" dirty="0"/>
+              <a:t>Preview of test card when fully opened.</a:t>
+            </a:r>
+          </a:p>
+        </p:txBody>
+      </p:sp>
+      <p:sp>
+        <p:nvSpPr>
+          <p:cNvPr id="4" name="Slide Number Placeholder 3"/>
+          <p:cNvSpPr>
+            <a:spLocks noGrp="1"/>
+          </p:cNvSpPr>
+          <p:nvPr>
+            <p:ph type="sldNum" sz="quarter" idx="5"/>
+          </p:nvPr>
+        </p:nvSpPr>
+        <p:spPr/>
+        <p:txBody>
+          <a:bodyPr/>
+          <a:lstStyle/>
+          <a:p>
+            <a:fld id="{B242A1B3-6A01-4B36-BDA3-3E4B749809F9}" type="slidenum">
+              <a:rPr lang="en-GB" smtClean="0"/>
+              <a:t>8</a:t>
+            </a:fld>
+            <a:endParaRPr lang="en-GB"/>
+          </a:p>
+        </p:txBody>
+      </p:sp>
+    </p:spTree>
+    <p:extLst>
+      <p:ext uri="{BB962C8B-B14F-4D97-AF65-F5344CB8AC3E}">
+        <p14:creationId xmlns:p14="http://schemas.microsoft.com/office/powerpoint/2010/main" val="1938118816"/>
       </p:ext>
     </p:extLst>
   </p:cSld>
@@ -7800,6 +8322,1518 @@
     <p:extLst>
       <p:ext uri="{BB962C8B-B14F-4D97-AF65-F5344CB8AC3E}">
         <p14:creationId xmlns:p14="http://schemas.microsoft.com/office/powerpoint/2010/main" val="878794900"/>
+      </p:ext>
+    </p:extLst>
+  </p:cSld>
+  <p:clrMapOvr>
+    <a:masterClrMapping/>
+  </p:clrMapOvr>
+</p:sld>
+</file>
+
+<file path=ppt/slides/slide7.xml><?xml version="1.0" encoding="utf-8"?>
+<p:sld xmlns:a="http://schemas.openxmlformats.org/drawingml/2006/main" xmlns:r="http://schemas.openxmlformats.org/officeDocument/2006/relationships" xmlns:p="http://schemas.openxmlformats.org/presentationml/2006/main">
+  <p:cSld>
+    <p:spTree>
+      <p:nvGrpSpPr>
+        <p:cNvPr id="1" name=""/>
+        <p:cNvGrpSpPr/>
+        <p:nvPr/>
+      </p:nvGrpSpPr>
+      <p:grpSpPr>
+        <a:xfrm>
+          <a:off x="0" y="0"/>
+          <a:ext cx="0" cy="0"/>
+          <a:chOff x="0" y="0"/>
+          <a:chExt cx="0" cy="0"/>
+        </a:xfrm>
+      </p:grpSpPr>
+      <p:sp>
+        <p:nvSpPr>
+          <p:cNvPr id="4" name="Rectangle 3">
+            <a:extLst>
+              <a:ext uri="{FF2B5EF4-FFF2-40B4-BE49-F238E27FC236}">
+                <a16:creationId xmlns:a16="http://schemas.microsoft.com/office/drawing/2014/main" id="{10B77727-9652-23A4-24FF-05D16354CCD4}"/>
+              </a:ext>
+            </a:extLst>
+          </p:cNvPr>
+          <p:cNvSpPr/>
+          <p:nvPr/>
+        </p:nvSpPr>
+        <p:spPr>
+          <a:xfrm>
+            <a:off x="0" y="776639"/>
+            <a:ext cx="2553419" cy="6012611"/>
+          </a:xfrm>
+          <a:prstGeom prst="rect">
+            <a:avLst/>
+          </a:prstGeom>
+          <a:solidFill>
+            <a:schemeClr val="accent3">
+              <a:lumMod val="20000"/>
+              <a:lumOff val="80000"/>
+            </a:schemeClr>
+          </a:solidFill>
+          <a:ln>
+            <a:noFill/>
+          </a:ln>
+        </p:spPr>
+        <p:style>
+          <a:lnRef idx="2">
+            <a:schemeClr val="dk1"/>
+          </a:lnRef>
+          <a:fillRef idx="1">
+            <a:schemeClr val="lt1"/>
+          </a:fillRef>
+          <a:effectRef idx="0">
+            <a:schemeClr val="dk1"/>
+          </a:effectRef>
+          <a:fontRef idx="minor">
+            <a:schemeClr val="dk1"/>
+          </a:fontRef>
+        </p:style>
+        <p:txBody>
+          <a:bodyPr rtlCol="0" anchor="ctr"/>
+          <a:lstStyle/>
+          <a:p>
+            <a:pPr algn="ctr"/>
+            <a:endParaRPr lang="en-GB" dirty="0"/>
+          </a:p>
+        </p:txBody>
+      </p:sp>
+      <p:sp>
+        <p:nvSpPr>
+          <p:cNvPr id="5" name="Rectangle 4">
+            <a:extLst>
+              <a:ext uri="{FF2B5EF4-FFF2-40B4-BE49-F238E27FC236}">
+                <a16:creationId xmlns:a16="http://schemas.microsoft.com/office/drawing/2014/main" id="{FBA14980-54E1-FC65-23FA-C86C15A4048A}"/>
+              </a:ext>
+            </a:extLst>
+          </p:cNvPr>
+          <p:cNvSpPr/>
+          <p:nvPr/>
+        </p:nvSpPr>
+        <p:spPr>
+          <a:xfrm>
+            <a:off x="1" y="0"/>
+            <a:ext cx="12191996" cy="845389"/>
+          </a:xfrm>
+          <a:prstGeom prst="rect">
+            <a:avLst/>
+          </a:prstGeom>
+          <a:solidFill>
+            <a:schemeClr val="accent6">
+              <a:lumMod val="40000"/>
+              <a:lumOff val="60000"/>
+            </a:schemeClr>
+          </a:solidFill>
+          <a:ln>
+            <a:noFill/>
+          </a:ln>
+        </p:spPr>
+        <p:style>
+          <a:lnRef idx="2">
+            <a:schemeClr val="dk1"/>
+          </a:lnRef>
+          <a:fillRef idx="1">
+            <a:schemeClr val="lt1"/>
+          </a:fillRef>
+          <a:effectRef idx="0">
+            <a:schemeClr val="dk1"/>
+          </a:effectRef>
+          <a:fontRef idx="minor">
+            <a:schemeClr val="dk1"/>
+          </a:fontRef>
+        </p:style>
+        <p:txBody>
+          <a:bodyPr rtlCol="0" anchor="ctr"/>
+          <a:lstStyle/>
+          <a:p>
+            <a:pPr algn="ctr"/>
+            <a:endParaRPr lang="en-GB" dirty="0"/>
+          </a:p>
+        </p:txBody>
+      </p:sp>
+      <p:sp>
+        <p:nvSpPr>
+          <p:cNvPr id="14" name="Isosceles Triangle 13">
+            <a:extLst>
+              <a:ext uri="{FF2B5EF4-FFF2-40B4-BE49-F238E27FC236}">
+                <a16:creationId xmlns:a16="http://schemas.microsoft.com/office/drawing/2014/main" id="{45040EE3-3264-9156-031B-EDED61A30E7D}"/>
+              </a:ext>
+            </a:extLst>
+          </p:cNvPr>
+          <p:cNvSpPr/>
+          <p:nvPr/>
+        </p:nvSpPr>
+        <p:spPr>
+          <a:xfrm>
+            <a:off x="3" y="-1"/>
+            <a:ext cx="2553416" cy="845387"/>
+          </a:xfrm>
+          <a:prstGeom prst="triangle">
+            <a:avLst>
+              <a:gd name="adj" fmla="val 0"/>
+            </a:avLst>
+          </a:prstGeom>
+          <a:solidFill>
+            <a:schemeClr val="accent3">
+              <a:lumMod val="20000"/>
+              <a:lumOff val="80000"/>
+            </a:schemeClr>
+          </a:solidFill>
+          <a:ln>
+            <a:noFill/>
+          </a:ln>
+        </p:spPr>
+        <p:style>
+          <a:lnRef idx="2">
+            <a:schemeClr val="accent1">
+              <a:shade val="15000"/>
+            </a:schemeClr>
+          </a:lnRef>
+          <a:fillRef idx="1">
+            <a:schemeClr val="accent1"/>
+          </a:fillRef>
+          <a:effectRef idx="0">
+            <a:schemeClr val="accent1"/>
+          </a:effectRef>
+          <a:fontRef idx="minor">
+            <a:schemeClr val="lt1"/>
+          </a:fontRef>
+        </p:style>
+        <p:txBody>
+          <a:bodyPr rtlCol="0" anchor="ctr"/>
+          <a:lstStyle/>
+          <a:p>
+            <a:pPr algn="ctr"/>
+            <a:endParaRPr lang="en-GB" sz="1200"/>
+          </a:p>
+        </p:txBody>
+      </p:sp>
+      <p:sp>
+        <p:nvSpPr>
+          <p:cNvPr id="16" name="TextBox 15">
+            <a:extLst>
+              <a:ext uri="{FF2B5EF4-FFF2-40B4-BE49-F238E27FC236}">
+                <a16:creationId xmlns:a16="http://schemas.microsoft.com/office/drawing/2014/main" id="{F72DF64D-CF47-B32F-A7D5-9E0C8B68513B}"/>
+              </a:ext>
+            </a:extLst>
+          </p:cNvPr>
+          <p:cNvSpPr txBox="1"/>
+          <p:nvPr/>
+        </p:nvSpPr>
+        <p:spPr>
+          <a:xfrm>
+            <a:off x="60385" y="68750"/>
+            <a:ext cx="2431355" cy="400110"/>
+          </a:xfrm>
+          <a:prstGeom prst="rect">
+            <a:avLst/>
+          </a:prstGeom>
+          <a:noFill/>
+          <a:ln>
+            <a:noFill/>
+          </a:ln>
+        </p:spPr>
+        <p:txBody>
+          <a:bodyPr wrap="square" rtlCol="0">
+            <a:spAutoFit/>
+          </a:bodyPr>
+          <a:lstStyle/>
+          <a:p>
+            <a:r>
+              <a:rPr lang="en-GB" sz="2000" dirty="0">
+                <a:solidFill>
+                  <a:sysClr val="windowText" lastClr="000000"/>
+                </a:solidFill>
+              </a:rPr>
+              <a:t>Pro-Test</a:t>
+            </a:r>
+          </a:p>
+        </p:txBody>
+      </p:sp>
+      <p:sp>
+        <p:nvSpPr>
+          <p:cNvPr id="18" name="TextBox 17">
+            <a:extLst>
+              <a:ext uri="{FF2B5EF4-FFF2-40B4-BE49-F238E27FC236}">
+                <a16:creationId xmlns:a16="http://schemas.microsoft.com/office/drawing/2014/main" id="{21DC5A43-C63A-7C45-F679-8DB42F787177}"/>
+              </a:ext>
+            </a:extLst>
+          </p:cNvPr>
+          <p:cNvSpPr txBox="1"/>
+          <p:nvPr/>
+        </p:nvSpPr>
+        <p:spPr>
+          <a:xfrm>
+            <a:off x="60385" y="449374"/>
+            <a:ext cx="2431355" cy="369332"/>
+          </a:xfrm>
+          <a:prstGeom prst="rect">
+            <a:avLst/>
+          </a:prstGeom>
+          <a:noFill/>
+        </p:spPr>
+        <p:txBody>
+          <a:bodyPr wrap="square">
+            <a:spAutoFit/>
+          </a:bodyPr>
+          <a:lstStyle/>
+          <a:p>
+            <a:r>
+              <a:rPr lang="en-GB" sz="1800" dirty="0">
+                <a:solidFill>
+                  <a:sysClr val="windowText" lastClr="000000"/>
+                </a:solidFill>
+              </a:rPr>
+              <a:t>Test Different</a:t>
+            </a:r>
+          </a:p>
+        </p:txBody>
+      </p:sp>
+      <p:sp>
+        <p:nvSpPr>
+          <p:cNvPr id="19" name="Rectangle 18">
+            <a:extLst>
+              <a:ext uri="{FF2B5EF4-FFF2-40B4-BE49-F238E27FC236}">
+                <a16:creationId xmlns:a16="http://schemas.microsoft.com/office/drawing/2014/main" id="{A6E04054-B0DA-8D9D-81BE-86B084106515}"/>
+              </a:ext>
+            </a:extLst>
+          </p:cNvPr>
+          <p:cNvSpPr/>
+          <p:nvPr/>
+        </p:nvSpPr>
+        <p:spPr>
+          <a:xfrm>
+            <a:off x="2552122" y="152400"/>
+            <a:ext cx="7086459" cy="556238"/>
+          </a:xfrm>
+          <a:prstGeom prst="rect">
+            <a:avLst/>
+          </a:prstGeom>
+          <a:noFill/>
+          <a:ln>
+            <a:noFill/>
+          </a:ln>
+        </p:spPr>
+        <p:style>
+          <a:lnRef idx="2">
+            <a:schemeClr val="accent1">
+              <a:shade val="15000"/>
+            </a:schemeClr>
+          </a:lnRef>
+          <a:fillRef idx="1">
+            <a:schemeClr val="accent1"/>
+          </a:fillRef>
+          <a:effectRef idx="0">
+            <a:schemeClr val="accent1"/>
+          </a:effectRef>
+          <a:fontRef idx="minor">
+            <a:schemeClr val="lt1"/>
+          </a:fontRef>
+        </p:style>
+        <p:txBody>
+          <a:bodyPr rtlCol="0" anchor="ctr"/>
+          <a:lstStyle/>
+          <a:p>
+            <a:pPr algn="ctr"/>
+            <a:r>
+              <a:rPr lang="en-GB" dirty="0">
+                <a:solidFill>
+                  <a:sysClr val="windowText" lastClr="000000"/>
+                </a:solidFill>
+              </a:rPr>
+              <a:t>Dashboard ¦ </a:t>
+            </a:r>
+            <a:r>
+              <a:rPr lang="en-GB" b="1" dirty="0">
+                <a:solidFill>
+                  <a:sysClr val="windowText" lastClr="000000"/>
+                </a:solidFill>
+              </a:rPr>
+              <a:t>Test Zone </a:t>
+            </a:r>
+            <a:r>
+              <a:rPr lang="en-GB" dirty="0">
+                <a:solidFill>
+                  <a:sysClr val="windowText" lastClr="000000"/>
+                </a:solidFill>
+              </a:rPr>
+              <a:t>¦ Reports ¦ Settings ¦ Account </a:t>
+            </a:r>
+          </a:p>
+        </p:txBody>
+      </p:sp>
+      <p:sp>
+        <p:nvSpPr>
+          <p:cNvPr id="20" name="TextBox 19">
+            <a:extLst>
+              <a:ext uri="{FF2B5EF4-FFF2-40B4-BE49-F238E27FC236}">
+                <a16:creationId xmlns:a16="http://schemas.microsoft.com/office/drawing/2014/main" id="{A1542D56-2E40-5EA2-8CDB-20DB0680A33A}"/>
+              </a:ext>
+            </a:extLst>
+          </p:cNvPr>
+          <p:cNvSpPr txBox="1"/>
+          <p:nvPr/>
+        </p:nvSpPr>
+        <p:spPr>
+          <a:xfrm>
+            <a:off x="91702" y="1522331"/>
+            <a:ext cx="1415965" cy="369332"/>
+          </a:xfrm>
+          <a:prstGeom prst="rect">
+            <a:avLst/>
+          </a:prstGeom>
+          <a:noFill/>
+        </p:spPr>
+        <p:txBody>
+          <a:bodyPr wrap="none" rtlCol="0">
+            <a:spAutoFit/>
+          </a:bodyPr>
+          <a:lstStyle/>
+          <a:p>
+            <a:r>
+              <a:rPr lang="en-GB" u="sng" dirty="0"/>
+              <a:t>Create Tests</a:t>
+            </a:r>
+          </a:p>
+        </p:txBody>
+      </p:sp>
+      <p:sp>
+        <p:nvSpPr>
+          <p:cNvPr id="21" name="TextBox 20">
+            <a:extLst>
+              <a:ext uri="{FF2B5EF4-FFF2-40B4-BE49-F238E27FC236}">
+                <a16:creationId xmlns:a16="http://schemas.microsoft.com/office/drawing/2014/main" id="{1275D28E-DA3A-C8B4-6315-1996BDED6439}"/>
+              </a:ext>
+            </a:extLst>
+          </p:cNvPr>
+          <p:cNvSpPr txBox="1"/>
+          <p:nvPr/>
+        </p:nvSpPr>
+        <p:spPr>
+          <a:xfrm>
+            <a:off x="97132" y="1929262"/>
+            <a:ext cx="1137234" cy="369332"/>
+          </a:xfrm>
+          <a:prstGeom prst="rect">
+            <a:avLst/>
+          </a:prstGeom>
+          <a:noFill/>
+        </p:spPr>
+        <p:txBody>
+          <a:bodyPr wrap="none" rtlCol="0">
+            <a:spAutoFit/>
+          </a:bodyPr>
+          <a:lstStyle/>
+          <a:p>
+            <a:r>
+              <a:rPr lang="en-GB" u="sng" dirty="0"/>
+              <a:t>Run Tests</a:t>
+            </a:r>
+          </a:p>
+        </p:txBody>
+      </p:sp>
+      <p:sp>
+        <p:nvSpPr>
+          <p:cNvPr id="22" name="TextBox 21">
+            <a:extLst>
+              <a:ext uri="{FF2B5EF4-FFF2-40B4-BE49-F238E27FC236}">
+                <a16:creationId xmlns:a16="http://schemas.microsoft.com/office/drawing/2014/main" id="{3A26580B-9FC0-6DA5-32A1-922166FBE461}"/>
+              </a:ext>
+            </a:extLst>
+          </p:cNvPr>
+          <p:cNvSpPr txBox="1"/>
+          <p:nvPr/>
+        </p:nvSpPr>
+        <p:spPr>
+          <a:xfrm>
+            <a:off x="91702" y="2373413"/>
+            <a:ext cx="1030154" cy="369332"/>
+          </a:xfrm>
+          <a:prstGeom prst="rect">
+            <a:avLst/>
+          </a:prstGeom>
+          <a:noFill/>
+        </p:spPr>
+        <p:txBody>
+          <a:bodyPr wrap="none" rtlCol="0">
+            <a:spAutoFit/>
+          </a:bodyPr>
+          <a:lstStyle/>
+          <a:p>
+            <a:r>
+              <a:rPr lang="en-GB" u="sng" dirty="0"/>
+              <a:t>My Tests</a:t>
+            </a:r>
+          </a:p>
+        </p:txBody>
+      </p:sp>
+      <p:sp>
+        <p:nvSpPr>
+          <p:cNvPr id="32" name="TextBox 31">
+            <a:extLst>
+              <a:ext uri="{FF2B5EF4-FFF2-40B4-BE49-F238E27FC236}">
+                <a16:creationId xmlns:a16="http://schemas.microsoft.com/office/drawing/2014/main" id="{428DCE3F-5E9D-D1F7-90A5-86BAB2891CAA}"/>
+              </a:ext>
+            </a:extLst>
+          </p:cNvPr>
+          <p:cNvSpPr txBox="1"/>
+          <p:nvPr/>
+        </p:nvSpPr>
+        <p:spPr>
+          <a:xfrm>
+            <a:off x="2875242" y="1251044"/>
+            <a:ext cx="1001621" cy="369332"/>
+          </a:xfrm>
+          <a:prstGeom prst="rect">
+            <a:avLst/>
+          </a:prstGeom>
+          <a:noFill/>
+        </p:spPr>
+        <p:txBody>
+          <a:bodyPr wrap="none" rtlCol="0">
+            <a:spAutoFit/>
+          </a:bodyPr>
+          <a:lstStyle/>
+          <a:p>
+            <a:r>
+              <a:rPr lang="en-GB" dirty="0"/>
+              <a:t>Project: </a:t>
+            </a:r>
+          </a:p>
+        </p:txBody>
+      </p:sp>
+      <p:sp>
+        <p:nvSpPr>
+          <p:cNvPr id="34" name="TextBox 33">
+            <a:extLst>
+              <a:ext uri="{FF2B5EF4-FFF2-40B4-BE49-F238E27FC236}">
+                <a16:creationId xmlns:a16="http://schemas.microsoft.com/office/drawing/2014/main" id="{A30AD7FC-6401-B9D5-D6A5-03EE20DEA1F9}"/>
+              </a:ext>
+            </a:extLst>
+          </p:cNvPr>
+          <p:cNvSpPr txBox="1"/>
+          <p:nvPr/>
+        </p:nvSpPr>
+        <p:spPr>
+          <a:xfrm>
+            <a:off x="3894655" y="1250617"/>
+            <a:ext cx="1465352" cy="369332"/>
+          </a:xfrm>
+          <a:prstGeom prst="rect">
+            <a:avLst/>
+          </a:prstGeom>
+          <a:noFill/>
+        </p:spPr>
+        <p:txBody>
+          <a:bodyPr wrap="square" rtlCol="0">
+            <a:spAutoFit/>
+          </a:bodyPr>
+          <a:lstStyle/>
+          <a:p>
+            <a:r>
+              <a:rPr lang="en-GB" dirty="0"/>
+              <a:t>New Project</a:t>
+            </a:r>
+          </a:p>
+        </p:txBody>
+      </p:sp>
+      <p:sp>
+        <p:nvSpPr>
+          <p:cNvPr id="46" name="TextBox 45">
+            <a:extLst>
+              <a:ext uri="{FF2B5EF4-FFF2-40B4-BE49-F238E27FC236}">
+                <a16:creationId xmlns:a16="http://schemas.microsoft.com/office/drawing/2014/main" id="{A3ED9F61-5B91-4740-4CF9-DA314A43C03E}"/>
+              </a:ext>
+            </a:extLst>
+          </p:cNvPr>
+          <p:cNvSpPr txBox="1"/>
+          <p:nvPr/>
+        </p:nvSpPr>
+        <p:spPr>
+          <a:xfrm>
+            <a:off x="5162758" y="956349"/>
+            <a:ext cx="1550809" cy="369332"/>
+          </a:xfrm>
+          <a:prstGeom prst="rect">
+            <a:avLst/>
+          </a:prstGeom>
+          <a:noFill/>
+        </p:spPr>
+        <p:txBody>
+          <a:bodyPr wrap="none" rtlCol="0">
+            <a:spAutoFit/>
+          </a:bodyPr>
+          <a:lstStyle/>
+          <a:p>
+            <a:r>
+              <a:rPr lang="en-GB" dirty="0"/>
+              <a:t>Test Overview</a:t>
+            </a:r>
+          </a:p>
+        </p:txBody>
+      </p:sp>
+      <p:sp>
+        <p:nvSpPr>
+          <p:cNvPr id="47" name="TextBox 46">
+            <a:extLst>
+              <a:ext uri="{FF2B5EF4-FFF2-40B4-BE49-F238E27FC236}">
+                <a16:creationId xmlns:a16="http://schemas.microsoft.com/office/drawing/2014/main" id="{58CEC686-8D2A-4F47-03B5-60AA33778BC7}"/>
+              </a:ext>
+            </a:extLst>
+          </p:cNvPr>
+          <p:cNvSpPr txBox="1"/>
+          <p:nvPr/>
+        </p:nvSpPr>
+        <p:spPr>
+          <a:xfrm>
+            <a:off x="91701" y="1134200"/>
+            <a:ext cx="1550809" cy="369332"/>
+          </a:xfrm>
+          <a:prstGeom prst="rect">
+            <a:avLst/>
+          </a:prstGeom>
+          <a:noFill/>
+        </p:spPr>
+        <p:txBody>
+          <a:bodyPr wrap="none" rtlCol="0">
+            <a:spAutoFit/>
+          </a:bodyPr>
+          <a:lstStyle/>
+          <a:p>
+            <a:r>
+              <a:rPr lang="en-GB" u="sng" dirty="0"/>
+              <a:t>Test Overview</a:t>
+            </a:r>
+          </a:p>
+        </p:txBody>
+      </p:sp>
+      <p:sp>
+        <p:nvSpPr>
+          <p:cNvPr id="2" name="Rectangle 1">
+            <a:extLst>
+              <a:ext uri="{FF2B5EF4-FFF2-40B4-BE49-F238E27FC236}">
+                <a16:creationId xmlns:a16="http://schemas.microsoft.com/office/drawing/2014/main" id="{0F28A9F1-2AB7-8AB7-6D72-959C9A4726A8}"/>
+              </a:ext>
+            </a:extLst>
+          </p:cNvPr>
+          <p:cNvSpPr/>
+          <p:nvPr/>
+        </p:nvSpPr>
+        <p:spPr>
+          <a:xfrm>
+            <a:off x="2875242" y="2271203"/>
+            <a:ext cx="2354094" cy="1658272"/>
+          </a:xfrm>
+          <a:prstGeom prst="rect">
+            <a:avLst/>
+          </a:prstGeom>
+          <a:solidFill>
+            <a:schemeClr val="accent6">
+              <a:lumMod val="20000"/>
+              <a:lumOff val="80000"/>
+            </a:schemeClr>
+          </a:solidFill>
+        </p:spPr>
+        <p:style>
+          <a:lnRef idx="2">
+            <a:schemeClr val="accent1">
+              <a:shade val="15000"/>
+            </a:schemeClr>
+          </a:lnRef>
+          <a:fillRef idx="1">
+            <a:schemeClr val="accent1"/>
+          </a:fillRef>
+          <a:effectRef idx="0">
+            <a:schemeClr val="accent1"/>
+          </a:effectRef>
+          <a:fontRef idx="minor">
+            <a:schemeClr val="lt1"/>
+          </a:fontRef>
+        </p:style>
+        <p:txBody>
+          <a:bodyPr rtlCol="0" anchor="ctr"/>
+          <a:lstStyle/>
+          <a:p>
+            <a:pPr algn="ctr"/>
+            <a:endParaRPr lang="en-GB"/>
+          </a:p>
+        </p:txBody>
+      </p:sp>
+      <p:sp>
+        <p:nvSpPr>
+          <p:cNvPr id="3" name="TextBox 2">
+            <a:extLst>
+              <a:ext uri="{FF2B5EF4-FFF2-40B4-BE49-F238E27FC236}">
+                <a16:creationId xmlns:a16="http://schemas.microsoft.com/office/drawing/2014/main" id="{DA52FFA2-2583-9767-843E-FD79A1EED1E9}"/>
+              </a:ext>
+            </a:extLst>
+          </p:cNvPr>
+          <p:cNvSpPr txBox="1"/>
+          <p:nvPr/>
+        </p:nvSpPr>
+        <p:spPr>
+          <a:xfrm>
+            <a:off x="3561930" y="1768548"/>
+            <a:ext cx="980718" cy="369332"/>
+          </a:xfrm>
+          <a:prstGeom prst="rect">
+            <a:avLst/>
+          </a:prstGeom>
+          <a:noFill/>
+        </p:spPr>
+        <p:txBody>
+          <a:bodyPr wrap="none" rtlCol="0">
+            <a:spAutoFit/>
+          </a:bodyPr>
+          <a:lstStyle/>
+          <a:p>
+            <a:r>
+              <a:rPr lang="en-GB" dirty="0"/>
+              <a:t>Pending</a:t>
+            </a:r>
+          </a:p>
+        </p:txBody>
+      </p:sp>
+      <p:sp>
+        <p:nvSpPr>
+          <p:cNvPr id="6" name="Rectangle 5">
+            <a:extLst>
+              <a:ext uri="{FF2B5EF4-FFF2-40B4-BE49-F238E27FC236}">
+                <a16:creationId xmlns:a16="http://schemas.microsoft.com/office/drawing/2014/main" id="{945E5452-F246-BECB-1FE0-45C99655FB75}"/>
+              </a:ext>
+            </a:extLst>
+          </p:cNvPr>
+          <p:cNvSpPr/>
+          <p:nvPr/>
+        </p:nvSpPr>
+        <p:spPr>
+          <a:xfrm>
+            <a:off x="5785619" y="2271203"/>
+            <a:ext cx="2354094" cy="1658272"/>
+          </a:xfrm>
+          <a:prstGeom prst="rect">
+            <a:avLst/>
+          </a:prstGeom>
+          <a:solidFill>
+            <a:schemeClr val="accent6">
+              <a:lumMod val="20000"/>
+              <a:lumOff val="80000"/>
+            </a:schemeClr>
+          </a:solidFill>
+        </p:spPr>
+        <p:style>
+          <a:lnRef idx="2">
+            <a:schemeClr val="accent1">
+              <a:shade val="15000"/>
+            </a:schemeClr>
+          </a:lnRef>
+          <a:fillRef idx="1">
+            <a:schemeClr val="accent1"/>
+          </a:fillRef>
+          <a:effectRef idx="0">
+            <a:schemeClr val="accent1"/>
+          </a:effectRef>
+          <a:fontRef idx="minor">
+            <a:schemeClr val="lt1"/>
+          </a:fontRef>
+        </p:style>
+        <p:txBody>
+          <a:bodyPr rtlCol="0" anchor="ctr"/>
+          <a:lstStyle/>
+          <a:p>
+            <a:pPr algn="ctr"/>
+            <a:endParaRPr lang="en-GB"/>
+          </a:p>
+        </p:txBody>
+      </p:sp>
+      <p:sp>
+        <p:nvSpPr>
+          <p:cNvPr id="7" name="TextBox 6">
+            <a:extLst>
+              <a:ext uri="{FF2B5EF4-FFF2-40B4-BE49-F238E27FC236}">
+                <a16:creationId xmlns:a16="http://schemas.microsoft.com/office/drawing/2014/main" id="{0445D9AF-BA7C-4B3D-A180-334807B5E036}"/>
+              </a:ext>
+            </a:extLst>
+          </p:cNvPr>
+          <p:cNvSpPr txBox="1"/>
+          <p:nvPr/>
+        </p:nvSpPr>
+        <p:spPr>
+          <a:xfrm>
+            <a:off x="6472307" y="1768548"/>
+            <a:ext cx="909480" cy="369332"/>
+          </a:xfrm>
+          <a:prstGeom prst="rect">
+            <a:avLst/>
+          </a:prstGeom>
+          <a:noFill/>
+        </p:spPr>
+        <p:txBody>
+          <a:bodyPr wrap="none" rtlCol="0">
+            <a:spAutoFit/>
+          </a:bodyPr>
+          <a:lstStyle/>
+          <a:p>
+            <a:r>
+              <a:rPr lang="en-GB" dirty="0"/>
+              <a:t>Passed</a:t>
+            </a:r>
+          </a:p>
+        </p:txBody>
+      </p:sp>
+      <p:sp>
+        <p:nvSpPr>
+          <p:cNvPr id="8" name="Rectangle 7">
+            <a:extLst>
+              <a:ext uri="{FF2B5EF4-FFF2-40B4-BE49-F238E27FC236}">
+                <a16:creationId xmlns:a16="http://schemas.microsoft.com/office/drawing/2014/main" id="{A291E824-8F81-C1F2-79D6-7FA13A4B09F8}"/>
+              </a:ext>
+            </a:extLst>
+          </p:cNvPr>
+          <p:cNvSpPr/>
+          <p:nvPr/>
+        </p:nvSpPr>
+        <p:spPr>
+          <a:xfrm>
+            <a:off x="8695996" y="2271203"/>
+            <a:ext cx="2354094" cy="1658272"/>
+          </a:xfrm>
+          <a:prstGeom prst="rect">
+            <a:avLst/>
+          </a:prstGeom>
+          <a:solidFill>
+            <a:schemeClr val="accent6">
+              <a:lumMod val="20000"/>
+              <a:lumOff val="80000"/>
+            </a:schemeClr>
+          </a:solidFill>
+        </p:spPr>
+        <p:style>
+          <a:lnRef idx="2">
+            <a:schemeClr val="accent1">
+              <a:shade val="15000"/>
+            </a:schemeClr>
+          </a:lnRef>
+          <a:fillRef idx="1">
+            <a:schemeClr val="accent1"/>
+          </a:fillRef>
+          <a:effectRef idx="0">
+            <a:schemeClr val="accent1"/>
+          </a:effectRef>
+          <a:fontRef idx="minor">
+            <a:schemeClr val="lt1"/>
+          </a:fontRef>
+        </p:style>
+        <p:txBody>
+          <a:bodyPr rtlCol="0" anchor="ctr"/>
+          <a:lstStyle/>
+          <a:p>
+            <a:pPr algn="ctr"/>
+            <a:endParaRPr lang="en-GB"/>
+          </a:p>
+        </p:txBody>
+      </p:sp>
+      <p:sp>
+        <p:nvSpPr>
+          <p:cNvPr id="9" name="TextBox 8">
+            <a:extLst>
+              <a:ext uri="{FF2B5EF4-FFF2-40B4-BE49-F238E27FC236}">
+                <a16:creationId xmlns:a16="http://schemas.microsoft.com/office/drawing/2014/main" id="{9EA6504C-76E7-2F6D-91FA-556F5FD17453}"/>
+              </a:ext>
+            </a:extLst>
+          </p:cNvPr>
+          <p:cNvSpPr txBox="1"/>
+          <p:nvPr/>
+        </p:nvSpPr>
+        <p:spPr>
+          <a:xfrm>
+            <a:off x="9382684" y="1768548"/>
+            <a:ext cx="792589" cy="369332"/>
+          </a:xfrm>
+          <a:prstGeom prst="rect">
+            <a:avLst/>
+          </a:prstGeom>
+          <a:noFill/>
+        </p:spPr>
+        <p:txBody>
+          <a:bodyPr wrap="none" rtlCol="0">
+            <a:spAutoFit/>
+          </a:bodyPr>
+          <a:lstStyle/>
+          <a:p>
+            <a:r>
+              <a:rPr lang="en-GB" dirty="0"/>
+              <a:t>Failed</a:t>
+            </a:r>
+          </a:p>
+        </p:txBody>
+      </p:sp>
+      <p:sp>
+        <p:nvSpPr>
+          <p:cNvPr id="11" name="Rectangle 10">
+            <a:extLst>
+              <a:ext uri="{FF2B5EF4-FFF2-40B4-BE49-F238E27FC236}">
+                <a16:creationId xmlns:a16="http://schemas.microsoft.com/office/drawing/2014/main" id="{BB10843A-17B0-9576-99FA-2F48F0F793D6}"/>
+              </a:ext>
+            </a:extLst>
+          </p:cNvPr>
+          <p:cNvSpPr/>
+          <p:nvPr/>
+        </p:nvSpPr>
+        <p:spPr>
+          <a:xfrm>
+            <a:off x="2875242" y="4238515"/>
+            <a:ext cx="2354094" cy="1658272"/>
+          </a:xfrm>
+          <a:prstGeom prst="rect">
+            <a:avLst/>
+          </a:prstGeom>
+          <a:solidFill>
+            <a:schemeClr val="accent6">
+              <a:lumMod val="20000"/>
+              <a:lumOff val="80000"/>
+            </a:schemeClr>
+          </a:solidFill>
+        </p:spPr>
+        <p:style>
+          <a:lnRef idx="2">
+            <a:schemeClr val="accent1">
+              <a:shade val="15000"/>
+            </a:schemeClr>
+          </a:lnRef>
+          <a:fillRef idx="1">
+            <a:schemeClr val="accent1"/>
+          </a:fillRef>
+          <a:effectRef idx="0">
+            <a:schemeClr val="accent1"/>
+          </a:effectRef>
+          <a:fontRef idx="minor">
+            <a:schemeClr val="lt1"/>
+          </a:fontRef>
+        </p:style>
+        <p:txBody>
+          <a:bodyPr rtlCol="0" anchor="ctr"/>
+          <a:lstStyle/>
+          <a:p>
+            <a:pPr algn="ctr"/>
+            <a:endParaRPr lang="en-GB"/>
+          </a:p>
+        </p:txBody>
+      </p:sp>
+      <p:sp>
+        <p:nvSpPr>
+          <p:cNvPr id="12" name="TextBox 11">
+            <a:extLst>
+              <a:ext uri="{FF2B5EF4-FFF2-40B4-BE49-F238E27FC236}">
+                <a16:creationId xmlns:a16="http://schemas.microsoft.com/office/drawing/2014/main" id="{4D72EEE9-0A0E-64FC-4B14-667D8B1DACC6}"/>
+              </a:ext>
+            </a:extLst>
+          </p:cNvPr>
+          <p:cNvSpPr txBox="1"/>
+          <p:nvPr/>
+        </p:nvSpPr>
+        <p:spPr>
+          <a:xfrm>
+            <a:off x="3039305" y="2373413"/>
+            <a:ext cx="849335" cy="369332"/>
+          </a:xfrm>
+          <a:prstGeom prst="rect">
+            <a:avLst/>
+          </a:prstGeom>
+          <a:noFill/>
+        </p:spPr>
+        <p:txBody>
+          <a:bodyPr wrap="none" rtlCol="0">
+            <a:spAutoFit/>
+          </a:bodyPr>
+          <a:lstStyle/>
+          <a:p>
+            <a:r>
+              <a:rPr lang="en-GB" dirty="0"/>
+              <a:t>Test ID</a:t>
+            </a:r>
+          </a:p>
+        </p:txBody>
+      </p:sp>
+      <p:sp>
+        <p:nvSpPr>
+          <p:cNvPr id="13" name="TextBox 12">
+            <a:extLst>
+              <a:ext uri="{FF2B5EF4-FFF2-40B4-BE49-F238E27FC236}">
+                <a16:creationId xmlns:a16="http://schemas.microsoft.com/office/drawing/2014/main" id="{804E511A-BED5-F8DE-6348-ED0C7DBCF4CB}"/>
+              </a:ext>
+            </a:extLst>
+          </p:cNvPr>
+          <p:cNvSpPr txBox="1"/>
+          <p:nvPr/>
+        </p:nvSpPr>
+        <p:spPr>
+          <a:xfrm>
+            <a:off x="5864232" y="2373413"/>
+            <a:ext cx="849335" cy="369332"/>
+          </a:xfrm>
+          <a:prstGeom prst="rect">
+            <a:avLst/>
+          </a:prstGeom>
+          <a:noFill/>
+        </p:spPr>
+        <p:txBody>
+          <a:bodyPr wrap="none" rtlCol="0">
+            <a:spAutoFit/>
+          </a:bodyPr>
+          <a:lstStyle/>
+          <a:p>
+            <a:r>
+              <a:rPr lang="en-GB" dirty="0"/>
+              <a:t>Test ID</a:t>
+            </a:r>
+          </a:p>
+        </p:txBody>
+      </p:sp>
+      <p:sp>
+        <p:nvSpPr>
+          <p:cNvPr id="15" name="TextBox 14">
+            <a:extLst>
+              <a:ext uri="{FF2B5EF4-FFF2-40B4-BE49-F238E27FC236}">
+                <a16:creationId xmlns:a16="http://schemas.microsoft.com/office/drawing/2014/main" id="{2D3730A3-1052-6B17-5B0D-0C11D812B061}"/>
+              </a:ext>
+            </a:extLst>
+          </p:cNvPr>
+          <p:cNvSpPr txBox="1"/>
+          <p:nvPr/>
+        </p:nvSpPr>
+        <p:spPr>
+          <a:xfrm>
+            <a:off x="8891603" y="2373413"/>
+            <a:ext cx="849335" cy="369332"/>
+          </a:xfrm>
+          <a:prstGeom prst="rect">
+            <a:avLst/>
+          </a:prstGeom>
+          <a:noFill/>
+        </p:spPr>
+        <p:txBody>
+          <a:bodyPr wrap="none" rtlCol="0">
+            <a:spAutoFit/>
+          </a:bodyPr>
+          <a:lstStyle/>
+          <a:p>
+            <a:r>
+              <a:rPr lang="en-GB" dirty="0"/>
+              <a:t>Test ID</a:t>
+            </a:r>
+          </a:p>
+        </p:txBody>
+      </p:sp>
+      <p:sp>
+        <p:nvSpPr>
+          <p:cNvPr id="17" name="TextBox 16">
+            <a:extLst>
+              <a:ext uri="{FF2B5EF4-FFF2-40B4-BE49-F238E27FC236}">
+                <a16:creationId xmlns:a16="http://schemas.microsoft.com/office/drawing/2014/main" id="{C750E9C7-07A5-AB14-C0E0-8519C2E45E59}"/>
+              </a:ext>
+            </a:extLst>
+          </p:cNvPr>
+          <p:cNvSpPr txBox="1"/>
+          <p:nvPr/>
+        </p:nvSpPr>
+        <p:spPr>
+          <a:xfrm>
+            <a:off x="3042856" y="4395636"/>
+            <a:ext cx="849335" cy="369332"/>
+          </a:xfrm>
+          <a:prstGeom prst="rect">
+            <a:avLst/>
+          </a:prstGeom>
+          <a:noFill/>
+        </p:spPr>
+        <p:txBody>
+          <a:bodyPr wrap="none" rtlCol="0">
+            <a:spAutoFit/>
+          </a:bodyPr>
+          <a:lstStyle/>
+          <a:p>
+            <a:r>
+              <a:rPr lang="en-GB" dirty="0"/>
+              <a:t>Test ID</a:t>
+            </a:r>
+          </a:p>
+        </p:txBody>
+      </p:sp>
+      <p:sp>
+        <p:nvSpPr>
+          <p:cNvPr id="23" name="TextBox 22">
+            <a:extLst>
+              <a:ext uri="{FF2B5EF4-FFF2-40B4-BE49-F238E27FC236}">
+                <a16:creationId xmlns:a16="http://schemas.microsoft.com/office/drawing/2014/main" id="{A618DC03-F69F-A628-8DDB-0ACC1EABBC0F}"/>
+              </a:ext>
+            </a:extLst>
+          </p:cNvPr>
+          <p:cNvSpPr txBox="1"/>
+          <p:nvPr/>
+        </p:nvSpPr>
+        <p:spPr>
+          <a:xfrm>
+            <a:off x="3027528" y="2841636"/>
+            <a:ext cx="1343638" cy="369332"/>
+          </a:xfrm>
+          <a:prstGeom prst="rect">
+            <a:avLst/>
+          </a:prstGeom>
+          <a:noFill/>
+        </p:spPr>
+        <p:txBody>
+          <a:bodyPr wrap="none" rtlCol="0">
+            <a:spAutoFit/>
+          </a:bodyPr>
+          <a:lstStyle/>
+          <a:p>
+            <a:r>
+              <a:rPr lang="en-GB" dirty="0"/>
+              <a:t>Description</a:t>
+            </a:r>
+          </a:p>
+        </p:txBody>
+      </p:sp>
+      <p:sp>
+        <p:nvSpPr>
+          <p:cNvPr id="33" name="TextBox 32">
+            <a:extLst>
+              <a:ext uri="{FF2B5EF4-FFF2-40B4-BE49-F238E27FC236}">
+                <a16:creationId xmlns:a16="http://schemas.microsoft.com/office/drawing/2014/main" id="{604CDADF-7C64-15E4-9D01-3AE8907A530B}"/>
+              </a:ext>
+            </a:extLst>
+          </p:cNvPr>
+          <p:cNvSpPr txBox="1"/>
+          <p:nvPr/>
+        </p:nvSpPr>
+        <p:spPr>
+          <a:xfrm>
+            <a:off x="5864232" y="2843955"/>
+            <a:ext cx="1343638" cy="369332"/>
+          </a:xfrm>
+          <a:prstGeom prst="rect">
+            <a:avLst/>
+          </a:prstGeom>
+          <a:noFill/>
+        </p:spPr>
+        <p:txBody>
+          <a:bodyPr wrap="none" rtlCol="0">
+            <a:spAutoFit/>
+          </a:bodyPr>
+          <a:lstStyle/>
+          <a:p>
+            <a:r>
+              <a:rPr lang="en-GB" dirty="0"/>
+              <a:t>Description</a:t>
+            </a:r>
+          </a:p>
+        </p:txBody>
+      </p:sp>
+      <p:sp>
+        <p:nvSpPr>
+          <p:cNvPr id="40" name="TextBox 39">
+            <a:extLst>
+              <a:ext uri="{FF2B5EF4-FFF2-40B4-BE49-F238E27FC236}">
+                <a16:creationId xmlns:a16="http://schemas.microsoft.com/office/drawing/2014/main" id="{C1D5A2AF-45DE-9202-9B23-3855128668DA}"/>
+              </a:ext>
+            </a:extLst>
+          </p:cNvPr>
+          <p:cNvSpPr txBox="1"/>
+          <p:nvPr/>
+        </p:nvSpPr>
+        <p:spPr>
+          <a:xfrm>
+            <a:off x="8894283" y="2915673"/>
+            <a:ext cx="1343638" cy="369332"/>
+          </a:xfrm>
+          <a:prstGeom prst="rect">
+            <a:avLst/>
+          </a:prstGeom>
+          <a:noFill/>
+        </p:spPr>
+        <p:txBody>
+          <a:bodyPr wrap="none" rtlCol="0">
+            <a:spAutoFit/>
+          </a:bodyPr>
+          <a:lstStyle/>
+          <a:p>
+            <a:r>
+              <a:rPr lang="en-GB" dirty="0"/>
+              <a:t>Description</a:t>
+            </a:r>
+          </a:p>
+        </p:txBody>
+      </p:sp>
+      <p:sp>
+        <p:nvSpPr>
+          <p:cNvPr id="41" name="TextBox 40">
+            <a:extLst>
+              <a:ext uri="{FF2B5EF4-FFF2-40B4-BE49-F238E27FC236}">
+                <a16:creationId xmlns:a16="http://schemas.microsoft.com/office/drawing/2014/main" id="{AFECFE62-1184-BFE4-0648-7F78686566A0}"/>
+              </a:ext>
+            </a:extLst>
+          </p:cNvPr>
+          <p:cNvSpPr txBox="1"/>
+          <p:nvPr/>
+        </p:nvSpPr>
+        <p:spPr>
+          <a:xfrm>
+            <a:off x="3039305" y="4961545"/>
+            <a:ext cx="1343638" cy="369332"/>
+          </a:xfrm>
+          <a:prstGeom prst="rect">
+            <a:avLst/>
+          </a:prstGeom>
+          <a:noFill/>
+        </p:spPr>
+        <p:txBody>
+          <a:bodyPr wrap="none" rtlCol="0">
+            <a:spAutoFit/>
+          </a:bodyPr>
+          <a:lstStyle/>
+          <a:p>
+            <a:r>
+              <a:rPr lang="en-GB" dirty="0"/>
+              <a:t>Description</a:t>
+            </a:r>
+          </a:p>
+        </p:txBody>
+      </p:sp>
+    </p:spTree>
+    <p:extLst>
+      <p:ext uri="{BB962C8B-B14F-4D97-AF65-F5344CB8AC3E}">
+        <p14:creationId xmlns:p14="http://schemas.microsoft.com/office/powerpoint/2010/main" val="2972220020"/>
+      </p:ext>
+    </p:extLst>
+  </p:cSld>
+  <p:clrMapOvr>
+    <a:masterClrMapping/>
+  </p:clrMapOvr>
+</p:sld>
+</file>
+
+<file path=ppt/slides/slide8.xml><?xml version="1.0" encoding="utf-8"?>
+<p:sld xmlns:a="http://schemas.openxmlformats.org/drawingml/2006/main" xmlns:r="http://schemas.openxmlformats.org/officeDocument/2006/relationships" xmlns:p="http://schemas.openxmlformats.org/presentationml/2006/main">
+  <p:cSld>
+    <p:spTree>
+      <p:nvGrpSpPr>
+        <p:cNvPr id="1" name=""/>
+        <p:cNvGrpSpPr/>
+        <p:nvPr/>
+      </p:nvGrpSpPr>
+      <p:grpSpPr>
+        <a:xfrm>
+          <a:off x="0" y="0"/>
+          <a:ext cx="0" cy="0"/>
+          <a:chOff x="0" y="0"/>
+          <a:chExt cx="0" cy="0"/>
+        </a:xfrm>
+      </p:grpSpPr>
+      <p:sp>
+        <p:nvSpPr>
+          <p:cNvPr id="4" name="Rectangle 3">
+            <a:extLst>
+              <a:ext uri="{FF2B5EF4-FFF2-40B4-BE49-F238E27FC236}">
+                <a16:creationId xmlns:a16="http://schemas.microsoft.com/office/drawing/2014/main" id="{AE96A136-589B-FF96-8B0D-9907D65CB441}"/>
+              </a:ext>
+            </a:extLst>
+          </p:cNvPr>
+          <p:cNvSpPr/>
+          <p:nvPr/>
+        </p:nvSpPr>
+        <p:spPr>
+          <a:xfrm>
+            <a:off x="2900463" y="817122"/>
+            <a:ext cx="6391073" cy="6040877"/>
+          </a:xfrm>
+          <a:prstGeom prst="rect">
+            <a:avLst/>
+          </a:prstGeom>
+          <a:solidFill>
+            <a:schemeClr val="accent6">
+              <a:lumMod val="20000"/>
+              <a:lumOff val="80000"/>
+            </a:schemeClr>
+          </a:solidFill>
+        </p:spPr>
+        <p:style>
+          <a:lnRef idx="2">
+            <a:schemeClr val="accent1">
+              <a:shade val="15000"/>
+            </a:schemeClr>
+          </a:lnRef>
+          <a:fillRef idx="1">
+            <a:schemeClr val="accent1"/>
+          </a:fillRef>
+          <a:effectRef idx="0">
+            <a:schemeClr val="accent1"/>
+          </a:effectRef>
+          <a:fontRef idx="minor">
+            <a:schemeClr val="lt1"/>
+          </a:fontRef>
+        </p:style>
+        <p:txBody>
+          <a:bodyPr rtlCol="0" anchor="ctr"/>
+          <a:lstStyle/>
+          <a:p>
+            <a:pPr algn="ctr"/>
+            <a:endParaRPr lang="en-GB"/>
+          </a:p>
+        </p:txBody>
+      </p:sp>
+      <p:sp>
+        <p:nvSpPr>
+          <p:cNvPr id="6" name="TextBox 5">
+            <a:extLst>
+              <a:ext uri="{FF2B5EF4-FFF2-40B4-BE49-F238E27FC236}">
+                <a16:creationId xmlns:a16="http://schemas.microsoft.com/office/drawing/2014/main" id="{24ACFB12-C587-3A6C-5882-8824A4E2749D}"/>
+              </a:ext>
+            </a:extLst>
+          </p:cNvPr>
+          <p:cNvSpPr txBox="1"/>
+          <p:nvPr/>
+        </p:nvSpPr>
+        <p:spPr>
+          <a:xfrm>
+            <a:off x="3725818" y="1016837"/>
+            <a:ext cx="629916" cy="276999"/>
+          </a:xfrm>
+          <a:prstGeom prst="rect">
+            <a:avLst/>
+          </a:prstGeom>
+          <a:noFill/>
+        </p:spPr>
+        <p:txBody>
+          <a:bodyPr wrap="none" rtlCol="0">
+            <a:spAutoFit/>
+          </a:bodyPr>
+          <a:lstStyle/>
+          <a:p>
+            <a:r>
+              <a:rPr lang="en-GB" sz="1200" u="sng" dirty="0"/>
+              <a:t>Test ID</a:t>
+            </a:r>
+          </a:p>
+        </p:txBody>
+      </p:sp>
+      <p:sp>
+        <p:nvSpPr>
+          <p:cNvPr id="7" name="TextBox 6">
+            <a:extLst>
+              <a:ext uri="{FF2B5EF4-FFF2-40B4-BE49-F238E27FC236}">
+                <a16:creationId xmlns:a16="http://schemas.microsoft.com/office/drawing/2014/main" id="{E75BA621-A12A-5968-987F-9E918DF31682}"/>
+              </a:ext>
+            </a:extLst>
+          </p:cNvPr>
+          <p:cNvSpPr txBox="1"/>
+          <p:nvPr/>
+        </p:nvSpPr>
+        <p:spPr>
+          <a:xfrm>
+            <a:off x="4767090" y="1016836"/>
+            <a:ext cx="651269" cy="276999"/>
+          </a:xfrm>
+          <a:prstGeom prst="rect">
+            <a:avLst/>
+          </a:prstGeom>
+          <a:noFill/>
+        </p:spPr>
+        <p:txBody>
+          <a:bodyPr wrap="none" rtlCol="0">
+            <a:spAutoFit/>
+          </a:bodyPr>
+          <a:lstStyle/>
+          <a:p>
+            <a:r>
+              <a:rPr lang="en-GB" sz="1200" u="sng" dirty="0"/>
+              <a:t>Priority</a:t>
+            </a:r>
+          </a:p>
+        </p:txBody>
+      </p:sp>
+      <p:sp>
+        <p:nvSpPr>
+          <p:cNvPr id="8" name="TextBox 7">
+            <a:extLst>
+              <a:ext uri="{FF2B5EF4-FFF2-40B4-BE49-F238E27FC236}">
+                <a16:creationId xmlns:a16="http://schemas.microsoft.com/office/drawing/2014/main" id="{C5F6FD09-EF03-1705-F4D7-D78F33291351}"/>
+              </a:ext>
+            </a:extLst>
+          </p:cNvPr>
+          <p:cNvSpPr txBox="1"/>
+          <p:nvPr/>
+        </p:nvSpPr>
+        <p:spPr>
+          <a:xfrm>
+            <a:off x="5795813" y="1006899"/>
+            <a:ext cx="490262" cy="276999"/>
+          </a:xfrm>
+          <a:prstGeom prst="rect">
+            <a:avLst/>
+          </a:prstGeom>
+          <a:noFill/>
+        </p:spPr>
+        <p:txBody>
+          <a:bodyPr wrap="none" rtlCol="0">
+            <a:spAutoFit/>
+          </a:bodyPr>
+          <a:lstStyle/>
+          <a:p>
+            <a:r>
+              <a:rPr lang="en-GB" sz="1200" u="sng" dirty="0"/>
+              <a:t>Type</a:t>
+            </a:r>
+          </a:p>
+        </p:txBody>
+      </p:sp>
+      <p:sp>
+        <p:nvSpPr>
+          <p:cNvPr id="9" name="TextBox 8">
+            <a:extLst>
+              <a:ext uri="{FF2B5EF4-FFF2-40B4-BE49-F238E27FC236}">
+                <a16:creationId xmlns:a16="http://schemas.microsoft.com/office/drawing/2014/main" id="{BF7BB148-1C56-0125-A23D-D8EFF055E754}"/>
+              </a:ext>
+            </a:extLst>
+          </p:cNvPr>
+          <p:cNvSpPr txBox="1"/>
+          <p:nvPr/>
+        </p:nvSpPr>
+        <p:spPr>
+          <a:xfrm>
+            <a:off x="6580539" y="1020878"/>
+            <a:ext cx="612347" cy="276999"/>
+          </a:xfrm>
+          <a:prstGeom prst="rect">
+            <a:avLst/>
+          </a:prstGeom>
+          <a:noFill/>
+        </p:spPr>
+        <p:txBody>
+          <a:bodyPr wrap="none" rtlCol="0">
+            <a:spAutoFit/>
+          </a:bodyPr>
+          <a:lstStyle/>
+          <a:p>
+            <a:r>
+              <a:rPr lang="en-GB" sz="1200" u="sng" dirty="0"/>
+              <a:t>Status</a:t>
+            </a:r>
+          </a:p>
+        </p:txBody>
+      </p:sp>
+      <p:sp>
+        <p:nvSpPr>
+          <p:cNvPr id="10" name="TextBox 9">
+            <a:extLst>
+              <a:ext uri="{FF2B5EF4-FFF2-40B4-BE49-F238E27FC236}">
+                <a16:creationId xmlns:a16="http://schemas.microsoft.com/office/drawing/2014/main" id="{A476F39A-2334-5851-0730-215791FF4A27}"/>
+              </a:ext>
+            </a:extLst>
+          </p:cNvPr>
+          <p:cNvSpPr txBox="1"/>
+          <p:nvPr/>
+        </p:nvSpPr>
+        <p:spPr>
+          <a:xfrm>
+            <a:off x="7448255" y="1022332"/>
+            <a:ext cx="972767" cy="276999"/>
+          </a:xfrm>
+          <a:prstGeom prst="rect">
+            <a:avLst/>
+          </a:prstGeom>
+          <a:noFill/>
+        </p:spPr>
+        <p:txBody>
+          <a:bodyPr wrap="none" rtlCol="0">
+            <a:spAutoFit/>
+          </a:bodyPr>
+          <a:lstStyle/>
+          <a:p>
+            <a:r>
+              <a:rPr lang="en-GB" sz="1200" u="sng" dirty="0"/>
+              <a:t>Assigned To</a:t>
+            </a:r>
+          </a:p>
+        </p:txBody>
+      </p:sp>
+      <p:sp>
+        <p:nvSpPr>
+          <p:cNvPr id="11" name="TextBox 10">
+            <a:extLst>
+              <a:ext uri="{FF2B5EF4-FFF2-40B4-BE49-F238E27FC236}">
+                <a16:creationId xmlns:a16="http://schemas.microsoft.com/office/drawing/2014/main" id="{4946C8AF-02D3-6C50-E216-ED3BDC263151}"/>
+              </a:ext>
+            </a:extLst>
+          </p:cNvPr>
+          <p:cNvSpPr txBox="1"/>
+          <p:nvPr/>
+        </p:nvSpPr>
+        <p:spPr>
+          <a:xfrm>
+            <a:off x="3561317" y="2667297"/>
+            <a:ext cx="958917" cy="276999"/>
+          </a:xfrm>
+          <a:prstGeom prst="rect">
+            <a:avLst/>
+          </a:prstGeom>
+          <a:noFill/>
+        </p:spPr>
+        <p:txBody>
+          <a:bodyPr wrap="none" rtlCol="0">
+            <a:spAutoFit/>
+          </a:bodyPr>
+          <a:lstStyle/>
+          <a:p>
+            <a:r>
+              <a:rPr lang="en-GB" sz="1200" u="sng" dirty="0"/>
+              <a:t>Description</a:t>
+            </a:r>
+          </a:p>
+        </p:txBody>
+      </p:sp>
+      <p:sp>
+        <p:nvSpPr>
+          <p:cNvPr id="12" name="TextBox 11">
+            <a:extLst>
+              <a:ext uri="{FF2B5EF4-FFF2-40B4-BE49-F238E27FC236}">
+                <a16:creationId xmlns:a16="http://schemas.microsoft.com/office/drawing/2014/main" id="{7C68ACF9-7447-93CB-B943-B78E91EC7E59}"/>
+              </a:ext>
+            </a:extLst>
+          </p:cNvPr>
+          <p:cNvSpPr txBox="1"/>
+          <p:nvPr/>
+        </p:nvSpPr>
+        <p:spPr>
+          <a:xfrm>
+            <a:off x="3561316" y="3699060"/>
+            <a:ext cx="958917" cy="276999"/>
+          </a:xfrm>
+          <a:prstGeom prst="rect">
+            <a:avLst/>
+          </a:prstGeom>
+          <a:noFill/>
+        </p:spPr>
+        <p:txBody>
+          <a:bodyPr wrap="none" rtlCol="0">
+            <a:spAutoFit/>
+          </a:bodyPr>
+          <a:lstStyle/>
+          <a:p>
+            <a:r>
+              <a:rPr lang="en-GB" sz="1200" u="sng" dirty="0"/>
+              <a:t>Description</a:t>
+            </a:r>
+          </a:p>
+        </p:txBody>
+      </p:sp>
+    </p:spTree>
+    <p:extLst>
+      <p:ext uri="{BB962C8B-B14F-4D97-AF65-F5344CB8AC3E}">
+        <p14:creationId xmlns:p14="http://schemas.microsoft.com/office/powerpoint/2010/main" val="426601687"/>
       </p:ext>
     </p:extLst>
   </p:cSld>

</xml_diff>

<commit_message>
modified:   documentation/interface-designs/gui-concepts.pptx 	new file:   documentation/test-plans/testing-table.xlsx
</commit_message>
<xml_diff>
--- a/documentation/interface-designs/gui-concepts.pptx
+++ b/documentation/interface-designs/gui-concepts.pptx
@@ -125,7 +125,7 @@
 <file path=ppt/revisionInfo.xml><?xml version="1.0" encoding="utf-8"?>
 <p1510:revInfo xmlns:a="http://schemas.openxmlformats.org/drawingml/2006/main" xmlns:r="http://schemas.openxmlformats.org/officeDocument/2006/relationships" xmlns:p1510="http://schemas.microsoft.com/office/powerpoint/2015/10/main">
   <p1510:revLst>
-    <p1510:client id="{2F841D68-50EA-48FE-B1C6-1A0B49E241EB}" v="71" dt="2024-05-27T14:23:23.008"/>
+    <p1510:client id="{2F841D68-50EA-48FE-B1C6-1A0B49E241EB}" v="117" dt="2024-05-28T08:05:23.506"/>
   </p1510:revLst>
 </p1510:revInfo>
 </file>
@@ -135,7 +135,7 @@
   <pc:docChgLst>
     <pc:chgData name="Richard Hunt" userId="a9b14997-caef-4159-8c34-0f67c79d0d7a" providerId="ADAL" clId="{2F841D68-50EA-48FE-B1C6-1A0B49E241EB}"/>
     <pc:docChg chg="undo custSel addSld delSld modSld sldOrd">
-      <pc:chgData name="Richard Hunt" userId="a9b14997-caef-4159-8c34-0f67c79d0d7a" providerId="ADAL" clId="{2F841D68-50EA-48FE-B1C6-1A0B49E241EB}" dt="2024-05-27T14:23:26.022" v="1766" actId="1076"/>
+      <pc:chgData name="Richard Hunt" userId="a9b14997-caef-4159-8c34-0f67c79d0d7a" providerId="ADAL" clId="{2F841D68-50EA-48FE-B1C6-1A0B49E241EB}" dt="2024-05-28T11:14:35.470" v="2269" actId="20577"/>
       <pc:docMkLst>
         <pc:docMk/>
       </pc:docMkLst>
@@ -869,7 +869,7 @@
         </pc:sldMkLst>
       </pc:sldChg>
       <pc:sldChg chg="addSp delSp modSp add mod modNotesTx">
-        <pc:chgData name="Richard Hunt" userId="a9b14997-caef-4159-8c34-0f67c79d0d7a" providerId="ADAL" clId="{2F841D68-50EA-48FE-B1C6-1A0B49E241EB}" dt="2024-05-27T14:15:34.929" v="1687" actId="207"/>
+        <pc:chgData name="Richard Hunt" userId="a9b14997-caef-4159-8c34-0f67c79d0d7a" providerId="ADAL" clId="{2F841D68-50EA-48FE-B1C6-1A0B49E241EB}" dt="2024-05-28T07:19:54" v="1767" actId="33524"/>
         <pc:sldMkLst>
           <pc:docMk/>
           <pc:sldMk cId="2972220020" sldId="262"/>
@@ -1132,11 +1132,19 @@
         </pc:spChg>
       </pc:sldChg>
       <pc:sldChg chg="addSp delSp modSp new mod modNotesTx">
-        <pc:chgData name="Richard Hunt" userId="a9b14997-caef-4159-8c34-0f67c79d0d7a" providerId="ADAL" clId="{2F841D68-50EA-48FE-B1C6-1A0B49E241EB}" dt="2024-05-27T14:23:26.022" v="1766" actId="1076"/>
+        <pc:chgData name="Richard Hunt" userId="a9b14997-caef-4159-8c34-0f67c79d0d7a" providerId="ADAL" clId="{2F841D68-50EA-48FE-B1C6-1A0B49E241EB}" dt="2024-05-28T11:14:35.470" v="2269" actId="20577"/>
         <pc:sldMkLst>
           <pc:docMk/>
           <pc:sldMk cId="426601687" sldId="263"/>
         </pc:sldMkLst>
+        <pc:spChg chg="add mod">
+          <ac:chgData name="Richard Hunt" userId="a9b14997-caef-4159-8c34-0f67c79d0d7a" providerId="ADAL" clId="{2F841D68-50EA-48FE-B1C6-1A0B49E241EB}" dt="2024-05-28T07:38:29.300" v="2117" actId="1076"/>
+          <ac:spMkLst>
+            <pc:docMk/>
+            <pc:sldMk cId="426601687" sldId="263"/>
+            <ac:spMk id="2" creationId="{57B7AC05-D919-115B-925A-3F8828DAFFE0}"/>
+          </ac:spMkLst>
+        </pc:spChg>
         <pc:spChg chg="del">
           <ac:chgData name="Richard Hunt" userId="a9b14997-caef-4159-8c34-0f67c79d0d7a" providerId="ADAL" clId="{2F841D68-50EA-48FE-B1C6-1A0B49E241EB}" dt="2024-05-27T14:22:06.711" v="1689" actId="478"/>
           <ac:spMkLst>
@@ -1154,13 +1162,29 @@
           </ac:spMkLst>
         </pc:spChg>
         <pc:spChg chg="add mod">
-          <ac:chgData name="Richard Hunt" userId="a9b14997-caef-4159-8c34-0f67c79d0d7a" providerId="ADAL" clId="{2F841D68-50EA-48FE-B1C6-1A0B49E241EB}" dt="2024-05-27T14:22:36.584" v="1741" actId="207"/>
+          <ac:chgData name="Richard Hunt" userId="a9b14997-caef-4159-8c34-0f67c79d0d7a" providerId="ADAL" clId="{2F841D68-50EA-48FE-B1C6-1A0B49E241EB}" dt="2024-05-28T11:11:45.164" v="2219" actId="1076"/>
+          <ac:spMkLst>
+            <pc:docMk/>
+            <pc:sldMk cId="426601687" sldId="263"/>
+            <ac:spMk id="3" creationId="{C097A44F-7CAD-8D80-A096-722006597512}"/>
+          </ac:spMkLst>
+        </pc:spChg>
+        <pc:spChg chg="add del mod">
+          <ac:chgData name="Richard Hunt" userId="a9b14997-caef-4159-8c34-0f67c79d0d7a" providerId="ADAL" clId="{2F841D68-50EA-48FE-B1C6-1A0B49E241EB}" dt="2024-05-28T07:34:53.187" v="2078" actId="207"/>
           <ac:spMkLst>
             <pc:docMk/>
             <pc:sldMk cId="426601687" sldId="263"/>
             <ac:spMk id="4" creationId="{AE96A136-589B-FF96-8B0D-9907D65CB441}"/>
           </ac:spMkLst>
         </pc:spChg>
+        <pc:spChg chg="add mod">
+          <ac:chgData name="Richard Hunt" userId="a9b14997-caef-4159-8c34-0f67c79d0d7a" providerId="ADAL" clId="{2F841D68-50EA-48FE-B1C6-1A0B49E241EB}" dt="2024-05-28T07:37:16.189" v="2102" actId="1076"/>
+          <ac:spMkLst>
+            <pc:docMk/>
+            <pc:sldMk cId="426601687" sldId="263"/>
+            <ac:spMk id="5" creationId="{3D1E742B-7A73-69D3-3B44-F769BF154CCE}"/>
+          </ac:spMkLst>
+        </pc:spChg>
         <pc:spChg chg="add del mod">
           <ac:chgData name="Richard Hunt" userId="a9b14997-caef-4159-8c34-0f67c79d0d7a" providerId="ADAL" clId="{2F841D68-50EA-48FE-B1C6-1A0B49E241EB}" dt="2024-05-27T14:22:43.214" v="1745"/>
           <ac:spMkLst>
@@ -1170,7 +1194,7 @@
           </ac:spMkLst>
         </pc:spChg>
         <pc:spChg chg="add mod">
-          <ac:chgData name="Richard Hunt" userId="a9b14997-caef-4159-8c34-0f67c79d0d7a" providerId="ADAL" clId="{2F841D68-50EA-48FE-B1C6-1A0B49E241EB}" dt="2024-05-27T14:23:00.331" v="1747" actId="1076"/>
+          <ac:chgData name="Richard Hunt" userId="a9b14997-caef-4159-8c34-0f67c79d0d7a" providerId="ADAL" clId="{2F841D68-50EA-48FE-B1C6-1A0B49E241EB}" dt="2024-05-28T07:28:17.527" v="1995" actId="1076"/>
           <ac:spMkLst>
             <pc:docMk/>
             <pc:sldMk cId="426601687" sldId="263"/>
@@ -1178,7 +1202,7 @@
           </ac:spMkLst>
         </pc:spChg>
         <pc:spChg chg="add mod">
-          <ac:chgData name="Richard Hunt" userId="a9b14997-caef-4159-8c34-0f67c79d0d7a" providerId="ADAL" clId="{2F841D68-50EA-48FE-B1C6-1A0B49E241EB}" dt="2024-05-27T14:23:00.331" v="1747" actId="1076"/>
+          <ac:chgData name="Richard Hunt" userId="a9b14997-caef-4159-8c34-0f67c79d0d7a" providerId="ADAL" clId="{2F841D68-50EA-48FE-B1C6-1A0B49E241EB}" dt="2024-05-28T07:30:54.804" v="2020" actId="1076"/>
           <ac:spMkLst>
             <pc:docMk/>
             <pc:sldMk cId="426601687" sldId="263"/>
@@ -1186,7 +1210,7 @@
           </ac:spMkLst>
         </pc:spChg>
         <pc:spChg chg="add mod">
-          <ac:chgData name="Richard Hunt" userId="a9b14997-caef-4159-8c34-0f67c79d0d7a" providerId="ADAL" clId="{2F841D68-50EA-48FE-B1C6-1A0B49E241EB}" dt="2024-05-27T14:23:00.331" v="1747" actId="1076"/>
+          <ac:chgData name="Richard Hunt" userId="a9b14997-caef-4159-8c34-0f67c79d0d7a" providerId="ADAL" clId="{2F841D68-50EA-48FE-B1C6-1A0B49E241EB}" dt="2024-05-28T07:30:57.556" v="2021" actId="1076"/>
           <ac:spMkLst>
             <pc:docMk/>
             <pc:sldMk cId="426601687" sldId="263"/>
@@ -1194,7 +1218,7 @@
           </ac:spMkLst>
         </pc:spChg>
         <pc:spChg chg="add mod">
-          <ac:chgData name="Richard Hunt" userId="a9b14997-caef-4159-8c34-0f67c79d0d7a" providerId="ADAL" clId="{2F841D68-50EA-48FE-B1C6-1A0B49E241EB}" dt="2024-05-27T14:23:00.331" v="1747" actId="1076"/>
+          <ac:chgData name="Richard Hunt" userId="a9b14997-caef-4159-8c34-0f67c79d0d7a" providerId="ADAL" clId="{2F841D68-50EA-48FE-B1C6-1A0B49E241EB}" dt="2024-05-28T07:40:57.716" v="2148" actId="1076"/>
           <ac:spMkLst>
             <pc:docMk/>
             <pc:sldMk cId="426601687" sldId="263"/>
@@ -1202,7 +1226,7 @@
           </ac:spMkLst>
         </pc:spChg>
         <pc:spChg chg="add mod">
-          <ac:chgData name="Richard Hunt" userId="a9b14997-caef-4159-8c34-0f67c79d0d7a" providerId="ADAL" clId="{2F841D68-50EA-48FE-B1C6-1A0B49E241EB}" dt="2024-05-27T14:23:00.331" v="1747" actId="1076"/>
+          <ac:chgData name="Richard Hunt" userId="a9b14997-caef-4159-8c34-0f67c79d0d7a" providerId="ADAL" clId="{2F841D68-50EA-48FE-B1C6-1A0B49E241EB}" dt="2024-05-28T11:11:21.204" v="2214" actId="1076"/>
           <ac:spMkLst>
             <pc:docMk/>
             <pc:sldMk cId="426601687" sldId="263"/>
@@ -1210,7 +1234,7 @@
           </ac:spMkLst>
         </pc:spChg>
         <pc:spChg chg="add mod">
-          <ac:chgData name="Richard Hunt" userId="a9b14997-caef-4159-8c34-0f67c79d0d7a" providerId="ADAL" clId="{2F841D68-50EA-48FE-B1C6-1A0B49E241EB}" dt="2024-05-27T14:23:18.024" v="1764" actId="1076"/>
+          <ac:chgData name="Richard Hunt" userId="a9b14997-caef-4159-8c34-0f67c79d0d7a" providerId="ADAL" clId="{2F841D68-50EA-48FE-B1C6-1A0B49E241EB}" dt="2024-05-28T11:11:42.492" v="2218" actId="1076"/>
           <ac:spMkLst>
             <pc:docMk/>
             <pc:sldMk cId="426601687" sldId="263"/>
@@ -1218,13 +1242,349 @@
           </ac:spMkLst>
         </pc:spChg>
         <pc:spChg chg="add mod">
-          <ac:chgData name="Richard Hunt" userId="a9b14997-caef-4159-8c34-0f67c79d0d7a" providerId="ADAL" clId="{2F841D68-50EA-48FE-B1C6-1A0B49E241EB}" dt="2024-05-27T14:23:26.022" v="1766" actId="1076"/>
+          <ac:chgData name="Richard Hunt" userId="a9b14997-caef-4159-8c34-0f67c79d0d7a" providerId="ADAL" clId="{2F841D68-50EA-48FE-B1C6-1A0B49E241EB}" dt="2024-05-28T07:38:29.300" v="2117" actId="1076"/>
           <ac:spMkLst>
             <pc:docMk/>
             <pc:sldMk cId="426601687" sldId="263"/>
             <ac:spMk id="12" creationId="{7C68ACF9-7447-93CB-B943-B78E91EC7E59}"/>
           </ac:spMkLst>
         </pc:spChg>
+        <pc:spChg chg="add mod">
+          <ac:chgData name="Richard Hunt" userId="a9b14997-caef-4159-8c34-0f67c79d0d7a" providerId="ADAL" clId="{2F841D68-50EA-48FE-B1C6-1A0B49E241EB}" dt="2024-05-28T07:38:36.685" v="2119" actId="1076"/>
+          <ac:spMkLst>
+            <pc:docMk/>
+            <pc:sldMk cId="426601687" sldId="263"/>
+            <ac:spMk id="13" creationId="{4D1529FF-B46B-19A1-E2E5-67C07CC90176}"/>
+          </ac:spMkLst>
+        </pc:spChg>
+        <pc:spChg chg="add mod">
+          <ac:chgData name="Richard Hunt" userId="a9b14997-caef-4159-8c34-0f67c79d0d7a" providerId="ADAL" clId="{2F841D68-50EA-48FE-B1C6-1A0B49E241EB}" dt="2024-05-28T07:42:24.517" v="2162" actId="1076"/>
+          <ac:spMkLst>
+            <pc:docMk/>
+            <pc:sldMk cId="426601687" sldId="263"/>
+            <ac:spMk id="14" creationId="{9D49291E-8889-8C05-5DC4-F6C45DB5727C}"/>
+          </ac:spMkLst>
+        </pc:spChg>
+        <pc:spChg chg="add mod">
+          <ac:chgData name="Richard Hunt" userId="a9b14997-caef-4159-8c34-0f67c79d0d7a" providerId="ADAL" clId="{2F841D68-50EA-48FE-B1C6-1A0B49E241EB}" dt="2024-05-28T07:39:40.476" v="2124" actId="1076"/>
+          <ac:spMkLst>
+            <pc:docMk/>
+            <pc:sldMk cId="426601687" sldId="263"/>
+            <ac:spMk id="15" creationId="{1CB9BD67-C97A-6091-3C8F-9BF4B5CEF232}"/>
+          </ac:spMkLst>
+        </pc:spChg>
+        <pc:spChg chg="add mod">
+          <ac:chgData name="Richard Hunt" userId="a9b14997-caef-4159-8c34-0f67c79d0d7a" providerId="ADAL" clId="{2F841D68-50EA-48FE-B1C6-1A0B49E241EB}" dt="2024-05-28T07:40:48.810" v="2147" actId="1076"/>
+          <ac:spMkLst>
+            <pc:docMk/>
+            <pc:sldMk cId="426601687" sldId="263"/>
+            <ac:spMk id="16" creationId="{98C4F7C1-1F13-C592-A65C-F8596AF04A1A}"/>
+          </ac:spMkLst>
+        </pc:spChg>
+        <pc:spChg chg="add mod">
+          <ac:chgData name="Richard Hunt" userId="a9b14997-caef-4159-8c34-0f67c79d0d7a" providerId="ADAL" clId="{2F841D68-50EA-48FE-B1C6-1A0B49E241EB}" dt="2024-05-28T07:30:52.061" v="2019" actId="1076"/>
+          <ac:spMkLst>
+            <pc:docMk/>
+            <pc:sldMk cId="426601687" sldId="263"/>
+            <ac:spMk id="17" creationId="{B3EC28AE-DBCE-7B5E-6BAA-498EBC0469A5}"/>
+          </ac:spMkLst>
+        </pc:spChg>
+        <pc:spChg chg="add mod">
+          <ac:chgData name="Richard Hunt" userId="a9b14997-caef-4159-8c34-0f67c79d0d7a" providerId="ADAL" clId="{2F841D68-50EA-48FE-B1C6-1A0B49E241EB}" dt="2024-05-28T11:14:35.470" v="2269" actId="20577"/>
+          <ac:spMkLst>
+            <pc:docMk/>
+            <pc:sldMk cId="426601687" sldId="263"/>
+            <ac:spMk id="18" creationId="{77628194-D682-3B11-489B-A493A4B688AC}"/>
+          </ac:spMkLst>
+        </pc:spChg>
+        <pc:spChg chg="add del mod">
+          <ac:chgData name="Richard Hunt" userId="a9b14997-caef-4159-8c34-0f67c79d0d7a" providerId="ADAL" clId="{2F841D68-50EA-48FE-B1C6-1A0B49E241EB}" dt="2024-05-28T07:28:50.710" v="2003" actId="21"/>
+          <ac:spMkLst>
+            <pc:docMk/>
+            <pc:sldMk cId="426601687" sldId="263"/>
+            <ac:spMk id="19" creationId="{CF14D663-B761-E9BA-FB9A-D273F2C8A6BD}"/>
+          </ac:spMkLst>
+        </pc:spChg>
+        <pc:spChg chg="add del mod">
+          <ac:chgData name="Richard Hunt" userId="a9b14997-caef-4159-8c34-0f67c79d0d7a" providerId="ADAL" clId="{2F841D68-50EA-48FE-B1C6-1A0B49E241EB}" dt="2024-05-28T07:28:50.710" v="2003" actId="21"/>
+          <ac:spMkLst>
+            <pc:docMk/>
+            <pc:sldMk cId="426601687" sldId="263"/>
+            <ac:spMk id="20" creationId="{58920C4F-F8AF-6597-2EBC-0BA6376682EC}"/>
+          </ac:spMkLst>
+        </pc:spChg>
+        <pc:spChg chg="add del mod">
+          <ac:chgData name="Richard Hunt" userId="a9b14997-caef-4159-8c34-0f67c79d0d7a" providerId="ADAL" clId="{2F841D68-50EA-48FE-B1C6-1A0B49E241EB}" dt="2024-05-28T07:25:40.962" v="1972" actId="478"/>
+          <ac:spMkLst>
+            <pc:docMk/>
+            <pc:sldMk cId="426601687" sldId="263"/>
+            <ac:spMk id="21" creationId="{52490C37-DF0D-E59E-05C4-6E21444B1673}"/>
+          </ac:spMkLst>
+        </pc:spChg>
+        <pc:spChg chg="add mod">
+          <ac:chgData name="Richard Hunt" userId="a9b14997-caef-4159-8c34-0f67c79d0d7a" providerId="ADAL" clId="{2F841D68-50EA-48FE-B1C6-1A0B49E241EB}" dt="2024-05-28T11:11:36.253" v="2217" actId="1076"/>
+          <ac:spMkLst>
+            <pc:docMk/>
+            <pc:sldMk cId="426601687" sldId="263"/>
+            <ac:spMk id="22" creationId="{4EA857EB-BA8C-4DE1-9837-06ED114B81AF}"/>
+          </ac:spMkLst>
+        </pc:spChg>
+        <pc:spChg chg="add mod ord">
+          <ac:chgData name="Richard Hunt" userId="a9b14997-caef-4159-8c34-0f67c79d0d7a" providerId="ADAL" clId="{2F841D68-50EA-48FE-B1C6-1A0B49E241EB}" dt="2024-05-28T07:32:13.022" v="2034" actId="20577"/>
+          <ac:spMkLst>
+            <pc:docMk/>
+            <pc:sldMk cId="426601687" sldId="263"/>
+            <ac:spMk id="23" creationId="{9329C37C-4B77-229F-5931-3129A83227BA}"/>
+          </ac:spMkLst>
+        </pc:spChg>
+        <pc:spChg chg="add mod">
+          <ac:chgData name="Richard Hunt" userId="a9b14997-caef-4159-8c34-0f67c79d0d7a" providerId="ADAL" clId="{2F841D68-50EA-48FE-B1C6-1A0B49E241EB}" dt="2024-05-28T07:38:14.531" v="2114" actId="1076"/>
+          <ac:spMkLst>
+            <pc:docMk/>
+            <pc:sldMk cId="426601687" sldId="263"/>
+            <ac:spMk id="24" creationId="{CF14D663-B761-E9BA-FB9A-D273F2C8A6BD}"/>
+          </ac:spMkLst>
+        </pc:spChg>
+        <pc:spChg chg="add mod">
+          <ac:chgData name="Richard Hunt" userId="a9b14997-caef-4159-8c34-0f67c79d0d7a" providerId="ADAL" clId="{2F841D68-50EA-48FE-B1C6-1A0B49E241EB}" dt="2024-05-28T07:39:52.412" v="2127" actId="1076"/>
+          <ac:spMkLst>
+            <pc:docMk/>
+            <pc:sldMk cId="426601687" sldId="263"/>
+            <ac:spMk id="25" creationId="{58920C4F-F8AF-6597-2EBC-0BA6376682EC}"/>
+          </ac:spMkLst>
+        </pc:spChg>
+        <pc:spChg chg="add mod">
+          <ac:chgData name="Richard Hunt" userId="a9b14997-caef-4159-8c34-0f67c79d0d7a" providerId="ADAL" clId="{2F841D68-50EA-48FE-B1C6-1A0B49E241EB}" dt="2024-05-28T07:45:40.180" v="2202" actId="1076"/>
+          <ac:spMkLst>
+            <pc:docMk/>
+            <pc:sldMk cId="426601687" sldId="263"/>
+            <ac:spMk id="26" creationId="{020CB41B-D960-472B-8F62-E8C361094753}"/>
+          </ac:spMkLst>
+        </pc:spChg>
+        <pc:spChg chg="add del mod">
+          <ac:chgData name="Richard Hunt" userId="a9b14997-caef-4159-8c34-0f67c79d0d7a" providerId="ADAL" clId="{2F841D68-50EA-48FE-B1C6-1A0B49E241EB}" dt="2024-05-28T07:40:17.386" v="2133" actId="21"/>
+          <ac:spMkLst>
+            <pc:docMk/>
+            <pc:sldMk cId="426601687" sldId="263"/>
+            <ac:spMk id="27" creationId="{61124D60-B609-874F-9437-A9C93CD7DB02}"/>
+          </ac:spMkLst>
+        </pc:spChg>
+        <pc:spChg chg="add del mod">
+          <ac:chgData name="Richard Hunt" userId="a9b14997-caef-4159-8c34-0f67c79d0d7a" providerId="ADAL" clId="{2F841D68-50EA-48FE-B1C6-1A0B49E241EB}" dt="2024-05-28T07:43:21.457" v="2195" actId="478"/>
+          <ac:spMkLst>
+            <pc:docMk/>
+            <pc:sldMk cId="426601687" sldId="263"/>
+            <ac:spMk id="28" creationId="{0F22BBE3-78FF-CEB4-2F8A-5B1B3B6C8639}"/>
+          </ac:spMkLst>
+        </pc:spChg>
+        <pc:spChg chg="add mod">
+          <ac:chgData name="Richard Hunt" userId="a9b14997-caef-4159-8c34-0f67c79d0d7a" providerId="ADAL" clId="{2F841D68-50EA-48FE-B1C6-1A0B49E241EB}" dt="2024-05-28T11:11:42.492" v="2218" actId="1076"/>
+          <ac:spMkLst>
+            <pc:docMk/>
+            <pc:sldMk cId="426601687" sldId="263"/>
+            <ac:spMk id="29" creationId="{7DCFBF6A-43D7-82A9-6CED-023EC5EFC87B}"/>
+          </ac:spMkLst>
+        </pc:spChg>
+        <pc:spChg chg="add mod">
+          <ac:chgData name="Richard Hunt" userId="a9b14997-caef-4159-8c34-0f67c79d0d7a" providerId="ADAL" clId="{2F841D68-50EA-48FE-B1C6-1A0B49E241EB}" dt="2024-05-28T11:11:45.164" v="2219" actId="1076"/>
+          <ac:spMkLst>
+            <pc:docMk/>
+            <pc:sldMk cId="426601687" sldId="263"/>
+            <ac:spMk id="30" creationId="{6E51B4CC-2BC9-4383-E5CE-638BCA721717}"/>
+          </ac:spMkLst>
+        </pc:spChg>
+        <pc:spChg chg="add mod">
+          <ac:chgData name="Richard Hunt" userId="a9b14997-caef-4159-8c34-0f67c79d0d7a" providerId="ADAL" clId="{2F841D68-50EA-48FE-B1C6-1A0B49E241EB}" dt="2024-05-28T07:37:24.166" v="2105" actId="1076"/>
+          <ac:spMkLst>
+            <pc:docMk/>
+            <pc:sldMk cId="426601687" sldId="263"/>
+            <ac:spMk id="31" creationId="{A0E99404-7C1D-EE35-BAB5-5687B60F64DF}"/>
+          </ac:spMkLst>
+        </pc:spChg>
+        <pc:spChg chg="add mod">
+          <ac:chgData name="Richard Hunt" userId="a9b14997-caef-4159-8c34-0f67c79d0d7a" providerId="ADAL" clId="{2F841D68-50EA-48FE-B1C6-1A0B49E241EB}" dt="2024-05-28T07:37:52.405" v="2110" actId="1076"/>
+          <ac:spMkLst>
+            <pc:docMk/>
+            <pc:sldMk cId="426601687" sldId="263"/>
+            <ac:spMk id="32" creationId="{F13202F1-586E-9DEC-37B7-FE1C0CE67776}"/>
+          </ac:spMkLst>
+        </pc:spChg>
+        <pc:spChg chg="add mod">
+          <ac:chgData name="Richard Hunt" userId="a9b14997-caef-4159-8c34-0f67c79d0d7a" providerId="ADAL" clId="{2F841D68-50EA-48FE-B1C6-1A0B49E241EB}" dt="2024-05-28T07:38:33.059" v="2118" actId="1076"/>
+          <ac:spMkLst>
+            <pc:docMk/>
+            <pc:sldMk cId="426601687" sldId="263"/>
+            <ac:spMk id="33" creationId="{BE852F29-5C6C-7C2A-C48E-02A1D3CB3334}"/>
+          </ac:spMkLst>
+        </pc:spChg>
+        <pc:spChg chg="add mod">
+          <ac:chgData name="Richard Hunt" userId="a9b14997-caef-4159-8c34-0f67c79d0d7a" providerId="ADAL" clId="{2F841D68-50EA-48FE-B1C6-1A0B49E241EB}" dt="2024-05-28T07:39:48.436" v="2126" actId="1076"/>
+          <ac:spMkLst>
+            <pc:docMk/>
+            <pc:sldMk cId="426601687" sldId="263"/>
+            <ac:spMk id="36" creationId="{BF7805D2-AD9B-70A9-AC8F-3398FFA11099}"/>
+          </ac:spMkLst>
+        </pc:spChg>
+        <pc:spChg chg="add mod">
+          <ac:chgData name="Richard Hunt" userId="a9b14997-caef-4159-8c34-0f67c79d0d7a" providerId="ADAL" clId="{2F841D68-50EA-48FE-B1C6-1A0B49E241EB}" dt="2024-05-28T07:40:01.405" v="2130" actId="1076"/>
+          <ac:spMkLst>
+            <pc:docMk/>
+            <pc:sldMk cId="426601687" sldId="263"/>
+            <ac:spMk id="37" creationId="{8EEEA62C-EC86-DFD5-010A-6DC8A6B86B5E}"/>
+          </ac:spMkLst>
+        </pc:spChg>
+        <pc:spChg chg="add mod">
+          <ac:chgData name="Richard Hunt" userId="a9b14997-caef-4159-8c34-0f67c79d0d7a" providerId="ADAL" clId="{2F841D68-50EA-48FE-B1C6-1A0B49E241EB}" dt="2024-05-28T07:40:05.092" v="2132" actId="1076"/>
+          <ac:spMkLst>
+            <pc:docMk/>
+            <pc:sldMk cId="426601687" sldId="263"/>
+            <ac:spMk id="38" creationId="{F354B7F0-A271-95AF-1F18-4C9B74FBA0F6}"/>
+          </ac:spMkLst>
+        </pc:spChg>
+        <pc:spChg chg="add mod">
+          <ac:chgData name="Richard Hunt" userId="a9b14997-caef-4159-8c34-0f67c79d0d7a" providerId="ADAL" clId="{2F841D68-50EA-48FE-B1C6-1A0B49E241EB}" dt="2024-05-28T11:11:14.621" v="2213" actId="1076"/>
+          <ac:spMkLst>
+            <pc:docMk/>
+            <pc:sldMk cId="426601687" sldId="263"/>
+            <ac:spMk id="39" creationId="{61124D60-B609-874F-9437-A9C93CD7DB02}"/>
+          </ac:spMkLst>
+        </pc:spChg>
+        <pc:spChg chg="add mod">
+          <ac:chgData name="Richard Hunt" userId="a9b14997-caef-4159-8c34-0f67c79d0d7a" providerId="ADAL" clId="{2F841D68-50EA-48FE-B1C6-1A0B49E241EB}" dt="2024-05-28T07:40:27.075" v="2138" actId="14100"/>
+          <ac:spMkLst>
+            <pc:docMk/>
+            <pc:sldMk cId="426601687" sldId="263"/>
+            <ac:spMk id="40" creationId="{4205E722-1519-6E6A-FE97-61BF5F5C86FD}"/>
+          </ac:spMkLst>
+        </pc:spChg>
+        <pc:spChg chg="add mod">
+          <ac:chgData name="Richard Hunt" userId="a9b14997-caef-4159-8c34-0f67c79d0d7a" providerId="ADAL" clId="{2F841D68-50EA-48FE-B1C6-1A0B49E241EB}" dt="2024-05-28T07:40:33.006" v="2140" actId="1076"/>
+          <ac:spMkLst>
+            <pc:docMk/>
+            <pc:sldMk cId="426601687" sldId="263"/>
+            <ac:spMk id="41" creationId="{1273F538-6D07-970D-D548-0A1A011201EA}"/>
+          </ac:spMkLst>
+        </pc:spChg>
+        <pc:spChg chg="add mod">
+          <ac:chgData name="Richard Hunt" userId="a9b14997-caef-4159-8c34-0f67c79d0d7a" providerId="ADAL" clId="{2F841D68-50EA-48FE-B1C6-1A0B49E241EB}" dt="2024-05-28T07:40:38.142" v="2142" actId="1076"/>
+          <ac:spMkLst>
+            <pc:docMk/>
+            <pc:sldMk cId="426601687" sldId="263"/>
+            <ac:spMk id="42" creationId="{EFC7D3C3-2265-7818-9D01-BA3C30D985BD}"/>
+          </ac:spMkLst>
+        </pc:spChg>
+        <pc:spChg chg="add mod">
+          <ac:chgData name="Richard Hunt" userId="a9b14997-caef-4159-8c34-0f67c79d0d7a" providerId="ADAL" clId="{2F841D68-50EA-48FE-B1C6-1A0B49E241EB}" dt="2024-05-28T07:40:41.853" v="2144" actId="1076"/>
+          <ac:spMkLst>
+            <pc:docMk/>
+            <pc:sldMk cId="426601687" sldId="263"/>
+            <ac:spMk id="43" creationId="{134924FF-4EB6-9186-E59A-70C8C175AC42}"/>
+          </ac:spMkLst>
+        </pc:spChg>
+        <pc:spChg chg="add mod">
+          <ac:chgData name="Richard Hunt" userId="a9b14997-caef-4159-8c34-0f67c79d0d7a" providerId="ADAL" clId="{2F841D68-50EA-48FE-B1C6-1A0B49E241EB}" dt="2024-05-28T07:40:45.991" v="2146" actId="1076"/>
+          <ac:spMkLst>
+            <pc:docMk/>
+            <pc:sldMk cId="426601687" sldId="263"/>
+            <ac:spMk id="44" creationId="{42B03740-B723-B1AA-37BA-893E56B0BD17}"/>
+          </ac:spMkLst>
+        </pc:spChg>
+        <pc:spChg chg="add mod">
+          <ac:chgData name="Richard Hunt" userId="a9b14997-caef-4159-8c34-0f67c79d0d7a" providerId="ADAL" clId="{2F841D68-50EA-48FE-B1C6-1A0B49E241EB}" dt="2024-05-28T07:41:07.621" v="2151" actId="1076"/>
+          <ac:spMkLst>
+            <pc:docMk/>
+            <pc:sldMk cId="426601687" sldId="263"/>
+            <ac:spMk id="45" creationId="{EEF76082-6316-578A-30A9-6F5348247097}"/>
+          </ac:spMkLst>
+        </pc:spChg>
+        <pc:spChg chg="add mod">
+          <ac:chgData name="Richard Hunt" userId="a9b14997-caef-4159-8c34-0f67c79d0d7a" providerId="ADAL" clId="{2F841D68-50EA-48FE-B1C6-1A0B49E241EB}" dt="2024-05-28T07:43:58.154" v="2200" actId="1076"/>
+          <ac:spMkLst>
+            <pc:docMk/>
+            <pc:sldMk cId="426601687" sldId="263"/>
+            <ac:spMk id="46" creationId="{4A3C4382-69C8-753C-345C-4F3AEFB817DA}"/>
+          </ac:spMkLst>
+        </pc:spChg>
+        <pc:spChg chg="add mod">
+          <ac:chgData name="Richard Hunt" userId="a9b14997-caef-4159-8c34-0f67c79d0d7a" providerId="ADAL" clId="{2F841D68-50EA-48FE-B1C6-1A0B49E241EB}" dt="2024-05-28T11:11:32.941" v="2216" actId="1076"/>
+          <ac:spMkLst>
+            <pc:docMk/>
+            <pc:sldMk cId="426601687" sldId="263"/>
+            <ac:spMk id="47" creationId="{DB73014A-B986-FDF5-38C9-F542BB11E27A}"/>
+          </ac:spMkLst>
+        </pc:spChg>
+        <pc:spChg chg="add mod">
+          <ac:chgData name="Richard Hunt" userId="a9b14997-caef-4159-8c34-0f67c79d0d7a" providerId="ADAL" clId="{2F841D68-50EA-48FE-B1C6-1A0B49E241EB}" dt="2024-05-28T07:42:32.757" v="2164" actId="1076"/>
+          <ac:spMkLst>
+            <pc:docMk/>
+            <pc:sldMk cId="426601687" sldId="263"/>
+            <ac:spMk id="48" creationId="{0FC321D9-A3AC-5D36-1CAD-15771F345A80}"/>
+          </ac:spMkLst>
+        </pc:spChg>
+        <pc:spChg chg="add mod">
+          <ac:chgData name="Richard Hunt" userId="a9b14997-caef-4159-8c34-0f67c79d0d7a" providerId="ADAL" clId="{2F841D68-50EA-48FE-B1C6-1A0B49E241EB}" dt="2024-05-28T11:10:52.749" v="2211" actId="1076"/>
+          <ac:spMkLst>
+            <pc:docMk/>
+            <pc:sldMk cId="426601687" sldId="263"/>
+            <ac:spMk id="49" creationId="{5678A88E-C7DE-1BB7-077B-A39C65D4C0A1}"/>
+          </ac:spMkLst>
+        </pc:spChg>
+        <pc:spChg chg="add mod">
+          <ac:chgData name="Richard Hunt" userId="a9b14997-caef-4159-8c34-0f67c79d0d7a" providerId="ADAL" clId="{2F841D68-50EA-48FE-B1C6-1A0B49E241EB}" dt="2024-05-28T11:10:57.251" v="2212" actId="1076"/>
+          <ac:spMkLst>
+            <pc:docMk/>
+            <pc:sldMk cId="426601687" sldId="263"/>
+            <ac:spMk id="50" creationId="{CE239332-D3CC-58A3-B373-573AEB8A215F}"/>
+          </ac:spMkLst>
+        </pc:spChg>
+        <pc:spChg chg="add mod">
+          <ac:chgData name="Richard Hunt" userId="a9b14997-caef-4159-8c34-0f67c79d0d7a" providerId="ADAL" clId="{2F841D68-50EA-48FE-B1C6-1A0B49E241EB}" dt="2024-05-28T11:11:27.710" v="2215" actId="1076"/>
+          <ac:spMkLst>
+            <pc:docMk/>
+            <pc:sldMk cId="426601687" sldId="263"/>
+            <ac:spMk id="51" creationId="{3A1600A8-DAE0-2425-929C-014E91DAFDE3}"/>
+          </ac:spMkLst>
+        </pc:spChg>
+        <pc:spChg chg="add mod">
+          <ac:chgData name="Richard Hunt" userId="a9b14997-caef-4159-8c34-0f67c79d0d7a" providerId="ADAL" clId="{2F841D68-50EA-48FE-B1C6-1A0B49E241EB}" dt="2024-05-28T11:11:27.710" v="2215" actId="1076"/>
+          <ac:spMkLst>
+            <pc:docMk/>
+            <pc:sldMk cId="426601687" sldId="263"/>
+            <ac:spMk id="52" creationId="{88FD9E95-C9A3-DE7A-80B8-74D442E50C16}"/>
+          </ac:spMkLst>
+        </pc:spChg>
+        <pc:picChg chg="add mod">
+          <ac:chgData name="Richard Hunt" userId="a9b14997-caef-4159-8c34-0f67c79d0d7a" providerId="ADAL" clId="{2F841D68-50EA-48FE-B1C6-1A0B49E241EB}" dt="2024-05-28T07:39:36.836" v="2123" actId="1076"/>
+          <ac:picMkLst>
+            <pc:docMk/>
+            <pc:sldMk cId="426601687" sldId="263"/>
+            <ac:picMk id="35" creationId="{DD4C2707-2020-9946-10BF-97D114078889}"/>
+          </ac:picMkLst>
+        </pc:picChg>
+        <pc:cxnChg chg="add mod">
+          <ac:chgData name="Richard Hunt" userId="a9b14997-caef-4159-8c34-0f67c79d0d7a" providerId="ADAL" clId="{2F841D68-50EA-48FE-B1C6-1A0B49E241EB}" dt="2024-05-28T08:05:15.599" v="2205" actId="13822"/>
+          <ac:cxnSpMkLst>
+            <pc:docMk/>
+            <pc:sldMk cId="426601687" sldId="263"/>
+            <ac:cxnSpMk id="54" creationId="{33780E27-14B3-BC38-B966-A14A128FCA39}"/>
+          </ac:cxnSpMkLst>
+        </pc:cxnChg>
+        <pc:cxnChg chg="add mod">
+          <ac:chgData name="Richard Hunt" userId="a9b14997-caef-4159-8c34-0f67c79d0d7a" providerId="ADAL" clId="{2F841D68-50EA-48FE-B1C6-1A0B49E241EB}" dt="2024-05-28T08:05:22.693" v="2207" actId="1076"/>
+          <ac:cxnSpMkLst>
+            <pc:docMk/>
+            <pc:sldMk cId="426601687" sldId="263"/>
+            <ac:cxnSpMk id="55" creationId="{C9564BDE-456B-2AF7-B5D4-3E7DDBDB8368}"/>
+          </ac:cxnSpMkLst>
+        </pc:cxnChg>
+        <pc:cxnChg chg="add mod">
+          <ac:chgData name="Richard Hunt" userId="a9b14997-caef-4159-8c34-0f67c79d0d7a" providerId="ADAL" clId="{2F841D68-50EA-48FE-B1C6-1A0B49E241EB}" dt="2024-05-28T08:05:31.774" v="2210" actId="1076"/>
+          <ac:cxnSpMkLst>
+            <pc:docMk/>
+            <pc:sldMk cId="426601687" sldId="263"/>
+            <ac:cxnSpMk id="56" creationId="{49168DC6-5905-4393-20E1-F7070F47B6B5}"/>
+          </ac:cxnSpMkLst>
+        </pc:cxnChg>
       </pc:sldChg>
     </pc:docChg>
   </pc:docChgLst>
@@ -1313,7 +1673,7 @@
           <a:p>
             <a:fld id="{4CA59C36-4B9D-4968-AA82-5235797A6441}" type="datetimeFigureOut">
               <a:rPr lang="en-GB" smtClean="0"/>
-              <a:t>27/05/2024</a:t>
+              <a:t>28/05/2024</a:t>
             </a:fld>
             <a:endParaRPr lang="en-GB"/>
           </a:p>
@@ -1837,7 +2197,7 @@
           <a:p>
             <a:r>
               <a:rPr lang="en-GB" dirty="0"/>
-              <a:t>Initially will not be customisable, but will expand later.</a:t>
+              <a:t>Initially will not be customisable but will expand later.</a:t>
             </a:r>
           </a:p>
         </p:txBody>
@@ -2114,7 +2474,7 @@
           <a:p>
             <a:fld id="{B16709D0-7582-4095-B565-6047960A4E01}" type="datetimeFigureOut">
               <a:rPr lang="en-GB" smtClean="0"/>
-              <a:t>27/05/2024</a:t>
+              <a:t>28/05/2024</a:t>
             </a:fld>
             <a:endParaRPr lang="en-GB"/>
           </a:p>
@@ -2314,7 +2674,7 @@
           <a:p>
             <a:fld id="{B16709D0-7582-4095-B565-6047960A4E01}" type="datetimeFigureOut">
               <a:rPr lang="en-GB" smtClean="0"/>
-              <a:t>27/05/2024</a:t>
+              <a:t>28/05/2024</a:t>
             </a:fld>
             <a:endParaRPr lang="en-GB"/>
           </a:p>
@@ -2524,7 +2884,7 @@
           <a:p>
             <a:fld id="{B16709D0-7582-4095-B565-6047960A4E01}" type="datetimeFigureOut">
               <a:rPr lang="en-GB" smtClean="0"/>
-              <a:t>27/05/2024</a:t>
+              <a:t>28/05/2024</a:t>
             </a:fld>
             <a:endParaRPr lang="en-GB"/>
           </a:p>
@@ -2724,7 +3084,7 @@
           <a:p>
             <a:fld id="{B16709D0-7582-4095-B565-6047960A4E01}" type="datetimeFigureOut">
               <a:rPr lang="en-GB" smtClean="0"/>
-              <a:t>27/05/2024</a:t>
+              <a:t>28/05/2024</a:t>
             </a:fld>
             <a:endParaRPr lang="en-GB"/>
           </a:p>
@@ -3000,7 +3360,7 @@
           <a:p>
             <a:fld id="{B16709D0-7582-4095-B565-6047960A4E01}" type="datetimeFigureOut">
               <a:rPr lang="en-GB" smtClean="0"/>
-              <a:t>27/05/2024</a:t>
+              <a:t>28/05/2024</a:t>
             </a:fld>
             <a:endParaRPr lang="en-GB"/>
           </a:p>
@@ -3268,7 +3628,7 @@
           <a:p>
             <a:fld id="{B16709D0-7582-4095-B565-6047960A4E01}" type="datetimeFigureOut">
               <a:rPr lang="en-GB" smtClean="0"/>
-              <a:t>27/05/2024</a:t>
+              <a:t>28/05/2024</a:t>
             </a:fld>
             <a:endParaRPr lang="en-GB"/>
           </a:p>
@@ -3683,7 +4043,7 @@
           <a:p>
             <a:fld id="{B16709D0-7582-4095-B565-6047960A4E01}" type="datetimeFigureOut">
               <a:rPr lang="en-GB" smtClean="0"/>
-              <a:t>27/05/2024</a:t>
+              <a:t>28/05/2024</a:t>
             </a:fld>
             <a:endParaRPr lang="en-GB"/>
           </a:p>
@@ -3825,7 +4185,7 @@
           <a:p>
             <a:fld id="{B16709D0-7582-4095-B565-6047960A4E01}" type="datetimeFigureOut">
               <a:rPr lang="en-GB" smtClean="0"/>
-              <a:t>27/05/2024</a:t>
+              <a:t>28/05/2024</a:t>
             </a:fld>
             <a:endParaRPr lang="en-GB"/>
           </a:p>
@@ -3938,7 +4298,7 @@
           <a:p>
             <a:fld id="{B16709D0-7582-4095-B565-6047960A4E01}" type="datetimeFigureOut">
               <a:rPr lang="en-GB" smtClean="0"/>
-              <a:t>27/05/2024</a:t>
+              <a:t>28/05/2024</a:t>
             </a:fld>
             <a:endParaRPr lang="en-GB"/>
           </a:p>
@@ -4251,7 +4611,7 @@
           <a:p>
             <a:fld id="{B16709D0-7582-4095-B565-6047960A4E01}" type="datetimeFigureOut">
               <a:rPr lang="en-GB" smtClean="0"/>
-              <a:t>27/05/2024</a:t>
+              <a:t>28/05/2024</a:t>
             </a:fld>
             <a:endParaRPr lang="en-GB"/>
           </a:p>
@@ -4540,7 +4900,7 @@
           <a:p>
             <a:fld id="{B16709D0-7582-4095-B565-6047960A4E01}" type="datetimeFigureOut">
               <a:rPr lang="en-GB" smtClean="0"/>
-              <a:t>27/05/2024</a:t>
+              <a:t>28/05/2024</a:t>
             </a:fld>
             <a:endParaRPr lang="en-GB"/>
           </a:p>
@@ -4783,7 +5143,7 @@
           <a:p>
             <a:fld id="{B16709D0-7582-4095-B565-6047960A4E01}" type="datetimeFigureOut">
               <a:rPr lang="en-GB" smtClean="0"/>
-              <a:t>27/05/2024</a:t>
+              <a:t>28/05/2024</a:t>
             </a:fld>
             <a:endParaRPr lang="en-GB"/>
           </a:p>
@@ -9535,10 +9895,10 @@
       </p:grpSpPr>
       <p:sp>
         <p:nvSpPr>
-          <p:cNvPr id="4" name="Rectangle 3">
-            <a:extLst>
-              <a:ext uri="{FF2B5EF4-FFF2-40B4-BE49-F238E27FC236}">
-                <a16:creationId xmlns:a16="http://schemas.microsoft.com/office/drawing/2014/main" id="{AE96A136-589B-FF96-8B0D-9907D65CB441}"/>
+          <p:cNvPr id="23" name="Rectangle 22">
+            <a:extLst>
+              <a:ext uri="{FF2B5EF4-FFF2-40B4-BE49-F238E27FC236}">
+                <a16:creationId xmlns:a16="http://schemas.microsoft.com/office/drawing/2014/main" id="{9329C37C-4B77-229F-5931-3129A83227BA}"/>
               </a:ext>
             </a:extLst>
           </p:cNvPr>
@@ -9547,8 +9907,8 @@
         </p:nvSpPr>
         <p:spPr>
           <a:xfrm>
-            <a:off x="2900463" y="817122"/>
-            <a:ext cx="6391073" cy="6040877"/>
+            <a:off x="5832556" y="5580"/>
+            <a:ext cx="6391073" cy="7636213"/>
           </a:xfrm>
           <a:prstGeom prst="rect">
             <a:avLst/>
@@ -9581,6 +9941,58 @@
           <a:lstStyle/>
           <a:p>
             <a:pPr algn="ctr"/>
+            <a:endParaRPr lang="en-GB" dirty="0"/>
+          </a:p>
+        </p:txBody>
+      </p:sp>
+      <p:sp>
+        <p:nvSpPr>
+          <p:cNvPr id="4" name="Rectangle 3">
+            <a:extLst>
+              <a:ext uri="{FF2B5EF4-FFF2-40B4-BE49-F238E27FC236}">
+                <a16:creationId xmlns:a16="http://schemas.microsoft.com/office/drawing/2014/main" id="{AE96A136-589B-FF96-8B0D-9907D65CB441}"/>
+              </a:ext>
+            </a:extLst>
+          </p:cNvPr>
+          <p:cNvSpPr/>
+          <p:nvPr/>
+        </p:nvSpPr>
+        <p:spPr>
+          <a:xfrm>
+            <a:off x="1" y="0"/>
+            <a:ext cx="5832556" cy="7636213"/>
+          </a:xfrm>
+          <a:prstGeom prst="rect">
+            <a:avLst/>
+          </a:prstGeom>
+          <a:solidFill>
+            <a:schemeClr val="accent6">
+              <a:lumMod val="20000"/>
+              <a:lumOff val="80000"/>
+            </a:schemeClr>
+          </a:solidFill>
+        </p:spPr>
+        <p:style>
+          <a:lnRef idx="2">
+            <a:schemeClr val="accent1">
+              <a:shade val="15000"/>
+            </a:schemeClr>
+          </a:lnRef>
+          <a:fillRef idx="1">
+            <a:schemeClr val="accent1"/>
+          </a:fillRef>
+          <a:effectRef idx="0">
+            <a:schemeClr val="accent1"/>
+          </a:effectRef>
+          <a:fontRef idx="minor">
+            <a:schemeClr val="lt1"/>
+          </a:fontRef>
+        </p:style>
+        <p:txBody>
+          <a:bodyPr rtlCol="0" anchor="ctr"/>
+          <a:lstStyle/>
+          <a:p>
+            <a:pPr algn="ctr"/>
             <a:endParaRPr lang="en-GB"/>
           </a:p>
         </p:txBody>
@@ -9599,7 +10011,7 @@
         </p:nvSpPr>
         <p:spPr>
           <a:xfrm>
-            <a:off x="3725818" y="1016837"/>
+            <a:off x="660853" y="199715"/>
             <a:ext cx="629916" cy="276999"/>
           </a:xfrm>
           <a:prstGeom prst="rect">
@@ -9634,7 +10046,7 @@
         </p:nvSpPr>
         <p:spPr>
           <a:xfrm>
-            <a:off x="4767090" y="1016836"/>
+            <a:off x="2178526" y="199715"/>
             <a:ext cx="651269" cy="276999"/>
           </a:xfrm>
           <a:prstGeom prst="rect">
@@ -9669,7 +10081,7 @@
         </p:nvSpPr>
         <p:spPr>
           <a:xfrm>
-            <a:off x="5795813" y="1006899"/>
+            <a:off x="2955397" y="189778"/>
             <a:ext cx="490262" cy="276999"/>
           </a:xfrm>
           <a:prstGeom prst="rect">
@@ -9704,7 +10116,7 @@
         </p:nvSpPr>
         <p:spPr>
           <a:xfrm>
-            <a:off x="6580539" y="1020878"/>
+            <a:off x="4473463" y="189778"/>
             <a:ext cx="612347" cy="276999"/>
           </a:xfrm>
           <a:prstGeom prst="rect">
@@ -9739,7 +10151,7 @@
         </p:nvSpPr>
         <p:spPr>
           <a:xfrm>
-            <a:off x="7448255" y="1022332"/>
+            <a:off x="3639455" y="986693"/>
             <a:ext cx="972767" cy="276999"/>
           </a:xfrm>
           <a:prstGeom prst="rect">
@@ -9774,7 +10186,7 @@
         </p:nvSpPr>
         <p:spPr>
           <a:xfrm>
-            <a:off x="3561317" y="2667297"/>
+            <a:off x="606258" y="2570810"/>
             <a:ext cx="958917" cy="276999"/>
           </a:xfrm>
           <a:prstGeom prst="rect">
@@ -9809,8 +10221,8 @@
         </p:nvSpPr>
         <p:spPr>
           <a:xfrm>
-            <a:off x="3561316" y="3699060"/>
-            <a:ext cx="958917" cy="276999"/>
+            <a:off x="6702304" y="139607"/>
+            <a:ext cx="501612" cy="276999"/>
           </a:xfrm>
           <a:prstGeom prst="rect">
             <a:avLst/>
@@ -9825,11 +10237,1721 @@
           <a:p>
             <a:r>
               <a:rPr lang="en-GB" sz="1200" u="sng" dirty="0"/>
-              <a:t>Description</a:t>
-            </a:r>
-          </a:p>
-        </p:txBody>
-      </p:sp>
+              <a:t>Data</a:t>
+            </a:r>
+          </a:p>
+        </p:txBody>
+      </p:sp>
+      <p:sp>
+        <p:nvSpPr>
+          <p:cNvPr id="2" name="TextBox 1">
+            <a:extLst>
+              <a:ext uri="{FF2B5EF4-FFF2-40B4-BE49-F238E27FC236}">
+                <a16:creationId xmlns:a16="http://schemas.microsoft.com/office/drawing/2014/main" id="{57B7AC05-D919-115B-925A-3F8828DAFFE0}"/>
+              </a:ext>
+            </a:extLst>
+          </p:cNvPr>
+          <p:cNvSpPr txBox="1"/>
+          <p:nvPr/>
+        </p:nvSpPr>
+        <p:spPr>
+          <a:xfrm>
+            <a:off x="6702304" y="1291864"/>
+            <a:ext cx="563809" cy="276999"/>
+          </a:xfrm>
+          <a:prstGeom prst="rect">
+            <a:avLst/>
+          </a:prstGeom>
+          <a:noFill/>
+        </p:spPr>
+        <p:txBody>
+          <a:bodyPr wrap="none" rtlCol="0">
+            <a:spAutoFit/>
+          </a:bodyPr>
+          <a:lstStyle/>
+          <a:p>
+            <a:r>
+              <a:rPr lang="en-GB" sz="1200" u="sng" dirty="0"/>
+              <a:t>Steps</a:t>
+            </a:r>
+          </a:p>
+        </p:txBody>
+      </p:sp>
+      <p:sp>
+        <p:nvSpPr>
+          <p:cNvPr id="3" name="TextBox 2">
+            <a:extLst>
+              <a:ext uri="{FF2B5EF4-FFF2-40B4-BE49-F238E27FC236}">
+                <a16:creationId xmlns:a16="http://schemas.microsoft.com/office/drawing/2014/main" id="{C097A44F-7CAD-8D80-A096-722006597512}"/>
+              </a:ext>
+            </a:extLst>
+          </p:cNvPr>
+          <p:cNvSpPr txBox="1"/>
+          <p:nvPr/>
+        </p:nvSpPr>
+        <p:spPr>
+          <a:xfrm>
+            <a:off x="678201" y="3878064"/>
+            <a:ext cx="1107611" cy="276999"/>
+          </a:xfrm>
+          <a:prstGeom prst="rect">
+            <a:avLst/>
+          </a:prstGeom>
+          <a:noFill/>
+        </p:spPr>
+        <p:txBody>
+          <a:bodyPr wrap="none" rtlCol="0">
+            <a:spAutoFit/>
+          </a:bodyPr>
+          <a:lstStyle/>
+          <a:p>
+            <a:r>
+              <a:rPr lang="en-GB" sz="1200" u="sng" dirty="0"/>
+              <a:t>Preconditions</a:t>
+            </a:r>
+          </a:p>
+        </p:txBody>
+      </p:sp>
+      <p:sp>
+        <p:nvSpPr>
+          <p:cNvPr id="5" name="TextBox 4">
+            <a:extLst>
+              <a:ext uri="{FF2B5EF4-FFF2-40B4-BE49-F238E27FC236}">
+                <a16:creationId xmlns:a16="http://schemas.microsoft.com/office/drawing/2014/main" id="{3D1E742B-7A73-69D3-3B44-F769BF154CCE}"/>
+              </a:ext>
+            </a:extLst>
+          </p:cNvPr>
+          <p:cNvSpPr txBox="1"/>
+          <p:nvPr/>
+        </p:nvSpPr>
+        <p:spPr>
+          <a:xfrm>
+            <a:off x="660852" y="5042973"/>
+            <a:ext cx="1180708" cy="276999"/>
+          </a:xfrm>
+          <a:prstGeom prst="rect">
+            <a:avLst/>
+          </a:prstGeom>
+          <a:noFill/>
+        </p:spPr>
+        <p:txBody>
+          <a:bodyPr wrap="none" rtlCol="0">
+            <a:spAutoFit/>
+          </a:bodyPr>
+          <a:lstStyle/>
+          <a:p>
+            <a:r>
+              <a:rPr lang="en-GB" sz="1200" u="sng" dirty="0"/>
+              <a:t>Postconditions</a:t>
+            </a:r>
+          </a:p>
+        </p:txBody>
+      </p:sp>
+      <p:sp>
+        <p:nvSpPr>
+          <p:cNvPr id="13" name="TextBox 12">
+            <a:extLst>
+              <a:ext uri="{FF2B5EF4-FFF2-40B4-BE49-F238E27FC236}">
+                <a16:creationId xmlns:a16="http://schemas.microsoft.com/office/drawing/2014/main" id="{4D1529FF-B46B-19A1-E2E5-67C07CC90176}"/>
+              </a:ext>
+            </a:extLst>
+          </p:cNvPr>
+          <p:cNvSpPr txBox="1"/>
+          <p:nvPr/>
+        </p:nvSpPr>
+        <p:spPr>
+          <a:xfrm>
+            <a:off x="6639742" y="2572341"/>
+            <a:ext cx="1044197" cy="276999"/>
+          </a:xfrm>
+          <a:prstGeom prst="rect">
+            <a:avLst/>
+          </a:prstGeom>
+          <a:noFill/>
+        </p:spPr>
+        <p:txBody>
+          <a:bodyPr wrap="none" rtlCol="0">
+            <a:spAutoFit/>
+          </a:bodyPr>
+          <a:lstStyle/>
+          <a:p>
+            <a:r>
+              <a:rPr lang="en-GB" sz="1200" u="sng" dirty="0"/>
+              <a:t>Attachments</a:t>
+            </a:r>
+          </a:p>
+        </p:txBody>
+      </p:sp>
+      <p:sp>
+        <p:nvSpPr>
+          <p:cNvPr id="14" name="TextBox 13">
+            <a:extLst>
+              <a:ext uri="{FF2B5EF4-FFF2-40B4-BE49-F238E27FC236}">
+                <a16:creationId xmlns:a16="http://schemas.microsoft.com/office/drawing/2014/main" id="{9D49291E-8889-8C05-5DC4-F6C45DB5727C}"/>
+              </a:ext>
+            </a:extLst>
+          </p:cNvPr>
+          <p:cNvSpPr txBox="1"/>
+          <p:nvPr/>
+        </p:nvSpPr>
+        <p:spPr>
+          <a:xfrm>
+            <a:off x="643176" y="961317"/>
+            <a:ext cx="925574" cy="276999"/>
+          </a:xfrm>
+          <a:prstGeom prst="rect">
+            <a:avLst/>
+          </a:prstGeom>
+          <a:noFill/>
+        </p:spPr>
+        <p:txBody>
+          <a:bodyPr wrap="none" rtlCol="0">
+            <a:spAutoFit/>
+          </a:bodyPr>
+          <a:lstStyle/>
+          <a:p>
+            <a:r>
+              <a:rPr lang="en-GB" sz="1200" u="sng" dirty="0"/>
+              <a:t>Automated</a:t>
+            </a:r>
+          </a:p>
+        </p:txBody>
+      </p:sp>
+      <p:sp>
+        <p:nvSpPr>
+          <p:cNvPr id="15" name="TextBox 14">
+            <a:extLst>
+              <a:ext uri="{FF2B5EF4-FFF2-40B4-BE49-F238E27FC236}">
+                <a16:creationId xmlns:a16="http://schemas.microsoft.com/office/drawing/2014/main" id="{1CB9BD67-C97A-6091-3C8F-9BF4B5CEF232}"/>
+              </a:ext>
+            </a:extLst>
+          </p:cNvPr>
+          <p:cNvSpPr txBox="1"/>
+          <p:nvPr/>
+        </p:nvSpPr>
+        <p:spPr>
+          <a:xfrm>
+            <a:off x="6641630" y="3217435"/>
+            <a:ext cx="1612877" cy="276999"/>
+          </a:xfrm>
+          <a:prstGeom prst="rect">
+            <a:avLst/>
+          </a:prstGeom>
+          <a:noFill/>
+        </p:spPr>
+        <p:txBody>
+          <a:bodyPr wrap="none" rtlCol="0">
+            <a:spAutoFit/>
+          </a:bodyPr>
+          <a:lstStyle/>
+          <a:p>
+            <a:r>
+              <a:rPr lang="en-GB" sz="1200" u="sng" dirty="0"/>
+              <a:t>System Configuration</a:t>
+            </a:r>
+          </a:p>
+        </p:txBody>
+      </p:sp>
+      <p:sp>
+        <p:nvSpPr>
+          <p:cNvPr id="16" name="TextBox 15">
+            <a:extLst>
+              <a:ext uri="{FF2B5EF4-FFF2-40B4-BE49-F238E27FC236}">
+                <a16:creationId xmlns:a16="http://schemas.microsoft.com/office/drawing/2014/main" id="{98C4F7C1-1F13-C592-A65C-F8596AF04A1A}"/>
+              </a:ext>
+            </a:extLst>
+          </p:cNvPr>
+          <p:cNvSpPr txBox="1"/>
+          <p:nvPr/>
+        </p:nvSpPr>
+        <p:spPr>
+          <a:xfrm>
+            <a:off x="3496261" y="199715"/>
+            <a:ext cx="926600" cy="276999"/>
+          </a:xfrm>
+          <a:prstGeom prst="rect">
+            <a:avLst/>
+          </a:prstGeom>
+          <a:noFill/>
+        </p:spPr>
+        <p:txBody>
+          <a:bodyPr wrap="none" rtlCol="0">
+            <a:spAutoFit/>
+          </a:bodyPr>
+          <a:lstStyle/>
+          <a:p>
+            <a:r>
+              <a:rPr lang="en-GB" sz="1200" u="sng" dirty="0"/>
+              <a:t>Test Run ID</a:t>
+            </a:r>
+          </a:p>
+        </p:txBody>
+      </p:sp>
+      <p:sp>
+        <p:nvSpPr>
+          <p:cNvPr id="17" name="TextBox 16">
+            <a:extLst>
+              <a:ext uri="{FF2B5EF4-FFF2-40B4-BE49-F238E27FC236}">
+                <a16:creationId xmlns:a16="http://schemas.microsoft.com/office/drawing/2014/main" id="{B3EC28AE-DBCE-7B5E-6BAA-498EBC0469A5}"/>
+              </a:ext>
+            </a:extLst>
+          </p:cNvPr>
+          <p:cNvSpPr txBox="1"/>
+          <p:nvPr/>
+        </p:nvSpPr>
+        <p:spPr>
+          <a:xfrm>
+            <a:off x="1290769" y="189778"/>
+            <a:ext cx="824713" cy="276999"/>
+          </a:xfrm>
+          <a:prstGeom prst="rect">
+            <a:avLst/>
+          </a:prstGeom>
+          <a:noFill/>
+        </p:spPr>
+        <p:txBody>
+          <a:bodyPr wrap="none" rtlCol="0">
+            <a:spAutoFit/>
+          </a:bodyPr>
+          <a:lstStyle/>
+          <a:p>
+            <a:r>
+              <a:rPr lang="en-GB" sz="1200" u="sng" dirty="0"/>
+              <a:t>Test Suite</a:t>
+            </a:r>
+          </a:p>
+        </p:txBody>
+      </p:sp>
+      <p:sp>
+        <p:nvSpPr>
+          <p:cNvPr id="18" name="TextBox 17">
+            <a:extLst>
+              <a:ext uri="{FF2B5EF4-FFF2-40B4-BE49-F238E27FC236}">
+                <a16:creationId xmlns:a16="http://schemas.microsoft.com/office/drawing/2014/main" id="{77628194-D682-3B11-489B-A493A4B688AC}"/>
+              </a:ext>
+            </a:extLst>
+          </p:cNvPr>
+          <p:cNvSpPr txBox="1"/>
+          <p:nvPr/>
+        </p:nvSpPr>
+        <p:spPr>
+          <a:xfrm>
+            <a:off x="-2078207" y="292048"/>
+            <a:ext cx="2027606" cy="1477328"/>
+          </a:xfrm>
+          <a:prstGeom prst="rect">
+            <a:avLst/>
+          </a:prstGeom>
+          <a:noFill/>
+        </p:spPr>
+        <p:txBody>
+          <a:bodyPr wrap="none" rtlCol="0">
+            <a:spAutoFit/>
+          </a:bodyPr>
+          <a:lstStyle/>
+          <a:p>
+            <a:r>
+              <a:rPr lang="en-GB" dirty="0"/>
+              <a:t>Test Planning Card</a:t>
+            </a:r>
+          </a:p>
+          <a:p>
+            <a:endParaRPr lang="en-GB" dirty="0"/>
+          </a:p>
+          <a:p>
+            <a:endParaRPr lang="en-GB" dirty="0"/>
+          </a:p>
+          <a:p>
+            <a:r>
+              <a:rPr lang="en-GB" dirty="0"/>
+              <a:t>One long card</a:t>
+            </a:r>
+          </a:p>
+          <a:p>
+            <a:r>
+              <a:rPr lang="en-GB" dirty="0"/>
+              <a:t>That is scrolled</a:t>
+            </a:r>
+          </a:p>
+        </p:txBody>
+      </p:sp>
+      <p:sp>
+        <p:nvSpPr>
+          <p:cNvPr id="22" name="TextBox 21">
+            <a:extLst>
+              <a:ext uri="{FF2B5EF4-FFF2-40B4-BE49-F238E27FC236}">
+                <a16:creationId xmlns:a16="http://schemas.microsoft.com/office/drawing/2014/main" id="{4EA857EB-BA8C-4DE1-9837-06ED114B81AF}"/>
+              </a:ext>
+            </a:extLst>
+          </p:cNvPr>
+          <p:cNvSpPr txBox="1"/>
+          <p:nvPr/>
+        </p:nvSpPr>
+        <p:spPr>
+          <a:xfrm>
+            <a:off x="2549852" y="1635882"/>
+            <a:ext cx="806311" cy="276999"/>
+          </a:xfrm>
+          <a:prstGeom prst="rect">
+            <a:avLst/>
+          </a:prstGeom>
+          <a:noFill/>
+        </p:spPr>
+        <p:txBody>
+          <a:bodyPr wrap="none" rtlCol="0">
+            <a:spAutoFit/>
+          </a:bodyPr>
+          <a:lstStyle/>
+          <a:p>
+            <a:r>
+              <a:rPr lang="en-GB" sz="1200" u="sng" dirty="0"/>
+              <a:t>Defect ID</a:t>
+            </a:r>
+          </a:p>
+        </p:txBody>
+      </p:sp>
+      <p:sp>
+        <p:nvSpPr>
+          <p:cNvPr id="24" name="TextBox 23">
+            <a:extLst>
+              <a:ext uri="{FF2B5EF4-FFF2-40B4-BE49-F238E27FC236}">
+                <a16:creationId xmlns:a16="http://schemas.microsoft.com/office/drawing/2014/main" id="{CF14D663-B761-E9BA-FB9A-D273F2C8A6BD}"/>
+              </a:ext>
+            </a:extLst>
+          </p:cNvPr>
+          <p:cNvSpPr txBox="1"/>
+          <p:nvPr/>
+        </p:nvSpPr>
+        <p:spPr>
+          <a:xfrm>
+            <a:off x="6670924" y="4450401"/>
+            <a:ext cx="1261114" cy="276999"/>
+          </a:xfrm>
+          <a:prstGeom prst="rect">
+            <a:avLst/>
+          </a:prstGeom>
+          <a:noFill/>
+        </p:spPr>
+        <p:txBody>
+          <a:bodyPr wrap="none" rtlCol="0">
+            <a:spAutoFit/>
+          </a:bodyPr>
+          <a:lstStyle/>
+          <a:p>
+            <a:r>
+              <a:rPr lang="en-GB" sz="1200" u="sng" dirty="0"/>
+              <a:t>Expected Result</a:t>
+            </a:r>
+          </a:p>
+        </p:txBody>
+      </p:sp>
+      <p:sp>
+        <p:nvSpPr>
+          <p:cNvPr id="25" name="TextBox 24">
+            <a:extLst>
+              <a:ext uri="{FF2B5EF4-FFF2-40B4-BE49-F238E27FC236}">
+                <a16:creationId xmlns:a16="http://schemas.microsoft.com/office/drawing/2014/main" id="{58920C4F-F8AF-6597-2EBC-0BA6376682EC}"/>
+              </a:ext>
+            </a:extLst>
+          </p:cNvPr>
+          <p:cNvSpPr txBox="1"/>
+          <p:nvPr/>
+        </p:nvSpPr>
+        <p:spPr>
+          <a:xfrm>
+            <a:off x="6648260" y="5505759"/>
+            <a:ext cx="1072730" cy="276999"/>
+          </a:xfrm>
+          <a:prstGeom prst="rect">
+            <a:avLst/>
+          </a:prstGeom>
+          <a:noFill/>
+        </p:spPr>
+        <p:txBody>
+          <a:bodyPr wrap="none" rtlCol="0">
+            <a:spAutoFit/>
+          </a:bodyPr>
+          <a:lstStyle/>
+          <a:p>
+            <a:r>
+              <a:rPr lang="en-GB" sz="1200" u="sng" dirty="0"/>
+              <a:t>Actual Result</a:t>
+            </a:r>
+          </a:p>
+        </p:txBody>
+      </p:sp>
+      <p:sp>
+        <p:nvSpPr>
+          <p:cNvPr id="26" name="TextBox 25">
+            <a:extLst>
+              <a:ext uri="{FF2B5EF4-FFF2-40B4-BE49-F238E27FC236}">
+                <a16:creationId xmlns:a16="http://schemas.microsoft.com/office/drawing/2014/main" id="{020CB41B-D960-472B-8F62-E8C361094753}"/>
+              </a:ext>
+            </a:extLst>
+          </p:cNvPr>
+          <p:cNvSpPr txBox="1"/>
+          <p:nvPr/>
+        </p:nvSpPr>
+        <p:spPr>
+          <a:xfrm>
+            <a:off x="648797" y="1637712"/>
+            <a:ext cx="1173655" cy="276999"/>
+          </a:xfrm>
+          <a:prstGeom prst="rect">
+            <a:avLst/>
+          </a:prstGeom>
+          <a:noFill/>
+        </p:spPr>
+        <p:txBody>
+          <a:bodyPr wrap="none" rtlCol="0">
+            <a:spAutoFit/>
+          </a:bodyPr>
+          <a:lstStyle/>
+          <a:p>
+            <a:r>
+              <a:rPr lang="en-GB" sz="1200" u="sng" dirty="0"/>
+              <a:t>Retest Needed</a:t>
+            </a:r>
+          </a:p>
+        </p:txBody>
+      </p:sp>
+      <p:sp>
+        <p:nvSpPr>
+          <p:cNvPr id="29" name="Rectangle 28">
+            <a:extLst>
+              <a:ext uri="{FF2B5EF4-FFF2-40B4-BE49-F238E27FC236}">
+                <a16:creationId xmlns:a16="http://schemas.microsoft.com/office/drawing/2014/main" id="{7DCFBF6A-43D7-82A9-6CED-023EC5EFC87B}"/>
+              </a:ext>
+            </a:extLst>
+          </p:cNvPr>
+          <p:cNvSpPr/>
+          <p:nvPr/>
+        </p:nvSpPr>
+        <p:spPr>
+          <a:xfrm>
+            <a:off x="643176" y="2834148"/>
+            <a:ext cx="4874057" cy="792751"/>
+          </a:xfrm>
+          <a:prstGeom prst="rect">
+            <a:avLst/>
+          </a:prstGeom>
+          <a:solidFill>
+            <a:schemeClr val="bg1"/>
+          </a:solidFill>
+          <a:ln>
+            <a:noFill/>
+          </a:ln>
+          <a:effectLst/>
+        </p:spPr>
+        <p:style>
+          <a:lnRef idx="2">
+            <a:schemeClr val="dk1"/>
+          </a:lnRef>
+          <a:fillRef idx="1">
+            <a:schemeClr val="lt1"/>
+          </a:fillRef>
+          <a:effectRef idx="0">
+            <a:schemeClr val="dk1"/>
+          </a:effectRef>
+          <a:fontRef idx="minor">
+            <a:schemeClr val="dk1"/>
+          </a:fontRef>
+        </p:style>
+        <p:txBody>
+          <a:bodyPr rtlCol="0" anchor="ctr"/>
+          <a:lstStyle/>
+          <a:p>
+            <a:pPr algn="ctr"/>
+            <a:endParaRPr lang="en-GB"/>
+          </a:p>
+        </p:txBody>
+      </p:sp>
+      <p:sp>
+        <p:nvSpPr>
+          <p:cNvPr id="30" name="Rectangle 29">
+            <a:extLst>
+              <a:ext uri="{FF2B5EF4-FFF2-40B4-BE49-F238E27FC236}">
+                <a16:creationId xmlns:a16="http://schemas.microsoft.com/office/drawing/2014/main" id="{6E51B4CC-2BC9-4383-E5CE-638BCA721717}"/>
+              </a:ext>
+            </a:extLst>
+          </p:cNvPr>
+          <p:cNvSpPr/>
+          <p:nvPr/>
+        </p:nvSpPr>
+        <p:spPr>
+          <a:xfrm>
+            <a:off x="660852" y="4115715"/>
+            <a:ext cx="4874057" cy="792751"/>
+          </a:xfrm>
+          <a:prstGeom prst="rect">
+            <a:avLst/>
+          </a:prstGeom>
+          <a:solidFill>
+            <a:schemeClr val="bg1"/>
+          </a:solidFill>
+          <a:ln>
+            <a:noFill/>
+          </a:ln>
+          <a:effectLst/>
+        </p:spPr>
+        <p:style>
+          <a:lnRef idx="2">
+            <a:schemeClr val="dk1"/>
+          </a:lnRef>
+          <a:fillRef idx="1">
+            <a:schemeClr val="lt1"/>
+          </a:fillRef>
+          <a:effectRef idx="0">
+            <a:schemeClr val="dk1"/>
+          </a:effectRef>
+          <a:fontRef idx="minor">
+            <a:schemeClr val="dk1"/>
+          </a:fontRef>
+        </p:style>
+        <p:txBody>
+          <a:bodyPr rtlCol="0" anchor="ctr"/>
+          <a:lstStyle/>
+          <a:p>
+            <a:pPr algn="ctr"/>
+            <a:endParaRPr lang="en-GB"/>
+          </a:p>
+        </p:txBody>
+      </p:sp>
+      <p:sp>
+        <p:nvSpPr>
+          <p:cNvPr id="31" name="Rectangle 30">
+            <a:extLst>
+              <a:ext uri="{FF2B5EF4-FFF2-40B4-BE49-F238E27FC236}">
+                <a16:creationId xmlns:a16="http://schemas.microsoft.com/office/drawing/2014/main" id="{A0E99404-7C1D-EE35-BAB5-5687B60F64DF}"/>
+              </a:ext>
+            </a:extLst>
+          </p:cNvPr>
+          <p:cNvSpPr/>
+          <p:nvPr/>
+        </p:nvSpPr>
+        <p:spPr>
+          <a:xfrm>
+            <a:off x="660852" y="5314353"/>
+            <a:ext cx="4874057" cy="792751"/>
+          </a:xfrm>
+          <a:prstGeom prst="rect">
+            <a:avLst/>
+          </a:prstGeom>
+          <a:solidFill>
+            <a:schemeClr val="bg1"/>
+          </a:solidFill>
+          <a:ln>
+            <a:noFill/>
+          </a:ln>
+          <a:effectLst/>
+        </p:spPr>
+        <p:style>
+          <a:lnRef idx="2">
+            <a:schemeClr val="dk1"/>
+          </a:lnRef>
+          <a:fillRef idx="1">
+            <a:schemeClr val="lt1"/>
+          </a:fillRef>
+          <a:effectRef idx="0">
+            <a:schemeClr val="dk1"/>
+          </a:effectRef>
+          <a:fontRef idx="minor">
+            <a:schemeClr val="dk1"/>
+          </a:fontRef>
+        </p:style>
+        <p:txBody>
+          <a:bodyPr rtlCol="0" anchor="ctr"/>
+          <a:lstStyle/>
+          <a:p>
+            <a:pPr algn="ctr"/>
+            <a:endParaRPr lang="en-GB"/>
+          </a:p>
+        </p:txBody>
+      </p:sp>
+      <p:sp>
+        <p:nvSpPr>
+          <p:cNvPr id="32" name="Rectangle 31">
+            <a:extLst>
+              <a:ext uri="{FF2B5EF4-FFF2-40B4-BE49-F238E27FC236}">
+                <a16:creationId xmlns:a16="http://schemas.microsoft.com/office/drawing/2014/main" id="{F13202F1-586E-9DEC-37B7-FE1C0CE67776}"/>
+              </a:ext>
+            </a:extLst>
+          </p:cNvPr>
+          <p:cNvSpPr/>
+          <p:nvPr/>
+        </p:nvSpPr>
+        <p:spPr>
+          <a:xfrm>
+            <a:off x="6657090" y="416386"/>
+            <a:ext cx="4874057" cy="792751"/>
+          </a:xfrm>
+          <a:prstGeom prst="rect">
+            <a:avLst/>
+          </a:prstGeom>
+          <a:solidFill>
+            <a:schemeClr val="bg1"/>
+          </a:solidFill>
+          <a:ln>
+            <a:noFill/>
+          </a:ln>
+          <a:effectLst/>
+        </p:spPr>
+        <p:style>
+          <a:lnRef idx="2">
+            <a:schemeClr val="dk1"/>
+          </a:lnRef>
+          <a:fillRef idx="1">
+            <a:schemeClr val="lt1"/>
+          </a:fillRef>
+          <a:effectRef idx="0">
+            <a:schemeClr val="dk1"/>
+          </a:effectRef>
+          <a:fontRef idx="minor">
+            <a:schemeClr val="dk1"/>
+          </a:fontRef>
+        </p:style>
+        <p:txBody>
+          <a:bodyPr rtlCol="0" anchor="ctr"/>
+          <a:lstStyle/>
+          <a:p>
+            <a:pPr algn="ctr"/>
+            <a:endParaRPr lang="en-GB"/>
+          </a:p>
+        </p:txBody>
+      </p:sp>
+      <p:sp>
+        <p:nvSpPr>
+          <p:cNvPr id="33" name="Rectangle 32">
+            <a:extLst>
+              <a:ext uri="{FF2B5EF4-FFF2-40B4-BE49-F238E27FC236}">
+                <a16:creationId xmlns:a16="http://schemas.microsoft.com/office/drawing/2014/main" id="{BE852F29-5C6C-7C2A-C48E-02A1D3CB3334}"/>
+              </a:ext>
+            </a:extLst>
+          </p:cNvPr>
+          <p:cNvSpPr/>
+          <p:nvPr/>
+        </p:nvSpPr>
+        <p:spPr>
+          <a:xfrm>
+            <a:off x="6639742" y="1568487"/>
+            <a:ext cx="4874057" cy="792751"/>
+          </a:xfrm>
+          <a:prstGeom prst="rect">
+            <a:avLst/>
+          </a:prstGeom>
+          <a:solidFill>
+            <a:schemeClr val="bg1"/>
+          </a:solidFill>
+          <a:ln>
+            <a:noFill/>
+          </a:ln>
+          <a:effectLst/>
+        </p:spPr>
+        <p:style>
+          <a:lnRef idx="2">
+            <a:schemeClr val="dk1"/>
+          </a:lnRef>
+          <a:fillRef idx="1">
+            <a:schemeClr val="lt1"/>
+          </a:fillRef>
+          <a:effectRef idx="0">
+            <a:schemeClr val="dk1"/>
+          </a:effectRef>
+          <a:fontRef idx="minor">
+            <a:schemeClr val="dk1"/>
+          </a:fontRef>
+        </p:style>
+        <p:txBody>
+          <a:bodyPr rtlCol="0" anchor="ctr"/>
+          <a:lstStyle/>
+          <a:p>
+            <a:pPr algn="ctr"/>
+            <a:endParaRPr lang="en-GB"/>
+          </a:p>
+        </p:txBody>
+      </p:sp>
+      <p:pic>
+        <p:nvPicPr>
+          <p:cNvPr id="35" name="Picture 34" descr="A paper clip on a black background&#10;&#10;Description automatically generated">
+            <a:extLst>
+              <a:ext uri="{FF2B5EF4-FFF2-40B4-BE49-F238E27FC236}">
+                <a16:creationId xmlns:a16="http://schemas.microsoft.com/office/drawing/2014/main" id="{DD4C2707-2020-9946-10BF-97D114078889}"/>
+              </a:ext>
+            </a:extLst>
+          </p:cNvPr>
+          <p:cNvPicPr>
+            <a:picLocks noChangeAspect="1"/>
+          </p:cNvPicPr>
+          <p:nvPr/>
+        </p:nvPicPr>
+        <p:blipFill>
+          <a:blip r:embed="rId3">
+            <a:extLst>
+              <a:ext uri="{28A0092B-C50C-407E-A947-70E740481C1C}">
+                <a14:useLocalDpi xmlns:a14="http://schemas.microsoft.com/office/drawing/2010/main" val="0"/>
+              </a:ext>
+              <a:ext uri="{837473B0-CC2E-450A-ABE3-18F120FF3D39}">
+                <a1611:picAttrSrcUrl xmlns:a1611="http://schemas.microsoft.com/office/drawing/2016/11/main" r:id="rId4"/>
+              </a:ext>
+            </a:extLst>
+          </a:blip>
+          <a:stretch>
+            <a:fillRect/>
+          </a:stretch>
+        </p:blipFill>
+        <p:spPr>
+          <a:xfrm>
+            <a:off x="7743654" y="2499464"/>
+            <a:ext cx="457201" cy="457201"/>
+          </a:xfrm>
+          <a:prstGeom prst="rect">
+            <a:avLst/>
+          </a:prstGeom>
+        </p:spPr>
+      </p:pic>
+      <p:sp>
+        <p:nvSpPr>
+          <p:cNvPr id="36" name="Rectangle 35">
+            <a:extLst>
+              <a:ext uri="{FF2B5EF4-FFF2-40B4-BE49-F238E27FC236}">
+                <a16:creationId xmlns:a16="http://schemas.microsoft.com/office/drawing/2014/main" id="{BF7805D2-AD9B-70A9-AC8F-3398FFA11099}"/>
+              </a:ext>
+            </a:extLst>
+          </p:cNvPr>
+          <p:cNvSpPr/>
+          <p:nvPr/>
+        </p:nvSpPr>
+        <p:spPr>
+          <a:xfrm>
+            <a:off x="6639741" y="3494434"/>
+            <a:ext cx="4874057" cy="792751"/>
+          </a:xfrm>
+          <a:prstGeom prst="rect">
+            <a:avLst/>
+          </a:prstGeom>
+          <a:solidFill>
+            <a:schemeClr val="bg1"/>
+          </a:solidFill>
+          <a:ln>
+            <a:noFill/>
+          </a:ln>
+          <a:effectLst/>
+        </p:spPr>
+        <p:style>
+          <a:lnRef idx="2">
+            <a:schemeClr val="dk1"/>
+          </a:lnRef>
+          <a:fillRef idx="1">
+            <a:schemeClr val="lt1"/>
+          </a:fillRef>
+          <a:effectRef idx="0">
+            <a:schemeClr val="dk1"/>
+          </a:effectRef>
+          <a:fontRef idx="minor">
+            <a:schemeClr val="dk1"/>
+          </a:fontRef>
+        </p:style>
+        <p:txBody>
+          <a:bodyPr rtlCol="0" anchor="ctr"/>
+          <a:lstStyle/>
+          <a:p>
+            <a:pPr algn="ctr"/>
+            <a:endParaRPr lang="en-GB"/>
+          </a:p>
+        </p:txBody>
+      </p:sp>
+      <p:sp>
+        <p:nvSpPr>
+          <p:cNvPr id="37" name="Rectangle 36">
+            <a:extLst>
+              <a:ext uri="{FF2B5EF4-FFF2-40B4-BE49-F238E27FC236}">
+                <a16:creationId xmlns:a16="http://schemas.microsoft.com/office/drawing/2014/main" id="{8EEEA62C-EC86-DFD5-010A-6DC8A6B86B5E}"/>
+              </a:ext>
+            </a:extLst>
+          </p:cNvPr>
+          <p:cNvSpPr/>
+          <p:nvPr/>
+        </p:nvSpPr>
+        <p:spPr>
+          <a:xfrm>
+            <a:off x="6648260" y="4692793"/>
+            <a:ext cx="4874057" cy="792751"/>
+          </a:xfrm>
+          <a:prstGeom prst="rect">
+            <a:avLst/>
+          </a:prstGeom>
+          <a:solidFill>
+            <a:schemeClr val="bg1"/>
+          </a:solidFill>
+          <a:ln>
+            <a:noFill/>
+          </a:ln>
+          <a:effectLst/>
+        </p:spPr>
+        <p:style>
+          <a:lnRef idx="2">
+            <a:schemeClr val="dk1"/>
+          </a:lnRef>
+          <a:fillRef idx="1">
+            <a:schemeClr val="lt1"/>
+          </a:fillRef>
+          <a:effectRef idx="0">
+            <a:schemeClr val="dk1"/>
+          </a:effectRef>
+          <a:fontRef idx="minor">
+            <a:schemeClr val="dk1"/>
+          </a:fontRef>
+        </p:style>
+        <p:txBody>
+          <a:bodyPr rtlCol="0" anchor="ctr"/>
+          <a:lstStyle/>
+          <a:p>
+            <a:pPr algn="ctr"/>
+            <a:endParaRPr lang="en-GB"/>
+          </a:p>
+        </p:txBody>
+      </p:sp>
+      <p:sp>
+        <p:nvSpPr>
+          <p:cNvPr id="38" name="Rectangle 37">
+            <a:extLst>
+              <a:ext uri="{FF2B5EF4-FFF2-40B4-BE49-F238E27FC236}">
+                <a16:creationId xmlns:a16="http://schemas.microsoft.com/office/drawing/2014/main" id="{F354B7F0-A271-95AF-1F18-4C9B74FBA0F6}"/>
+              </a:ext>
+            </a:extLst>
+          </p:cNvPr>
+          <p:cNvSpPr/>
+          <p:nvPr/>
+        </p:nvSpPr>
+        <p:spPr>
+          <a:xfrm>
+            <a:off x="6657089" y="5782758"/>
+            <a:ext cx="4874057" cy="792751"/>
+          </a:xfrm>
+          <a:prstGeom prst="rect">
+            <a:avLst/>
+          </a:prstGeom>
+          <a:solidFill>
+            <a:schemeClr val="bg1"/>
+          </a:solidFill>
+          <a:ln>
+            <a:noFill/>
+          </a:ln>
+          <a:effectLst/>
+        </p:spPr>
+        <p:style>
+          <a:lnRef idx="2">
+            <a:schemeClr val="dk1"/>
+          </a:lnRef>
+          <a:fillRef idx="1">
+            <a:schemeClr val="lt1"/>
+          </a:fillRef>
+          <a:effectRef idx="0">
+            <a:schemeClr val="dk1"/>
+          </a:effectRef>
+          <a:fontRef idx="minor">
+            <a:schemeClr val="dk1"/>
+          </a:fontRef>
+        </p:style>
+        <p:txBody>
+          <a:bodyPr rtlCol="0" anchor="ctr"/>
+          <a:lstStyle/>
+          <a:p>
+            <a:pPr algn="ctr"/>
+            <a:endParaRPr lang="en-GB"/>
+          </a:p>
+        </p:txBody>
+      </p:sp>
+      <p:sp>
+        <p:nvSpPr>
+          <p:cNvPr id="39" name="Rectangle 38">
+            <a:extLst>
+              <a:ext uri="{FF2B5EF4-FFF2-40B4-BE49-F238E27FC236}">
+                <a16:creationId xmlns:a16="http://schemas.microsoft.com/office/drawing/2014/main" id="{61124D60-B609-874F-9437-A9C93CD7DB02}"/>
+              </a:ext>
+            </a:extLst>
+          </p:cNvPr>
+          <p:cNvSpPr/>
+          <p:nvPr/>
+        </p:nvSpPr>
+        <p:spPr>
+          <a:xfrm>
+            <a:off x="3168338" y="1212881"/>
+            <a:ext cx="1957104" cy="254420"/>
+          </a:xfrm>
+          <a:prstGeom prst="rect">
+            <a:avLst/>
+          </a:prstGeom>
+          <a:solidFill>
+            <a:schemeClr val="bg1"/>
+          </a:solidFill>
+          <a:ln>
+            <a:noFill/>
+          </a:ln>
+          <a:effectLst/>
+        </p:spPr>
+        <p:style>
+          <a:lnRef idx="2">
+            <a:schemeClr val="dk1"/>
+          </a:lnRef>
+          <a:fillRef idx="1">
+            <a:schemeClr val="lt1"/>
+          </a:fillRef>
+          <a:effectRef idx="0">
+            <a:schemeClr val="dk1"/>
+          </a:effectRef>
+          <a:fontRef idx="minor">
+            <a:schemeClr val="dk1"/>
+          </a:fontRef>
+        </p:style>
+        <p:txBody>
+          <a:bodyPr rtlCol="0" anchor="ctr"/>
+          <a:lstStyle/>
+          <a:p>
+            <a:pPr algn="ctr"/>
+            <a:endParaRPr lang="en-GB" dirty="0"/>
+          </a:p>
+        </p:txBody>
+      </p:sp>
+      <p:sp>
+        <p:nvSpPr>
+          <p:cNvPr id="40" name="Rectangle 39">
+            <a:extLst>
+              <a:ext uri="{FF2B5EF4-FFF2-40B4-BE49-F238E27FC236}">
+                <a16:creationId xmlns:a16="http://schemas.microsoft.com/office/drawing/2014/main" id="{4205E722-1519-6E6A-FE97-61BF5F5C86FD}"/>
+              </a:ext>
+            </a:extLst>
+          </p:cNvPr>
+          <p:cNvSpPr/>
+          <p:nvPr/>
+        </p:nvSpPr>
+        <p:spPr>
+          <a:xfrm>
+            <a:off x="715809" y="454608"/>
+            <a:ext cx="511916" cy="254420"/>
+          </a:xfrm>
+          <a:prstGeom prst="rect">
+            <a:avLst/>
+          </a:prstGeom>
+          <a:solidFill>
+            <a:schemeClr val="bg1"/>
+          </a:solidFill>
+          <a:ln>
+            <a:noFill/>
+          </a:ln>
+          <a:effectLst/>
+        </p:spPr>
+        <p:style>
+          <a:lnRef idx="2">
+            <a:schemeClr val="dk1"/>
+          </a:lnRef>
+          <a:fillRef idx="1">
+            <a:schemeClr val="lt1"/>
+          </a:fillRef>
+          <a:effectRef idx="0">
+            <a:schemeClr val="dk1"/>
+          </a:effectRef>
+          <a:fontRef idx="minor">
+            <a:schemeClr val="dk1"/>
+          </a:fontRef>
+        </p:style>
+        <p:txBody>
+          <a:bodyPr rtlCol="0" anchor="ctr"/>
+          <a:lstStyle/>
+          <a:p>
+            <a:pPr algn="ctr"/>
+            <a:endParaRPr lang="en-GB"/>
+          </a:p>
+        </p:txBody>
+      </p:sp>
+      <p:sp>
+        <p:nvSpPr>
+          <p:cNvPr id="41" name="Rectangle 40">
+            <a:extLst>
+              <a:ext uri="{FF2B5EF4-FFF2-40B4-BE49-F238E27FC236}">
+                <a16:creationId xmlns:a16="http://schemas.microsoft.com/office/drawing/2014/main" id="{1273F538-6D07-970D-D548-0A1A011201EA}"/>
+              </a:ext>
+            </a:extLst>
+          </p:cNvPr>
+          <p:cNvSpPr/>
+          <p:nvPr/>
+        </p:nvSpPr>
+        <p:spPr>
+          <a:xfrm>
+            <a:off x="1431617" y="469946"/>
+            <a:ext cx="511916" cy="254420"/>
+          </a:xfrm>
+          <a:prstGeom prst="rect">
+            <a:avLst/>
+          </a:prstGeom>
+          <a:solidFill>
+            <a:schemeClr val="bg1"/>
+          </a:solidFill>
+          <a:ln>
+            <a:noFill/>
+          </a:ln>
+          <a:effectLst/>
+        </p:spPr>
+        <p:style>
+          <a:lnRef idx="2">
+            <a:schemeClr val="dk1"/>
+          </a:lnRef>
+          <a:fillRef idx="1">
+            <a:schemeClr val="lt1"/>
+          </a:fillRef>
+          <a:effectRef idx="0">
+            <a:schemeClr val="dk1"/>
+          </a:effectRef>
+          <a:fontRef idx="minor">
+            <a:schemeClr val="dk1"/>
+          </a:fontRef>
+        </p:style>
+        <p:txBody>
+          <a:bodyPr rtlCol="0" anchor="ctr"/>
+          <a:lstStyle/>
+          <a:p>
+            <a:pPr algn="ctr"/>
+            <a:endParaRPr lang="en-GB"/>
+          </a:p>
+        </p:txBody>
+      </p:sp>
+      <p:sp>
+        <p:nvSpPr>
+          <p:cNvPr id="42" name="Rectangle 41">
+            <a:extLst>
+              <a:ext uri="{FF2B5EF4-FFF2-40B4-BE49-F238E27FC236}">
+                <a16:creationId xmlns:a16="http://schemas.microsoft.com/office/drawing/2014/main" id="{EFC7D3C3-2265-7818-9D01-BA3C30D985BD}"/>
+              </a:ext>
+            </a:extLst>
+          </p:cNvPr>
+          <p:cNvSpPr/>
+          <p:nvPr/>
+        </p:nvSpPr>
+        <p:spPr>
+          <a:xfrm>
+            <a:off x="2256150" y="466777"/>
+            <a:ext cx="511916" cy="254420"/>
+          </a:xfrm>
+          <a:prstGeom prst="rect">
+            <a:avLst/>
+          </a:prstGeom>
+          <a:solidFill>
+            <a:schemeClr val="bg1"/>
+          </a:solidFill>
+          <a:ln>
+            <a:noFill/>
+          </a:ln>
+          <a:effectLst/>
+        </p:spPr>
+        <p:style>
+          <a:lnRef idx="2">
+            <a:schemeClr val="dk1"/>
+          </a:lnRef>
+          <a:fillRef idx="1">
+            <a:schemeClr val="lt1"/>
+          </a:fillRef>
+          <a:effectRef idx="0">
+            <a:schemeClr val="dk1"/>
+          </a:effectRef>
+          <a:fontRef idx="minor">
+            <a:schemeClr val="dk1"/>
+          </a:fontRef>
+        </p:style>
+        <p:txBody>
+          <a:bodyPr rtlCol="0" anchor="ctr"/>
+          <a:lstStyle/>
+          <a:p>
+            <a:pPr algn="ctr"/>
+            <a:endParaRPr lang="en-GB"/>
+          </a:p>
+        </p:txBody>
+      </p:sp>
+      <p:sp>
+        <p:nvSpPr>
+          <p:cNvPr id="43" name="Rectangle 42">
+            <a:extLst>
+              <a:ext uri="{FF2B5EF4-FFF2-40B4-BE49-F238E27FC236}">
+                <a16:creationId xmlns:a16="http://schemas.microsoft.com/office/drawing/2014/main" id="{134924FF-4EB6-9186-E59A-70C8C175AC42}"/>
+              </a:ext>
+            </a:extLst>
+          </p:cNvPr>
+          <p:cNvSpPr/>
+          <p:nvPr/>
+        </p:nvSpPr>
+        <p:spPr>
+          <a:xfrm>
+            <a:off x="2955397" y="453970"/>
+            <a:ext cx="511916" cy="254420"/>
+          </a:xfrm>
+          <a:prstGeom prst="rect">
+            <a:avLst/>
+          </a:prstGeom>
+          <a:solidFill>
+            <a:schemeClr val="bg1"/>
+          </a:solidFill>
+          <a:ln>
+            <a:noFill/>
+          </a:ln>
+          <a:effectLst/>
+        </p:spPr>
+        <p:style>
+          <a:lnRef idx="2">
+            <a:schemeClr val="dk1"/>
+          </a:lnRef>
+          <a:fillRef idx="1">
+            <a:schemeClr val="lt1"/>
+          </a:fillRef>
+          <a:effectRef idx="0">
+            <a:schemeClr val="dk1"/>
+          </a:effectRef>
+          <a:fontRef idx="minor">
+            <a:schemeClr val="dk1"/>
+          </a:fontRef>
+        </p:style>
+        <p:txBody>
+          <a:bodyPr rtlCol="0" anchor="ctr"/>
+          <a:lstStyle/>
+          <a:p>
+            <a:pPr algn="ctr"/>
+            <a:endParaRPr lang="en-GB"/>
+          </a:p>
+        </p:txBody>
+      </p:sp>
+      <p:sp>
+        <p:nvSpPr>
+          <p:cNvPr id="44" name="Rectangle 43">
+            <a:extLst>
+              <a:ext uri="{FF2B5EF4-FFF2-40B4-BE49-F238E27FC236}">
+                <a16:creationId xmlns:a16="http://schemas.microsoft.com/office/drawing/2014/main" id="{42B03740-B723-B1AA-37BA-893E56B0BD17}"/>
+              </a:ext>
+            </a:extLst>
+          </p:cNvPr>
+          <p:cNvSpPr/>
+          <p:nvPr/>
+        </p:nvSpPr>
+        <p:spPr>
+          <a:xfrm>
+            <a:off x="3661834" y="469946"/>
+            <a:ext cx="511916" cy="254420"/>
+          </a:xfrm>
+          <a:prstGeom prst="rect">
+            <a:avLst/>
+          </a:prstGeom>
+          <a:solidFill>
+            <a:schemeClr val="bg1"/>
+          </a:solidFill>
+          <a:ln>
+            <a:noFill/>
+          </a:ln>
+          <a:effectLst/>
+        </p:spPr>
+        <p:style>
+          <a:lnRef idx="2">
+            <a:schemeClr val="dk1"/>
+          </a:lnRef>
+          <a:fillRef idx="1">
+            <a:schemeClr val="lt1"/>
+          </a:fillRef>
+          <a:effectRef idx="0">
+            <a:schemeClr val="dk1"/>
+          </a:effectRef>
+          <a:fontRef idx="minor">
+            <a:schemeClr val="dk1"/>
+          </a:fontRef>
+        </p:style>
+        <p:txBody>
+          <a:bodyPr rtlCol="0" anchor="ctr"/>
+          <a:lstStyle/>
+          <a:p>
+            <a:pPr algn="ctr"/>
+            <a:endParaRPr lang="en-GB"/>
+          </a:p>
+        </p:txBody>
+      </p:sp>
+      <p:sp>
+        <p:nvSpPr>
+          <p:cNvPr id="45" name="Rectangle 44">
+            <a:extLst>
+              <a:ext uri="{FF2B5EF4-FFF2-40B4-BE49-F238E27FC236}">
+                <a16:creationId xmlns:a16="http://schemas.microsoft.com/office/drawing/2014/main" id="{EEF76082-6316-578A-30A9-6F5348247097}"/>
+              </a:ext>
+            </a:extLst>
+          </p:cNvPr>
+          <p:cNvSpPr/>
+          <p:nvPr/>
+        </p:nvSpPr>
+        <p:spPr>
+          <a:xfrm>
+            <a:off x="4523678" y="467893"/>
+            <a:ext cx="511916" cy="254420"/>
+          </a:xfrm>
+          <a:prstGeom prst="rect">
+            <a:avLst/>
+          </a:prstGeom>
+          <a:solidFill>
+            <a:schemeClr val="bg1"/>
+          </a:solidFill>
+          <a:ln>
+            <a:noFill/>
+          </a:ln>
+          <a:effectLst/>
+        </p:spPr>
+        <p:style>
+          <a:lnRef idx="2">
+            <a:schemeClr val="dk1"/>
+          </a:lnRef>
+          <a:fillRef idx="1">
+            <a:schemeClr val="lt1"/>
+          </a:fillRef>
+          <a:effectRef idx="0">
+            <a:schemeClr val="dk1"/>
+          </a:effectRef>
+          <a:fontRef idx="minor">
+            <a:schemeClr val="dk1"/>
+          </a:fontRef>
+        </p:style>
+        <p:txBody>
+          <a:bodyPr rtlCol="0" anchor="ctr"/>
+          <a:lstStyle/>
+          <a:p>
+            <a:pPr algn="ctr"/>
+            <a:endParaRPr lang="en-GB"/>
+          </a:p>
+        </p:txBody>
+      </p:sp>
+      <p:sp>
+        <p:nvSpPr>
+          <p:cNvPr id="46" name="Rectangle 45">
+            <a:extLst>
+              <a:ext uri="{FF2B5EF4-FFF2-40B4-BE49-F238E27FC236}">
+                <a16:creationId xmlns:a16="http://schemas.microsoft.com/office/drawing/2014/main" id="{4A3C4382-69C8-753C-345C-4F3AEFB817DA}"/>
+              </a:ext>
+            </a:extLst>
+          </p:cNvPr>
+          <p:cNvSpPr/>
+          <p:nvPr/>
+        </p:nvSpPr>
+        <p:spPr>
+          <a:xfrm>
+            <a:off x="891737" y="1945416"/>
+            <a:ext cx="511916" cy="254420"/>
+          </a:xfrm>
+          <a:prstGeom prst="rect">
+            <a:avLst/>
+          </a:prstGeom>
+          <a:solidFill>
+            <a:schemeClr val="bg1"/>
+          </a:solidFill>
+          <a:ln>
+            <a:noFill/>
+          </a:ln>
+          <a:effectLst/>
+        </p:spPr>
+        <p:style>
+          <a:lnRef idx="2">
+            <a:schemeClr val="dk1"/>
+          </a:lnRef>
+          <a:fillRef idx="1">
+            <a:schemeClr val="lt1"/>
+          </a:fillRef>
+          <a:effectRef idx="0">
+            <a:schemeClr val="dk1"/>
+          </a:effectRef>
+          <a:fontRef idx="minor">
+            <a:schemeClr val="dk1"/>
+          </a:fontRef>
+        </p:style>
+        <p:txBody>
+          <a:bodyPr rtlCol="0" anchor="ctr"/>
+          <a:lstStyle/>
+          <a:p>
+            <a:pPr algn="ctr"/>
+            <a:endParaRPr lang="en-GB"/>
+          </a:p>
+        </p:txBody>
+      </p:sp>
+      <p:sp>
+        <p:nvSpPr>
+          <p:cNvPr id="47" name="Rectangle 46">
+            <a:extLst>
+              <a:ext uri="{FF2B5EF4-FFF2-40B4-BE49-F238E27FC236}">
+                <a16:creationId xmlns:a16="http://schemas.microsoft.com/office/drawing/2014/main" id="{DB73014A-B986-FDF5-38C9-F542BB11E27A}"/>
+              </a:ext>
+            </a:extLst>
+          </p:cNvPr>
+          <p:cNvSpPr/>
+          <p:nvPr/>
+        </p:nvSpPr>
+        <p:spPr>
+          <a:xfrm>
+            <a:off x="2680320" y="1940600"/>
+            <a:ext cx="511916" cy="254420"/>
+          </a:xfrm>
+          <a:prstGeom prst="rect">
+            <a:avLst/>
+          </a:prstGeom>
+          <a:solidFill>
+            <a:schemeClr val="bg1"/>
+          </a:solidFill>
+          <a:ln>
+            <a:noFill/>
+          </a:ln>
+          <a:effectLst/>
+        </p:spPr>
+        <p:style>
+          <a:lnRef idx="2">
+            <a:schemeClr val="dk1"/>
+          </a:lnRef>
+          <a:fillRef idx="1">
+            <a:schemeClr val="lt1"/>
+          </a:fillRef>
+          <a:effectRef idx="0">
+            <a:schemeClr val="dk1"/>
+          </a:effectRef>
+          <a:fontRef idx="minor">
+            <a:schemeClr val="dk1"/>
+          </a:fontRef>
+        </p:style>
+        <p:txBody>
+          <a:bodyPr rtlCol="0" anchor="ctr"/>
+          <a:lstStyle/>
+          <a:p>
+            <a:pPr algn="ctr"/>
+            <a:endParaRPr lang="en-GB" dirty="0"/>
+          </a:p>
+        </p:txBody>
+      </p:sp>
+      <p:sp>
+        <p:nvSpPr>
+          <p:cNvPr id="48" name="Rectangle 47">
+            <a:extLst>
+              <a:ext uri="{FF2B5EF4-FFF2-40B4-BE49-F238E27FC236}">
+                <a16:creationId xmlns:a16="http://schemas.microsoft.com/office/drawing/2014/main" id="{0FC321D9-A3AC-5D36-1CAD-15771F345A80}"/>
+              </a:ext>
+            </a:extLst>
+          </p:cNvPr>
+          <p:cNvSpPr/>
+          <p:nvPr/>
+        </p:nvSpPr>
+        <p:spPr>
+          <a:xfrm>
+            <a:off x="824501" y="1238316"/>
+            <a:ext cx="511916" cy="254420"/>
+          </a:xfrm>
+          <a:prstGeom prst="rect">
+            <a:avLst/>
+          </a:prstGeom>
+          <a:solidFill>
+            <a:schemeClr val="bg1"/>
+          </a:solidFill>
+          <a:ln>
+            <a:noFill/>
+          </a:ln>
+          <a:effectLst/>
+        </p:spPr>
+        <p:style>
+          <a:lnRef idx="2">
+            <a:schemeClr val="dk1"/>
+          </a:lnRef>
+          <a:fillRef idx="1">
+            <a:schemeClr val="lt1"/>
+          </a:fillRef>
+          <a:effectRef idx="0">
+            <a:schemeClr val="dk1"/>
+          </a:effectRef>
+          <a:fontRef idx="minor">
+            <a:schemeClr val="dk1"/>
+          </a:fontRef>
+        </p:style>
+        <p:txBody>
+          <a:bodyPr rtlCol="0" anchor="ctr"/>
+          <a:lstStyle/>
+          <a:p>
+            <a:pPr algn="ctr"/>
+            <a:endParaRPr lang="en-GB"/>
+          </a:p>
+        </p:txBody>
+      </p:sp>
+      <p:sp>
+        <p:nvSpPr>
+          <p:cNvPr id="49" name="TextBox 48">
+            <a:extLst>
+              <a:ext uri="{FF2B5EF4-FFF2-40B4-BE49-F238E27FC236}">
+                <a16:creationId xmlns:a16="http://schemas.microsoft.com/office/drawing/2014/main" id="{5678A88E-C7DE-1BB7-077B-A39C65D4C0A1}"/>
+              </a:ext>
+            </a:extLst>
+          </p:cNvPr>
+          <p:cNvSpPr txBox="1"/>
+          <p:nvPr/>
+        </p:nvSpPr>
+        <p:spPr>
+          <a:xfrm>
+            <a:off x="1696428" y="981988"/>
+            <a:ext cx="1067856" cy="276999"/>
+          </a:xfrm>
+          <a:prstGeom prst="rect">
+            <a:avLst/>
+          </a:prstGeom>
+          <a:noFill/>
+        </p:spPr>
+        <p:txBody>
+          <a:bodyPr wrap="none" rtlCol="0">
+            <a:spAutoFit/>
+          </a:bodyPr>
+          <a:lstStyle/>
+          <a:p>
+            <a:r>
+              <a:rPr lang="en-GB" sz="1200" u="sng" dirty="0"/>
+              <a:t>Date Created</a:t>
+            </a:r>
+          </a:p>
+        </p:txBody>
+      </p:sp>
+      <p:sp>
+        <p:nvSpPr>
+          <p:cNvPr id="50" name="Rectangle 49">
+            <a:extLst>
+              <a:ext uri="{FF2B5EF4-FFF2-40B4-BE49-F238E27FC236}">
+                <a16:creationId xmlns:a16="http://schemas.microsoft.com/office/drawing/2014/main" id="{CE239332-D3CC-58A3-B373-573AEB8A215F}"/>
+              </a:ext>
+            </a:extLst>
+          </p:cNvPr>
+          <p:cNvSpPr/>
+          <p:nvPr/>
+        </p:nvSpPr>
+        <p:spPr>
+          <a:xfrm>
+            <a:off x="1940183" y="1226548"/>
+            <a:ext cx="511916" cy="254420"/>
+          </a:xfrm>
+          <a:prstGeom prst="rect">
+            <a:avLst/>
+          </a:prstGeom>
+          <a:solidFill>
+            <a:schemeClr val="bg1"/>
+          </a:solidFill>
+          <a:ln>
+            <a:noFill/>
+          </a:ln>
+          <a:effectLst/>
+        </p:spPr>
+        <p:style>
+          <a:lnRef idx="2">
+            <a:schemeClr val="dk1"/>
+          </a:lnRef>
+          <a:fillRef idx="1">
+            <a:schemeClr val="lt1"/>
+          </a:fillRef>
+          <a:effectRef idx="0">
+            <a:schemeClr val="dk1"/>
+          </a:effectRef>
+          <a:fontRef idx="minor">
+            <a:schemeClr val="dk1"/>
+          </a:fontRef>
+        </p:style>
+        <p:txBody>
+          <a:bodyPr rtlCol="0" anchor="ctr"/>
+          <a:lstStyle/>
+          <a:p>
+            <a:pPr algn="ctr"/>
+            <a:endParaRPr lang="en-GB"/>
+          </a:p>
+        </p:txBody>
+      </p:sp>
+      <p:sp>
+        <p:nvSpPr>
+          <p:cNvPr id="51" name="TextBox 50">
+            <a:extLst>
+              <a:ext uri="{FF2B5EF4-FFF2-40B4-BE49-F238E27FC236}">
+                <a16:creationId xmlns:a16="http://schemas.microsoft.com/office/drawing/2014/main" id="{3A1600A8-DAE0-2425-929C-014E91DAFDE3}"/>
+              </a:ext>
+            </a:extLst>
+          </p:cNvPr>
+          <p:cNvSpPr txBox="1"/>
+          <p:nvPr/>
+        </p:nvSpPr>
+        <p:spPr>
+          <a:xfrm>
+            <a:off x="4322792" y="1698092"/>
+            <a:ext cx="798104" cy="276999"/>
+          </a:xfrm>
+          <a:prstGeom prst="rect">
+            <a:avLst/>
+          </a:prstGeom>
+          <a:noFill/>
+        </p:spPr>
+        <p:txBody>
+          <a:bodyPr wrap="none" rtlCol="0">
+            <a:spAutoFit/>
+          </a:bodyPr>
+          <a:lstStyle/>
+          <a:p>
+            <a:r>
+              <a:rPr lang="en-GB" sz="1200" u="sng" dirty="0"/>
+              <a:t>Date Run</a:t>
+            </a:r>
+          </a:p>
+        </p:txBody>
+      </p:sp>
+      <p:sp>
+        <p:nvSpPr>
+          <p:cNvPr id="52" name="Rectangle 51">
+            <a:extLst>
+              <a:ext uri="{FF2B5EF4-FFF2-40B4-BE49-F238E27FC236}">
+                <a16:creationId xmlns:a16="http://schemas.microsoft.com/office/drawing/2014/main" id="{88FD9E95-C9A3-DE7A-80B8-74D442E50C16}"/>
+              </a:ext>
+            </a:extLst>
+          </p:cNvPr>
+          <p:cNvSpPr/>
+          <p:nvPr/>
+        </p:nvSpPr>
+        <p:spPr>
+          <a:xfrm>
+            <a:off x="4554551" y="2020695"/>
+            <a:ext cx="511916" cy="254420"/>
+          </a:xfrm>
+          <a:prstGeom prst="rect">
+            <a:avLst/>
+          </a:prstGeom>
+          <a:solidFill>
+            <a:schemeClr val="bg1"/>
+          </a:solidFill>
+          <a:ln>
+            <a:noFill/>
+          </a:ln>
+          <a:effectLst/>
+        </p:spPr>
+        <p:style>
+          <a:lnRef idx="2">
+            <a:schemeClr val="dk1"/>
+          </a:lnRef>
+          <a:fillRef idx="1">
+            <a:schemeClr val="lt1"/>
+          </a:fillRef>
+          <a:effectRef idx="0">
+            <a:schemeClr val="dk1"/>
+          </a:effectRef>
+          <a:fontRef idx="minor">
+            <a:schemeClr val="dk1"/>
+          </a:fontRef>
+        </p:style>
+        <p:txBody>
+          <a:bodyPr rtlCol="0" anchor="ctr"/>
+          <a:lstStyle/>
+          <a:p>
+            <a:pPr algn="ctr"/>
+            <a:endParaRPr lang="en-GB"/>
+          </a:p>
+        </p:txBody>
+      </p:sp>
+      <p:cxnSp>
+        <p:nvCxnSpPr>
+          <p:cNvPr id="54" name="Straight Connector 53">
+            <a:extLst>
+              <a:ext uri="{FF2B5EF4-FFF2-40B4-BE49-F238E27FC236}">
+                <a16:creationId xmlns:a16="http://schemas.microsoft.com/office/drawing/2014/main" id="{33780E27-14B3-BC38-B966-A14A128FCA39}"/>
+              </a:ext>
+            </a:extLst>
+          </p:cNvPr>
+          <p:cNvCxnSpPr/>
+          <p:nvPr/>
+        </p:nvCxnSpPr>
+        <p:spPr>
+          <a:xfrm>
+            <a:off x="752457" y="812761"/>
+            <a:ext cx="4378567" cy="0"/>
+          </a:xfrm>
+          <a:prstGeom prst="line">
+            <a:avLst/>
+          </a:prstGeom>
+        </p:spPr>
+        <p:style>
+          <a:lnRef idx="2">
+            <a:schemeClr val="dk1"/>
+          </a:lnRef>
+          <a:fillRef idx="0">
+            <a:schemeClr val="dk1"/>
+          </a:fillRef>
+          <a:effectRef idx="1">
+            <a:schemeClr val="dk1"/>
+          </a:effectRef>
+          <a:fontRef idx="minor">
+            <a:schemeClr val="tx1"/>
+          </a:fontRef>
+        </p:style>
+      </p:cxnSp>
+      <p:cxnSp>
+        <p:nvCxnSpPr>
+          <p:cNvPr id="55" name="Straight Connector 54">
+            <a:extLst>
+              <a:ext uri="{FF2B5EF4-FFF2-40B4-BE49-F238E27FC236}">
+                <a16:creationId xmlns:a16="http://schemas.microsoft.com/office/drawing/2014/main" id="{C9564BDE-456B-2AF7-B5D4-3E7DDBDB8368}"/>
+              </a:ext>
+            </a:extLst>
+          </p:cNvPr>
+          <p:cNvCxnSpPr/>
+          <p:nvPr/>
+        </p:nvCxnSpPr>
+        <p:spPr>
+          <a:xfrm>
+            <a:off x="726995" y="1599793"/>
+            <a:ext cx="4378567" cy="0"/>
+          </a:xfrm>
+          <a:prstGeom prst="line">
+            <a:avLst/>
+          </a:prstGeom>
+        </p:spPr>
+        <p:style>
+          <a:lnRef idx="2">
+            <a:schemeClr val="dk1"/>
+          </a:lnRef>
+          <a:fillRef idx="0">
+            <a:schemeClr val="dk1"/>
+          </a:fillRef>
+          <a:effectRef idx="1">
+            <a:schemeClr val="dk1"/>
+          </a:effectRef>
+          <a:fontRef idx="minor">
+            <a:schemeClr val="tx1"/>
+          </a:fontRef>
+        </p:style>
+      </p:cxnSp>
+      <p:cxnSp>
+        <p:nvCxnSpPr>
+          <p:cNvPr id="56" name="Straight Connector 55">
+            <a:extLst>
+              <a:ext uri="{FF2B5EF4-FFF2-40B4-BE49-F238E27FC236}">
+                <a16:creationId xmlns:a16="http://schemas.microsoft.com/office/drawing/2014/main" id="{49168DC6-5905-4393-20E1-F7070F47B6B5}"/>
+              </a:ext>
+            </a:extLst>
+          </p:cNvPr>
+          <p:cNvCxnSpPr/>
+          <p:nvPr/>
+        </p:nvCxnSpPr>
+        <p:spPr>
+          <a:xfrm>
+            <a:off x="746995" y="2361238"/>
+            <a:ext cx="4378567" cy="0"/>
+          </a:xfrm>
+          <a:prstGeom prst="line">
+            <a:avLst/>
+          </a:prstGeom>
+        </p:spPr>
+        <p:style>
+          <a:lnRef idx="2">
+            <a:schemeClr val="dk1"/>
+          </a:lnRef>
+          <a:fillRef idx="0">
+            <a:schemeClr val="dk1"/>
+          </a:fillRef>
+          <a:effectRef idx="1">
+            <a:schemeClr val="dk1"/>
+          </a:effectRef>
+          <a:fontRef idx="minor">
+            <a:schemeClr val="tx1"/>
+          </a:fontRef>
+        </p:style>
+      </p:cxnSp>
     </p:spTree>
     <p:extLst>
       <p:ext uri="{BB962C8B-B14F-4D97-AF65-F5344CB8AC3E}">

</xml_diff>

<commit_message>
modified:   app.js     modified:   documentation/interface-designs/gui-concepts.pptx 	modified:   package-lock.json 	modified:   package.json 	renamed:    public/stylesheets/style.css -> public/assets/stylesheets/style.css 	modified:   views/layout.hbs
</commit_message>
<xml_diff>
--- a/documentation/interface-designs/gui-concepts.pptx
+++ b/documentation/interface-designs/gui-concepts.pptx
@@ -135,7 +135,7 @@
   <pc:docChgLst>
     <pc:chgData name="Richard Hunt" userId="a9b14997-caef-4159-8c34-0f67c79d0d7a" providerId="ADAL" clId="{2F841D68-50EA-48FE-B1C6-1A0B49E241EB}"/>
     <pc:docChg chg="undo custSel addSld delSld modSld sldOrd">
-      <pc:chgData name="Richard Hunt" userId="a9b14997-caef-4159-8c34-0f67c79d0d7a" providerId="ADAL" clId="{2F841D68-50EA-48FE-B1C6-1A0B49E241EB}" dt="2024-05-28T11:14:35.470" v="2269" actId="20577"/>
+      <pc:chgData name="Richard Hunt" userId="a9b14997-caef-4159-8c34-0f67c79d0d7a" providerId="ADAL" clId="{2F841D68-50EA-48FE-B1C6-1A0B49E241EB}" dt="2024-06-01T13:58:46.625" v="2270" actId="20577"/>
       <pc:docMkLst>
         <pc:docMk/>
       </pc:docMkLst>
@@ -1132,7 +1132,7 @@
         </pc:spChg>
       </pc:sldChg>
       <pc:sldChg chg="addSp delSp modSp new mod modNotesTx">
-        <pc:chgData name="Richard Hunt" userId="a9b14997-caef-4159-8c34-0f67c79d0d7a" providerId="ADAL" clId="{2F841D68-50EA-48FE-B1C6-1A0B49E241EB}" dt="2024-05-28T11:14:35.470" v="2269" actId="20577"/>
+        <pc:chgData name="Richard Hunt" userId="a9b14997-caef-4159-8c34-0f67c79d0d7a" providerId="ADAL" clId="{2F841D68-50EA-48FE-B1C6-1A0B49E241EB}" dt="2024-06-01T13:58:46.625" v="2270" actId="20577"/>
         <pc:sldMkLst>
           <pc:docMk/>
           <pc:sldMk cId="426601687" sldId="263"/>
@@ -1330,7 +1330,7 @@
           </ac:spMkLst>
         </pc:spChg>
         <pc:spChg chg="add mod ord">
-          <ac:chgData name="Richard Hunt" userId="a9b14997-caef-4159-8c34-0f67c79d0d7a" providerId="ADAL" clId="{2F841D68-50EA-48FE-B1C6-1A0B49E241EB}" dt="2024-05-28T07:32:13.022" v="2034" actId="20577"/>
+          <ac:chgData name="Richard Hunt" userId="a9b14997-caef-4159-8c34-0f67c79d0d7a" providerId="ADAL" clId="{2F841D68-50EA-48FE-B1C6-1A0B49E241EB}" dt="2024-06-01T13:58:46.625" v="2270" actId="20577"/>
           <ac:spMkLst>
             <pc:docMk/>
             <pc:sldMk cId="426601687" sldId="263"/>
@@ -1673,7 +1673,7 @@
           <a:p>
             <a:fld id="{4CA59C36-4B9D-4968-AA82-5235797A6441}" type="datetimeFigureOut">
               <a:rPr lang="en-GB" smtClean="0"/>
-              <a:t>28/05/2024</a:t>
+              <a:t>01/06/2024</a:t>
             </a:fld>
             <a:endParaRPr lang="en-GB"/>
           </a:p>
@@ -2474,7 +2474,7 @@
           <a:p>
             <a:fld id="{B16709D0-7582-4095-B565-6047960A4E01}" type="datetimeFigureOut">
               <a:rPr lang="en-GB" smtClean="0"/>
-              <a:t>28/05/2024</a:t>
+              <a:t>01/06/2024</a:t>
             </a:fld>
             <a:endParaRPr lang="en-GB"/>
           </a:p>
@@ -2674,7 +2674,7 @@
           <a:p>
             <a:fld id="{B16709D0-7582-4095-B565-6047960A4E01}" type="datetimeFigureOut">
               <a:rPr lang="en-GB" smtClean="0"/>
-              <a:t>28/05/2024</a:t>
+              <a:t>01/06/2024</a:t>
             </a:fld>
             <a:endParaRPr lang="en-GB"/>
           </a:p>
@@ -2884,7 +2884,7 @@
           <a:p>
             <a:fld id="{B16709D0-7582-4095-B565-6047960A4E01}" type="datetimeFigureOut">
               <a:rPr lang="en-GB" smtClean="0"/>
-              <a:t>28/05/2024</a:t>
+              <a:t>01/06/2024</a:t>
             </a:fld>
             <a:endParaRPr lang="en-GB"/>
           </a:p>
@@ -3084,7 +3084,7 @@
           <a:p>
             <a:fld id="{B16709D0-7582-4095-B565-6047960A4E01}" type="datetimeFigureOut">
               <a:rPr lang="en-GB" smtClean="0"/>
-              <a:t>28/05/2024</a:t>
+              <a:t>01/06/2024</a:t>
             </a:fld>
             <a:endParaRPr lang="en-GB"/>
           </a:p>
@@ -3360,7 +3360,7 @@
           <a:p>
             <a:fld id="{B16709D0-7582-4095-B565-6047960A4E01}" type="datetimeFigureOut">
               <a:rPr lang="en-GB" smtClean="0"/>
-              <a:t>28/05/2024</a:t>
+              <a:t>01/06/2024</a:t>
             </a:fld>
             <a:endParaRPr lang="en-GB"/>
           </a:p>
@@ -3628,7 +3628,7 @@
           <a:p>
             <a:fld id="{B16709D0-7582-4095-B565-6047960A4E01}" type="datetimeFigureOut">
               <a:rPr lang="en-GB" smtClean="0"/>
-              <a:t>28/05/2024</a:t>
+              <a:t>01/06/2024</a:t>
             </a:fld>
             <a:endParaRPr lang="en-GB"/>
           </a:p>
@@ -4043,7 +4043,7 @@
           <a:p>
             <a:fld id="{B16709D0-7582-4095-B565-6047960A4E01}" type="datetimeFigureOut">
               <a:rPr lang="en-GB" smtClean="0"/>
-              <a:t>28/05/2024</a:t>
+              <a:t>01/06/2024</a:t>
             </a:fld>
             <a:endParaRPr lang="en-GB"/>
           </a:p>
@@ -4185,7 +4185,7 @@
           <a:p>
             <a:fld id="{B16709D0-7582-4095-B565-6047960A4E01}" type="datetimeFigureOut">
               <a:rPr lang="en-GB" smtClean="0"/>
-              <a:t>28/05/2024</a:t>
+              <a:t>01/06/2024</a:t>
             </a:fld>
             <a:endParaRPr lang="en-GB"/>
           </a:p>
@@ -4298,7 +4298,7 @@
           <a:p>
             <a:fld id="{B16709D0-7582-4095-B565-6047960A4E01}" type="datetimeFigureOut">
               <a:rPr lang="en-GB" smtClean="0"/>
-              <a:t>28/05/2024</a:t>
+              <a:t>01/06/2024</a:t>
             </a:fld>
             <a:endParaRPr lang="en-GB"/>
           </a:p>
@@ -4611,7 +4611,7 @@
           <a:p>
             <a:fld id="{B16709D0-7582-4095-B565-6047960A4E01}" type="datetimeFigureOut">
               <a:rPr lang="en-GB" smtClean="0"/>
-              <a:t>28/05/2024</a:t>
+              <a:t>01/06/2024</a:t>
             </a:fld>
             <a:endParaRPr lang="en-GB"/>
           </a:p>
@@ -4900,7 +4900,7 @@
           <a:p>
             <a:fld id="{B16709D0-7582-4095-B565-6047960A4E01}" type="datetimeFigureOut">
               <a:rPr lang="en-GB" smtClean="0"/>
-              <a:t>28/05/2024</a:t>
+              <a:t>01/06/2024</a:t>
             </a:fld>
             <a:endParaRPr lang="en-GB"/>
           </a:p>
@@ -5143,7 +5143,7 @@
           <a:p>
             <a:fld id="{B16709D0-7582-4095-B565-6047960A4E01}" type="datetimeFigureOut">
               <a:rPr lang="en-GB" smtClean="0"/>
-              <a:t>28/05/2024</a:t>
+              <a:t>01/06/2024</a:t>
             </a:fld>
             <a:endParaRPr lang="en-GB"/>
           </a:p>
@@ -9941,7 +9941,10 @@
           <a:lstStyle/>
           <a:p>
             <a:pPr algn="ctr"/>
-            <a:endParaRPr lang="en-GB" dirty="0"/>
+            <a:r>
+              <a:rPr lang="en-GB" dirty="0"/>
+              <a:t> </a:t>
+            </a:r>
           </a:p>
         </p:txBody>
       </p:sp>

</xml_diff>